<commit_message>
4 DoE runs executed + writing updated
</commit_message>
<xml_diff>
--- a/Documentation/AudioSegmentation.pptx
+++ b/Documentation/AudioSegmentation.pptx
@@ -4,12 +4,17 @@
   <p:sldMasterIdLst>
     <p:sldMasterId id="2147483648" r:id="rId1"/>
   </p:sldMasterIdLst>
+  <p:notesMasterIdLst>
+    <p:notesMasterId r:id="rId9"/>
+  </p:notesMasterIdLst>
   <p:sldIdLst>
     <p:sldId id="256" r:id="rId2"/>
     <p:sldId id="257" r:id="rId3"/>
     <p:sldId id="258" r:id="rId4"/>
     <p:sldId id="259" r:id="rId5"/>
     <p:sldId id="260" r:id="rId6"/>
+    <p:sldId id="261" r:id="rId7"/>
+    <p:sldId id="262" r:id="rId8"/>
   </p:sldIdLst>
   <p:sldSz cx="12192000" cy="6858000"/>
   <p:notesSz cx="6858000" cy="9144000"/>
@@ -114,6 +119,355 @@
     </p:ext>
   </p:extLst>
 </p:presentation>
+</file>
+
+<file path=ppt/notesMasters/notesMaster1.xml><?xml version="1.0" encoding="utf-8"?>
+<p:notesMaster xmlns:a="http://schemas.openxmlformats.org/drawingml/2006/main" xmlns:r="http://schemas.openxmlformats.org/officeDocument/2006/relationships" xmlns:p="http://schemas.openxmlformats.org/presentationml/2006/main">
+  <p:cSld>
+    <p:bg>
+      <p:bgRef idx="1001">
+        <a:schemeClr val="bg1"/>
+      </p:bgRef>
+    </p:bg>
+    <p:spTree>
+      <p:nvGrpSpPr>
+        <p:cNvPr id="1" name=""/>
+        <p:cNvGrpSpPr/>
+        <p:nvPr/>
+      </p:nvGrpSpPr>
+      <p:grpSpPr>
+        <a:xfrm>
+          <a:off x="0" y="0"/>
+          <a:ext cx="0" cy="0"/>
+          <a:chOff x="0" y="0"/>
+          <a:chExt cx="0" cy="0"/>
+        </a:xfrm>
+      </p:grpSpPr>
+      <p:sp>
+        <p:nvSpPr>
+          <p:cNvPr id="2" name="Header Placeholder 1"/>
+          <p:cNvSpPr>
+            <a:spLocks noGrp="1"/>
+          </p:cNvSpPr>
+          <p:nvPr>
+            <p:ph type="hdr" sz="quarter"/>
+          </p:nvPr>
+        </p:nvSpPr>
+        <p:spPr>
+          <a:xfrm>
+            <a:off x="0" y="0"/>
+            <a:ext cx="2971800" cy="458788"/>
+          </a:xfrm>
+          <a:prstGeom prst="rect">
+            <a:avLst/>
+          </a:prstGeom>
+        </p:spPr>
+        <p:txBody>
+          <a:bodyPr vert="horz" lIns="91440" tIns="45720" rIns="91440" bIns="45720" rtlCol="0"/>
+          <a:lstStyle>
+            <a:lvl1pPr algn="l">
+              <a:defRPr sz="1200"/>
+            </a:lvl1pPr>
+          </a:lstStyle>
+          <a:p>
+            <a:endParaRPr lang="en-US"/>
+          </a:p>
+        </p:txBody>
+      </p:sp>
+      <p:sp>
+        <p:nvSpPr>
+          <p:cNvPr id="3" name="Date Placeholder 2"/>
+          <p:cNvSpPr>
+            <a:spLocks noGrp="1"/>
+          </p:cNvSpPr>
+          <p:nvPr>
+            <p:ph type="dt" idx="1"/>
+          </p:nvPr>
+        </p:nvSpPr>
+        <p:spPr>
+          <a:xfrm>
+            <a:off x="3884613" y="0"/>
+            <a:ext cx="2971800" cy="458788"/>
+          </a:xfrm>
+          <a:prstGeom prst="rect">
+            <a:avLst/>
+          </a:prstGeom>
+        </p:spPr>
+        <p:txBody>
+          <a:bodyPr vert="horz" lIns="91440" tIns="45720" rIns="91440" bIns="45720" rtlCol="0"/>
+          <a:lstStyle>
+            <a:lvl1pPr algn="r">
+              <a:defRPr sz="1200"/>
+            </a:lvl1pPr>
+          </a:lstStyle>
+          <a:p>
+            <a:fld id="{85BCF1DB-A6DC-410E-84CD-E4B7C0AA92AF}" type="datetimeFigureOut">
+              <a:rPr lang="en-US" smtClean="0"/>
+              <a:t>12/29/2022</a:t>
+            </a:fld>
+            <a:endParaRPr lang="en-US"/>
+          </a:p>
+        </p:txBody>
+      </p:sp>
+      <p:sp>
+        <p:nvSpPr>
+          <p:cNvPr id="4" name="Slide Image Placeholder 3"/>
+          <p:cNvSpPr>
+            <a:spLocks noGrp="1" noRot="1" noChangeAspect="1"/>
+          </p:cNvSpPr>
+          <p:nvPr>
+            <p:ph type="sldImg" idx="2"/>
+          </p:nvPr>
+        </p:nvSpPr>
+        <p:spPr>
+          <a:xfrm>
+            <a:off x="685800" y="1143000"/>
+            <a:ext cx="5486400" cy="3086100"/>
+          </a:xfrm>
+          <a:prstGeom prst="rect">
+            <a:avLst/>
+          </a:prstGeom>
+          <a:noFill/>
+          <a:ln w="12700">
+            <a:solidFill>
+              <a:prstClr val="black"/>
+            </a:solidFill>
+          </a:ln>
+        </p:spPr>
+        <p:txBody>
+          <a:bodyPr vert="horz" lIns="91440" tIns="45720" rIns="91440" bIns="45720" rtlCol="0" anchor="ctr"/>
+          <a:lstStyle/>
+          <a:p>
+            <a:endParaRPr lang="en-US"/>
+          </a:p>
+        </p:txBody>
+      </p:sp>
+      <p:sp>
+        <p:nvSpPr>
+          <p:cNvPr id="5" name="Notes Placeholder 4"/>
+          <p:cNvSpPr>
+            <a:spLocks noGrp="1"/>
+          </p:cNvSpPr>
+          <p:nvPr>
+            <p:ph type="body" sz="quarter" idx="3"/>
+          </p:nvPr>
+        </p:nvSpPr>
+        <p:spPr>
+          <a:xfrm>
+            <a:off x="685800" y="4400550"/>
+            <a:ext cx="5486400" cy="3600450"/>
+          </a:xfrm>
+          <a:prstGeom prst="rect">
+            <a:avLst/>
+          </a:prstGeom>
+        </p:spPr>
+        <p:txBody>
+          <a:bodyPr vert="horz" lIns="91440" tIns="45720" rIns="91440" bIns="45720" rtlCol="0"/>
+          <a:lstStyle/>
+          <a:p>
+            <a:pPr lvl="0"/>
+            <a:r>
+              <a:rPr lang="en-US"/>
+              <a:t>Click to edit Master text styles</a:t>
+            </a:r>
+          </a:p>
+          <a:p>
+            <a:pPr lvl="1"/>
+            <a:r>
+              <a:rPr lang="en-US"/>
+              <a:t>Second level</a:t>
+            </a:r>
+          </a:p>
+          <a:p>
+            <a:pPr lvl="2"/>
+            <a:r>
+              <a:rPr lang="en-US"/>
+              <a:t>Third level</a:t>
+            </a:r>
+          </a:p>
+          <a:p>
+            <a:pPr lvl="3"/>
+            <a:r>
+              <a:rPr lang="en-US"/>
+              <a:t>Fourth level</a:t>
+            </a:r>
+          </a:p>
+          <a:p>
+            <a:pPr lvl="4"/>
+            <a:r>
+              <a:rPr lang="en-US"/>
+              <a:t>Fifth level</a:t>
+            </a:r>
+          </a:p>
+        </p:txBody>
+      </p:sp>
+      <p:sp>
+        <p:nvSpPr>
+          <p:cNvPr id="6" name="Footer Placeholder 5"/>
+          <p:cNvSpPr>
+            <a:spLocks noGrp="1"/>
+          </p:cNvSpPr>
+          <p:nvPr>
+            <p:ph type="ftr" sz="quarter" idx="4"/>
+          </p:nvPr>
+        </p:nvSpPr>
+        <p:spPr>
+          <a:xfrm>
+            <a:off x="0" y="8685213"/>
+            <a:ext cx="2971800" cy="458787"/>
+          </a:xfrm>
+          <a:prstGeom prst="rect">
+            <a:avLst/>
+          </a:prstGeom>
+        </p:spPr>
+        <p:txBody>
+          <a:bodyPr vert="horz" lIns="91440" tIns="45720" rIns="91440" bIns="45720" rtlCol="0" anchor="b"/>
+          <a:lstStyle>
+            <a:lvl1pPr algn="l">
+              <a:defRPr sz="1200"/>
+            </a:lvl1pPr>
+          </a:lstStyle>
+          <a:p>
+            <a:endParaRPr lang="en-US"/>
+          </a:p>
+        </p:txBody>
+      </p:sp>
+      <p:sp>
+        <p:nvSpPr>
+          <p:cNvPr id="7" name="Slide Number Placeholder 6"/>
+          <p:cNvSpPr>
+            <a:spLocks noGrp="1"/>
+          </p:cNvSpPr>
+          <p:nvPr>
+            <p:ph type="sldNum" sz="quarter" idx="5"/>
+          </p:nvPr>
+        </p:nvSpPr>
+        <p:spPr>
+          <a:xfrm>
+            <a:off x="3884613" y="8685213"/>
+            <a:ext cx="2971800" cy="458787"/>
+          </a:xfrm>
+          <a:prstGeom prst="rect">
+            <a:avLst/>
+          </a:prstGeom>
+        </p:spPr>
+        <p:txBody>
+          <a:bodyPr vert="horz" lIns="91440" tIns="45720" rIns="91440" bIns="45720" rtlCol="0" anchor="b"/>
+          <a:lstStyle>
+            <a:lvl1pPr algn="r">
+              <a:defRPr sz="1200"/>
+            </a:lvl1pPr>
+          </a:lstStyle>
+          <a:p>
+            <a:fld id="{22096D75-FAEA-44E0-A0CF-B4004602415D}" type="slidenum">
+              <a:rPr lang="en-US" smtClean="0"/>
+              <a:t>‹#›</a:t>
+            </a:fld>
+            <a:endParaRPr lang="en-US"/>
+          </a:p>
+        </p:txBody>
+      </p:sp>
+    </p:spTree>
+    <p:extLst>
+      <p:ext uri="{BB962C8B-B14F-4D97-AF65-F5344CB8AC3E}">
+        <p14:creationId xmlns:p14="http://schemas.microsoft.com/office/powerpoint/2010/main" val="1086321352"/>
+      </p:ext>
+    </p:extLst>
+  </p:cSld>
+  <p:clrMap bg1="lt1" tx1="dk1" bg2="lt2" tx2="dk2" accent1="accent1" accent2="accent2" accent3="accent3" accent4="accent4" accent5="accent5" accent6="accent6" hlink="hlink" folHlink="folHlink"/>
+  <p:notesStyle>
+    <a:lvl1pPr marL="0" algn="l" defTabSz="914400" rtl="0" eaLnBrk="1" latinLnBrk="0" hangingPunct="1">
+      <a:defRPr sz="1200" kern="1200">
+        <a:solidFill>
+          <a:schemeClr val="tx1"/>
+        </a:solidFill>
+        <a:latin typeface="+mn-lt"/>
+        <a:ea typeface="+mn-ea"/>
+        <a:cs typeface="+mn-cs"/>
+      </a:defRPr>
+    </a:lvl1pPr>
+    <a:lvl2pPr marL="457200" algn="l" defTabSz="914400" rtl="0" eaLnBrk="1" latinLnBrk="0" hangingPunct="1">
+      <a:defRPr sz="1200" kern="1200">
+        <a:solidFill>
+          <a:schemeClr val="tx1"/>
+        </a:solidFill>
+        <a:latin typeface="+mn-lt"/>
+        <a:ea typeface="+mn-ea"/>
+        <a:cs typeface="+mn-cs"/>
+      </a:defRPr>
+    </a:lvl2pPr>
+    <a:lvl3pPr marL="914400" algn="l" defTabSz="914400" rtl="0" eaLnBrk="1" latinLnBrk="0" hangingPunct="1">
+      <a:defRPr sz="1200" kern="1200">
+        <a:solidFill>
+          <a:schemeClr val="tx1"/>
+        </a:solidFill>
+        <a:latin typeface="+mn-lt"/>
+        <a:ea typeface="+mn-ea"/>
+        <a:cs typeface="+mn-cs"/>
+      </a:defRPr>
+    </a:lvl3pPr>
+    <a:lvl4pPr marL="1371600" algn="l" defTabSz="914400" rtl="0" eaLnBrk="1" latinLnBrk="0" hangingPunct="1">
+      <a:defRPr sz="1200" kern="1200">
+        <a:solidFill>
+          <a:schemeClr val="tx1"/>
+        </a:solidFill>
+        <a:latin typeface="+mn-lt"/>
+        <a:ea typeface="+mn-ea"/>
+        <a:cs typeface="+mn-cs"/>
+      </a:defRPr>
+    </a:lvl4pPr>
+    <a:lvl5pPr marL="1828800" algn="l" defTabSz="914400" rtl="0" eaLnBrk="1" latinLnBrk="0" hangingPunct="1">
+      <a:defRPr sz="1200" kern="1200">
+        <a:solidFill>
+          <a:schemeClr val="tx1"/>
+        </a:solidFill>
+        <a:latin typeface="+mn-lt"/>
+        <a:ea typeface="+mn-ea"/>
+        <a:cs typeface="+mn-cs"/>
+      </a:defRPr>
+    </a:lvl5pPr>
+    <a:lvl6pPr marL="2286000" algn="l" defTabSz="914400" rtl="0" eaLnBrk="1" latinLnBrk="0" hangingPunct="1">
+      <a:defRPr sz="1200" kern="1200">
+        <a:solidFill>
+          <a:schemeClr val="tx1"/>
+        </a:solidFill>
+        <a:latin typeface="+mn-lt"/>
+        <a:ea typeface="+mn-ea"/>
+        <a:cs typeface="+mn-cs"/>
+      </a:defRPr>
+    </a:lvl6pPr>
+    <a:lvl7pPr marL="2743200" algn="l" defTabSz="914400" rtl="0" eaLnBrk="1" latinLnBrk="0" hangingPunct="1">
+      <a:defRPr sz="1200" kern="1200">
+        <a:solidFill>
+          <a:schemeClr val="tx1"/>
+        </a:solidFill>
+        <a:latin typeface="+mn-lt"/>
+        <a:ea typeface="+mn-ea"/>
+        <a:cs typeface="+mn-cs"/>
+      </a:defRPr>
+    </a:lvl7pPr>
+    <a:lvl8pPr marL="3200400" algn="l" defTabSz="914400" rtl="0" eaLnBrk="1" latinLnBrk="0" hangingPunct="1">
+      <a:defRPr sz="1200" kern="1200">
+        <a:solidFill>
+          <a:schemeClr val="tx1"/>
+        </a:solidFill>
+        <a:latin typeface="+mn-lt"/>
+        <a:ea typeface="+mn-ea"/>
+        <a:cs typeface="+mn-cs"/>
+      </a:defRPr>
+    </a:lvl8pPr>
+    <a:lvl9pPr marL="3657600" algn="l" defTabSz="914400" rtl="0" eaLnBrk="1" latinLnBrk="0" hangingPunct="1">
+      <a:defRPr sz="1200" kern="1200">
+        <a:solidFill>
+          <a:schemeClr val="tx1"/>
+        </a:solidFill>
+        <a:latin typeface="+mn-lt"/>
+        <a:ea typeface="+mn-ea"/>
+        <a:cs typeface="+mn-cs"/>
+      </a:defRPr>
+    </a:lvl9pPr>
+  </p:notesStyle>
+</p:notesMaster>
 </file>
 
 <file path=ppt/slideLayouts/slideLayout1.xml><?xml version="1.0" encoding="utf-8"?>
@@ -5964,7 +6318,7 @@
         </p:nvSpPr>
         <p:spPr>
           <a:xfrm>
-            <a:off x="1136864" y="2702486"/>
+            <a:off x="1175484" y="2635374"/>
             <a:ext cx="732445" cy="369332"/>
           </a:xfrm>
           <a:prstGeom prst="rect">
@@ -6008,8 +6362,8 @@
         </p:nvGrpSpPr>
         <p:grpSpPr>
           <a:xfrm>
-            <a:off x="1068944" y="1808332"/>
-            <a:ext cx="868560" cy="895327"/>
+            <a:off x="1159825" y="1864006"/>
+            <a:ext cx="777240" cy="777240"/>
             <a:chOff x="785816" y="1549248"/>
             <a:chExt cx="1193994" cy="1403481"/>
           </a:xfrm>
@@ -11557,8 +11911,8 @@
         </p:nvSpPr>
         <p:spPr>
           <a:xfrm>
-            <a:off x="5942230" y="2021270"/>
-            <a:ext cx="866005" cy="446764"/>
+            <a:off x="5925452" y="2021270"/>
+            <a:ext cx="859583" cy="446764"/>
           </a:xfrm>
           <a:prstGeom prst="rect">
             <a:avLst/>
@@ -11599,7 +11953,7 @@
           <a:p>
             <a:pPr algn="ctr"/>
             <a:r>
-              <a:rPr lang="pt-BR" sz="900" b="1" dirty="0" err="1"/>
+              <a:rPr lang="pt-BR" sz="900" b="1" dirty="0"/>
               <a:t>GlobalPooling</a:t>
             </a:r>
             <a:endParaRPr lang="en-US" sz="1100" dirty="0"/>
@@ -11664,7 +12018,7 @@
         </p:nvGrpSpPr>
         <p:grpSpPr>
           <a:xfrm>
-            <a:off x="7083850" y="2199798"/>
+            <a:off x="7033516" y="2199798"/>
             <a:ext cx="495193" cy="108664"/>
             <a:chOff x="7205770" y="2199798"/>
             <a:chExt cx="650044" cy="108664"/>
@@ -11987,7 +12341,7 @@
         </p:nvCxnSpPr>
         <p:spPr>
           <a:xfrm>
-            <a:off x="6886390" y="2252626"/>
+            <a:off x="6836056" y="2252626"/>
             <a:ext cx="152400" cy="0"/>
           </a:xfrm>
           <a:prstGeom prst="straightConnector1">
@@ -12031,7 +12385,7 @@
         </p:nvCxnSpPr>
         <p:spPr>
           <a:xfrm>
-            <a:off x="7625530" y="2252626"/>
+            <a:off x="7575196" y="2252626"/>
             <a:ext cx="152400" cy="0"/>
           </a:xfrm>
           <a:prstGeom prst="straightConnector1">
@@ -12073,7 +12427,7 @@
         </p:nvSpPr>
         <p:spPr>
           <a:xfrm>
-            <a:off x="8252460" y="1545428"/>
+            <a:off x="8218904" y="1545428"/>
             <a:ext cx="182880" cy="182880"/>
           </a:xfrm>
           <a:prstGeom prst="ellipse">
@@ -12132,7 +12486,7 @@
         </p:nvSpPr>
         <p:spPr>
           <a:xfrm>
-            <a:off x="8252460" y="2140215"/>
+            <a:off x="8218904" y="2140215"/>
             <a:ext cx="182880" cy="182880"/>
           </a:xfrm>
           <a:prstGeom prst="ellipse">
@@ -12191,7 +12545,7 @@
         </p:nvSpPr>
         <p:spPr>
           <a:xfrm>
-            <a:off x="8252460" y="2722897"/>
+            <a:off x="8218904" y="2722897"/>
             <a:ext cx="182880" cy="182880"/>
           </a:xfrm>
           <a:prstGeom prst="ellipse">
@@ -12250,7 +12604,7 @@
         </p:nvSpPr>
         <p:spPr>
           <a:xfrm>
-            <a:off x="8915400" y="1640961"/>
+            <a:off x="8881844" y="1640961"/>
             <a:ext cx="182880" cy="182880"/>
           </a:xfrm>
           <a:prstGeom prst="ellipse">
@@ -12296,7 +12650,7 @@
         </p:nvSpPr>
         <p:spPr>
           <a:xfrm>
-            <a:off x="8915400" y="2481506"/>
+            <a:off x="8881844" y="2481506"/>
             <a:ext cx="182880" cy="182880"/>
           </a:xfrm>
           <a:prstGeom prst="ellipse">
@@ -12342,7 +12696,7 @@
         </p:nvSpPr>
         <p:spPr>
           <a:xfrm>
-            <a:off x="9523373" y="1584942"/>
+            <a:off x="9464650" y="1584942"/>
             <a:ext cx="401072" cy="276999"/>
           </a:xfrm>
           <a:prstGeom prst="rect">
@@ -12394,7 +12748,7 @@
         </p:nvCxnSpPr>
         <p:spPr>
           <a:xfrm flipH="1">
-            <a:off x="7777930" y="1636868"/>
+            <a:off x="7744374" y="1636868"/>
             <a:ext cx="474530" cy="607784"/>
           </a:xfrm>
           <a:prstGeom prst="line">
@@ -12433,7 +12787,7 @@
         </p:nvCxnSpPr>
         <p:spPr>
           <a:xfrm flipH="1" flipV="1">
-            <a:off x="7777930" y="2244652"/>
+            <a:off x="7744374" y="2244652"/>
             <a:ext cx="474530" cy="569685"/>
           </a:xfrm>
           <a:prstGeom prst="line">
@@ -12472,7 +12826,7 @@
         </p:nvCxnSpPr>
         <p:spPr>
           <a:xfrm flipV="1">
-            <a:off x="7777930" y="2231655"/>
+            <a:off x="7744374" y="2231655"/>
             <a:ext cx="474530" cy="12997"/>
           </a:xfrm>
           <a:prstGeom prst="line">
@@ -12511,7 +12865,7 @@
         </p:nvCxnSpPr>
         <p:spPr>
           <a:xfrm>
-            <a:off x="8435340" y="1636868"/>
+            <a:off x="8401784" y="1636868"/>
             <a:ext cx="480060" cy="95533"/>
           </a:xfrm>
           <a:prstGeom prst="line">
@@ -12551,7 +12905,7 @@
         </p:nvCxnSpPr>
         <p:spPr>
           <a:xfrm>
-            <a:off x="8435340" y="1636868"/>
+            <a:off x="8401784" y="1636868"/>
             <a:ext cx="480060" cy="936078"/>
           </a:xfrm>
           <a:prstGeom prst="line">
@@ -12591,7 +12945,7 @@
         </p:nvCxnSpPr>
         <p:spPr>
           <a:xfrm flipV="1">
-            <a:off x="8435340" y="1732401"/>
+            <a:off x="8401784" y="1732401"/>
             <a:ext cx="480060" cy="499254"/>
           </a:xfrm>
           <a:prstGeom prst="line">
@@ -12631,7 +12985,7 @@
         </p:nvCxnSpPr>
         <p:spPr>
           <a:xfrm>
-            <a:off x="8435340" y="2231655"/>
+            <a:off x="8401784" y="2231655"/>
             <a:ext cx="480060" cy="341291"/>
           </a:xfrm>
           <a:prstGeom prst="line">
@@ -12671,7 +13025,7 @@
         </p:nvCxnSpPr>
         <p:spPr>
           <a:xfrm flipV="1">
-            <a:off x="8435340" y="2572946"/>
+            <a:off x="8401784" y="2572946"/>
             <a:ext cx="480060" cy="241391"/>
           </a:xfrm>
           <a:prstGeom prst="line">
@@ -12711,7 +13065,7 @@
         </p:nvCxnSpPr>
         <p:spPr>
           <a:xfrm flipV="1">
-            <a:off x="8435340" y="1732401"/>
+            <a:off x="8401784" y="1732401"/>
             <a:ext cx="480060" cy="1081936"/>
           </a:xfrm>
           <a:prstGeom prst="line">
@@ -12747,7 +13101,7 @@
         </p:nvSpPr>
         <p:spPr>
           <a:xfrm>
-            <a:off x="9472878" y="2430108"/>
+            <a:off x="9397377" y="2430108"/>
             <a:ext cx="502061" cy="276999"/>
           </a:xfrm>
           <a:prstGeom prst="rect">
@@ -12800,8 +13154,8 @@
         </p:nvCxnSpPr>
         <p:spPr>
           <a:xfrm flipV="1">
-            <a:off x="9098280" y="1723442"/>
-            <a:ext cx="425093" cy="8959"/>
+            <a:off x="9064724" y="1723442"/>
+            <a:ext cx="399926" cy="8959"/>
           </a:xfrm>
           <a:prstGeom prst="line">
             <a:avLst/>
@@ -12840,8 +13194,8 @@
         </p:nvCxnSpPr>
         <p:spPr>
           <a:xfrm flipV="1">
-            <a:off x="9098280" y="2568608"/>
-            <a:ext cx="374598" cy="4338"/>
+            <a:off x="9064724" y="2568608"/>
+            <a:ext cx="332653" cy="4338"/>
           </a:xfrm>
           <a:prstGeom prst="line">
             <a:avLst/>
@@ -12876,7 +13230,7 @@
         </p:nvSpPr>
         <p:spPr>
           <a:xfrm>
-            <a:off x="8143364" y="2851007"/>
+            <a:off x="8093030" y="2851007"/>
             <a:ext cx="401071" cy="584775"/>
           </a:xfrm>
           <a:prstGeom prst="rect">
@@ -13159,7 +13513,7 @@
         </p:nvSpPr>
         <p:spPr>
           <a:xfrm rot="5400000">
-            <a:off x="8418676" y="464032"/>
+            <a:off x="8368342" y="464032"/>
             <a:ext cx="160778" cy="1442270"/>
           </a:xfrm>
           <a:prstGeom prst="leftBrace">
@@ -13209,7 +13563,7 @@
         </p:nvSpPr>
         <p:spPr>
           <a:xfrm>
-            <a:off x="7891571" y="821420"/>
+            <a:off x="7841237" y="821420"/>
             <a:ext cx="1252429" cy="261610"/>
           </a:xfrm>
           <a:prstGeom prst="rect">
@@ -13235,6 +13589,1460 @@
     <p:extLst>
       <p:ext uri="{BB962C8B-B14F-4D97-AF65-F5344CB8AC3E}">
         <p14:creationId xmlns:p14="http://schemas.microsoft.com/office/powerpoint/2010/main" val="3399572008"/>
+      </p:ext>
+    </p:extLst>
+  </p:cSld>
+  <p:clrMapOvr>
+    <a:masterClrMapping/>
+  </p:clrMapOvr>
+</p:sld>
+</file>
+
+<file path=ppt/slides/slide6.xml><?xml version="1.0" encoding="utf-8"?>
+<p:sld xmlns:a="http://schemas.openxmlformats.org/drawingml/2006/main" xmlns:r="http://schemas.openxmlformats.org/officeDocument/2006/relationships" xmlns:p="http://schemas.openxmlformats.org/presentationml/2006/main">
+  <p:cSld>
+    <p:spTree>
+      <p:nvGrpSpPr>
+        <p:cNvPr id="1" name=""/>
+        <p:cNvGrpSpPr/>
+        <p:nvPr/>
+      </p:nvGrpSpPr>
+      <p:grpSpPr>
+        <a:xfrm>
+          <a:off x="0" y="0"/>
+          <a:ext cx="0" cy="0"/>
+          <a:chOff x="0" y="0"/>
+          <a:chExt cx="0" cy="0"/>
+        </a:xfrm>
+      </p:grpSpPr>
+      <p:pic>
+        <p:nvPicPr>
+          <p:cNvPr id="4" name="Picture 3" descr="earlystopping">
+            <a:extLst>
+              <a:ext uri="{FF2B5EF4-FFF2-40B4-BE49-F238E27FC236}">
+                <a16:creationId xmlns:a16="http://schemas.microsoft.com/office/drawing/2014/main" id="{59C923CA-5C30-4BE8-ACB2-47E4FB5588A9}"/>
+              </a:ext>
+            </a:extLst>
+          </p:cNvPr>
+          <p:cNvPicPr>
+            <a:picLocks noChangeAspect="1"/>
+          </p:cNvPicPr>
+          <p:nvPr/>
+        </p:nvPicPr>
+        <p:blipFill rotWithShape="1">
+          <a:blip r:embed="rId2" cstate="print">
+            <a:extLst>
+              <a:ext uri="{28A0092B-C50C-407E-A947-70E740481C1C}">
+                <a14:useLocalDpi xmlns:a14="http://schemas.microsoft.com/office/drawing/2010/main" val="0"/>
+              </a:ext>
+            </a:extLst>
+          </a:blip>
+          <a:srcRect l="3419" t="3418" r="3378" b="5858"/>
+          <a:stretch/>
+        </p:blipFill>
+        <p:spPr bwMode="auto">
+          <a:xfrm>
+            <a:off x="4608512" y="2613977"/>
+            <a:ext cx="2974975" cy="1630045"/>
+          </a:xfrm>
+          <a:prstGeom prst="rect">
+            <a:avLst/>
+          </a:prstGeom>
+          <a:noFill/>
+          <a:ln>
+            <a:noFill/>
+          </a:ln>
+          <a:extLst>
+            <a:ext uri="{53640926-AAD7-44D8-BBD7-CCE9431645EC}">
+              <a14:shadowObscured xmlns:a14="http://schemas.microsoft.com/office/drawing/2010/main"/>
+            </a:ext>
+          </a:extLst>
+        </p:spPr>
+      </p:pic>
+      <p:sp>
+        <p:nvSpPr>
+          <p:cNvPr id="5" name="TextBox 4">
+            <a:extLst>
+              <a:ext uri="{FF2B5EF4-FFF2-40B4-BE49-F238E27FC236}">
+                <a16:creationId xmlns:a16="http://schemas.microsoft.com/office/drawing/2014/main" id="{A4C17ABD-FA4A-4712-8374-C8CD6A7A74B9}"/>
+              </a:ext>
+            </a:extLst>
+          </p:cNvPr>
+          <p:cNvSpPr txBox="1"/>
+          <p:nvPr/>
+        </p:nvSpPr>
+        <p:spPr>
+          <a:xfrm>
+            <a:off x="5314951" y="3576637"/>
+            <a:ext cx="1016793" cy="230832"/>
+          </a:xfrm>
+          <a:prstGeom prst="rect">
+            <a:avLst/>
+          </a:prstGeom>
+          <a:solidFill>
+            <a:schemeClr val="bg1"/>
+          </a:solidFill>
+        </p:spPr>
+        <p:txBody>
+          <a:bodyPr wrap="square" rtlCol="0">
+            <a:spAutoFit/>
+          </a:bodyPr>
+          <a:lstStyle/>
+          <a:p>
+            <a:pPr algn="ctr"/>
+            <a:r>
+              <a:rPr lang="pt-BR" sz="900" dirty="0">
+                <a:solidFill>
+                  <a:srgbClr val="000BFF"/>
+                </a:solidFill>
+              </a:rPr>
+              <a:t>Acurácia de Teste</a:t>
+            </a:r>
+            <a:endParaRPr lang="en-US" sz="900" dirty="0">
+              <a:solidFill>
+                <a:srgbClr val="000BFF"/>
+              </a:solidFill>
+            </a:endParaRPr>
+          </a:p>
+        </p:txBody>
+      </p:sp>
+      <p:sp>
+        <p:nvSpPr>
+          <p:cNvPr id="6" name="TextBox 5">
+            <a:extLst>
+              <a:ext uri="{FF2B5EF4-FFF2-40B4-BE49-F238E27FC236}">
+                <a16:creationId xmlns:a16="http://schemas.microsoft.com/office/drawing/2014/main" id="{5042BACF-6DE7-407E-BE24-ED79A8574412}"/>
+              </a:ext>
+            </a:extLst>
+          </p:cNvPr>
+          <p:cNvSpPr txBox="1"/>
+          <p:nvPr/>
+        </p:nvSpPr>
+        <p:spPr>
+          <a:xfrm>
+            <a:off x="6246020" y="2512847"/>
+            <a:ext cx="1123950" cy="230832"/>
+          </a:xfrm>
+          <a:prstGeom prst="rect">
+            <a:avLst/>
+          </a:prstGeom>
+          <a:solidFill>
+            <a:schemeClr val="bg1"/>
+          </a:solidFill>
+        </p:spPr>
+        <p:txBody>
+          <a:bodyPr wrap="square" rtlCol="0">
+            <a:spAutoFit/>
+          </a:bodyPr>
+          <a:lstStyle/>
+          <a:p>
+            <a:pPr algn="ctr"/>
+            <a:r>
+              <a:rPr lang="pt-BR" sz="900" dirty="0">
+                <a:solidFill>
+                  <a:srgbClr val="FF0000"/>
+                </a:solidFill>
+              </a:rPr>
+              <a:t>Acurácia de Treino</a:t>
+            </a:r>
+            <a:endParaRPr lang="en-US" sz="900" dirty="0">
+              <a:solidFill>
+                <a:srgbClr val="FF0000"/>
+              </a:solidFill>
+            </a:endParaRPr>
+          </a:p>
+        </p:txBody>
+      </p:sp>
+      <p:sp>
+        <p:nvSpPr>
+          <p:cNvPr id="7" name="TextBox 6">
+            <a:extLst>
+              <a:ext uri="{FF2B5EF4-FFF2-40B4-BE49-F238E27FC236}">
+                <a16:creationId xmlns:a16="http://schemas.microsoft.com/office/drawing/2014/main" id="{83AE1CAB-BBD3-4CE8-A5A4-26DE0E6DAB1A}"/>
+              </a:ext>
+            </a:extLst>
+          </p:cNvPr>
+          <p:cNvSpPr txBox="1"/>
+          <p:nvPr/>
+        </p:nvSpPr>
+        <p:spPr>
+          <a:xfrm>
+            <a:off x="6369844" y="3621879"/>
+            <a:ext cx="838691" cy="230832"/>
+          </a:xfrm>
+          <a:prstGeom prst="rect">
+            <a:avLst/>
+          </a:prstGeom>
+          <a:solidFill>
+            <a:schemeClr val="bg1"/>
+          </a:solidFill>
+        </p:spPr>
+        <p:txBody>
+          <a:bodyPr wrap="none" rtlCol="0">
+            <a:spAutoFit/>
+          </a:bodyPr>
+          <a:lstStyle/>
+          <a:p>
+            <a:r>
+              <a:rPr lang="pt-BR" sz="900" dirty="0"/>
+              <a:t>Melhor época</a:t>
+            </a:r>
+            <a:endParaRPr lang="en-US" sz="900" dirty="0"/>
+          </a:p>
+        </p:txBody>
+      </p:sp>
+      <p:sp>
+        <p:nvSpPr>
+          <p:cNvPr id="8" name="TextBox 7">
+            <a:extLst>
+              <a:ext uri="{FF2B5EF4-FFF2-40B4-BE49-F238E27FC236}">
+                <a16:creationId xmlns:a16="http://schemas.microsoft.com/office/drawing/2014/main" id="{13437E85-172E-4ACF-B2AC-9091A800E829}"/>
+              </a:ext>
+            </a:extLst>
+          </p:cNvPr>
+          <p:cNvSpPr txBox="1"/>
+          <p:nvPr/>
+        </p:nvSpPr>
+        <p:spPr>
+          <a:xfrm>
+            <a:off x="6928644" y="4090254"/>
+            <a:ext cx="465192" cy="230832"/>
+          </a:xfrm>
+          <a:prstGeom prst="rect">
+            <a:avLst/>
+          </a:prstGeom>
+          <a:solidFill>
+            <a:schemeClr val="bg1"/>
+          </a:solidFill>
+        </p:spPr>
+        <p:txBody>
+          <a:bodyPr wrap="none" rtlCol="0">
+            <a:spAutoFit/>
+          </a:bodyPr>
+          <a:lstStyle/>
+          <a:p>
+            <a:r>
+              <a:rPr lang="pt-BR" sz="900" dirty="0"/>
+              <a:t>Época</a:t>
+            </a:r>
+            <a:endParaRPr lang="en-US" sz="900" dirty="0"/>
+          </a:p>
+        </p:txBody>
+      </p:sp>
+      <p:sp>
+        <p:nvSpPr>
+          <p:cNvPr id="9" name="TextBox 8">
+            <a:extLst>
+              <a:ext uri="{FF2B5EF4-FFF2-40B4-BE49-F238E27FC236}">
+                <a16:creationId xmlns:a16="http://schemas.microsoft.com/office/drawing/2014/main" id="{0361A9EB-6AF8-43E5-85CA-63B82208E43A}"/>
+              </a:ext>
+            </a:extLst>
+          </p:cNvPr>
+          <p:cNvSpPr txBox="1"/>
+          <p:nvPr/>
+        </p:nvSpPr>
+        <p:spPr>
+          <a:xfrm rot="16200000">
+            <a:off x="4248389" y="3010611"/>
+            <a:ext cx="790096" cy="230832"/>
+          </a:xfrm>
+          <a:prstGeom prst="rect">
+            <a:avLst/>
+          </a:prstGeom>
+          <a:solidFill>
+            <a:schemeClr val="bg1"/>
+          </a:solidFill>
+        </p:spPr>
+        <p:txBody>
+          <a:bodyPr wrap="square" rtlCol="0">
+            <a:spAutoFit/>
+          </a:bodyPr>
+          <a:lstStyle/>
+          <a:p>
+            <a:pPr algn="r"/>
+            <a:r>
+              <a:rPr lang="pt-BR" sz="900" dirty="0"/>
+              <a:t>Acurácia</a:t>
+            </a:r>
+            <a:endParaRPr lang="en-US" sz="900" dirty="0"/>
+          </a:p>
+        </p:txBody>
+      </p:sp>
+    </p:spTree>
+    <p:extLst>
+      <p:ext uri="{BB962C8B-B14F-4D97-AF65-F5344CB8AC3E}">
+        <p14:creationId xmlns:p14="http://schemas.microsoft.com/office/powerpoint/2010/main" val="168664896"/>
+      </p:ext>
+    </p:extLst>
+  </p:cSld>
+  <p:clrMapOvr>
+    <a:masterClrMapping/>
+  </p:clrMapOvr>
+</p:sld>
+</file>
+
+<file path=ppt/slides/slide7.xml><?xml version="1.0" encoding="utf-8"?>
+<p:sld xmlns:a="http://schemas.openxmlformats.org/drawingml/2006/main" xmlns:r="http://schemas.openxmlformats.org/officeDocument/2006/relationships" xmlns:p="http://schemas.openxmlformats.org/presentationml/2006/main">
+  <p:cSld>
+    <p:spTree>
+      <p:nvGrpSpPr>
+        <p:cNvPr id="1" name=""/>
+        <p:cNvGrpSpPr/>
+        <p:nvPr/>
+      </p:nvGrpSpPr>
+      <p:grpSpPr>
+        <a:xfrm>
+          <a:off x="0" y="0"/>
+          <a:ext cx="0" cy="0"/>
+          <a:chOff x="0" y="0"/>
+          <a:chExt cx="0" cy="0"/>
+        </a:xfrm>
+      </p:grpSpPr>
+      <p:pic>
+        <p:nvPicPr>
+          <p:cNvPr id="5" name="Picture 4">
+            <a:extLst>
+              <a:ext uri="{FF2B5EF4-FFF2-40B4-BE49-F238E27FC236}">
+                <a16:creationId xmlns:a16="http://schemas.microsoft.com/office/drawing/2014/main" id="{02DBA775-E038-4A5D-B5AB-57FDEB498549}"/>
+              </a:ext>
+            </a:extLst>
+          </p:cNvPr>
+          <p:cNvPicPr>
+            <a:picLocks noChangeAspect="1"/>
+          </p:cNvPicPr>
+          <p:nvPr/>
+        </p:nvPicPr>
+        <p:blipFill>
+          <a:blip r:embed="rId2"/>
+          <a:stretch>
+            <a:fillRect/>
+          </a:stretch>
+        </p:blipFill>
+        <p:spPr>
+          <a:xfrm>
+            <a:off x="0" y="1279013"/>
+            <a:ext cx="12192000" cy="4299974"/>
+          </a:xfrm>
+          <a:prstGeom prst="rect">
+            <a:avLst/>
+          </a:prstGeom>
+        </p:spPr>
+      </p:pic>
+      <p:grpSp>
+        <p:nvGrpSpPr>
+          <p:cNvPr id="36" name="Group 35">
+            <a:extLst>
+              <a:ext uri="{FF2B5EF4-FFF2-40B4-BE49-F238E27FC236}">
+                <a16:creationId xmlns:a16="http://schemas.microsoft.com/office/drawing/2014/main" id="{FF966489-5288-4652-BCEC-CD57098BEC6C}"/>
+              </a:ext>
+            </a:extLst>
+          </p:cNvPr>
+          <p:cNvGrpSpPr/>
+          <p:nvPr/>
+        </p:nvGrpSpPr>
+        <p:grpSpPr>
+          <a:xfrm>
+            <a:off x="550545" y="2152645"/>
+            <a:ext cx="11355740" cy="2601402"/>
+            <a:chOff x="579120" y="2171695"/>
+            <a:chExt cx="11355740" cy="2601402"/>
+          </a:xfrm>
+        </p:grpSpPr>
+        <p:grpSp>
+          <p:nvGrpSpPr>
+            <p:cNvPr id="8" name="Group 7">
+              <a:extLst>
+                <a:ext uri="{FF2B5EF4-FFF2-40B4-BE49-F238E27FC236}">
+                  <a16:creationId xmlns:a16="http://schemas.microsoft.com/office/drawing/2014/main" id="{2848A431-9E23-4BA2-BACE-1EBA158D0801}"/>
+                </a:ext>
+              </a:extLst>
+            </p:cNvPr>
+            <p:cNvGrpSpPr/>
+            <p:nvPr/>
+          </p:nvGrpSpPr>
+          <p:grpSpPr>
+            <a:xfrm>
+              <a:off x="579120" y="2171699"/>
+              <a:ext cx="1375155" cy="307778"/>
+              <a:chOff x="579120" y="2171699"/>
+              <a:chExt cx="1375155" cy="307778"/>
+            </a:xfrm>
+          </p:grpSpPr>
+          <p:sp>
+            <p:nvSpPr>
+              <p:cNvPr id="6" name="TextBox 5">
+                <a:extLst>
+                  <a:ext uri="{FF2B5EF4-FFF2-40B4-BE49-F238E27FC236}">
+                    <a16:creationId xmlns:a16="http://schemas.microsoft.com/office/drawing/2014/main" id="{8E238604-ECA4-4142-B300-56F6FE2BEFC6}"/>
+                  </a:ext>
+                </a:extLst>
+              </p:cNvPr>
+              <p:cNvSpPr txBox="1"/>
+              <p:nvPr/>
+            </p:nvSpPr>
+            <p:spPr>
+              <a:xfrm>
+                <a:off x="579120" y="2171700"/>
+                <a:ext cx="498855" cy="307777"/>
+              </a:xfrm>
+              <a:prstGeom prst="rect">
+                <a:avLst/>
+              </a:prstGeom>
+              <a:noFill/>
+            </p:spPr>
+            <p:txBody>
+              <a:bodyPr wrap="none" rtlCol="0">
+                <a:spAutoFit/>
+              </a:bodyPr>
+              <a:lstStyle/>
+              <a:p>
+                <a:r>
+                  <a:rPr lang="pt-BR" sz="1400" b="1" dirty="0">
+                    <a:solidFill>
+                      <a:schemeClr val="bg1"/>
+                    </a:solidFill>
+                  </a:rPr>
+                  <a:t>50%</a:t>
+                </a:r>
+                <a:endParaRPr lang="en-US" sz="1400" b="1" dirty="0">
+                  <a:solidFill>
+                    <a:schemeClr val="bg1"/>
+                  </a:solidFill>
+                </a:endParaRPr>
+              </a:p>
+            </p:txBody>
+          </p:sp>
+          <p:sp>
+            <p:nvSpPr>
+              <p:cNvPr id="7" name="TextBox 6">
+                <a:extLst>
+                  <a:ext uri="{FF2B5EF4-FFF2-40B4-BE49-F238E27FC236}">
+                    <a16:creationId xmlns:a16="http://schemas.microsoft.com/office/drawing/2014/main" id="{139F681A-1A75-49E8-9E59-6F8F8D74F180}"/>
+                  </a:ext>
+                </a:extLst>
+              </p:cNvPr>
+              <p:cNvSpPr txBox="1"/>
+              <p:nvPr/>
+            </p:nvSpPr>
+            <p:spPr>
+              <a:xfrm>
+                <a:off x="1455420" y="2171699"/>
+                <a:ext cx="498855" cy="307777"/>
+              </a:xfrm>
+              <a:prstGeom prst="rect">
+                <a:avLst/>
+              </a:prstGeom>
+              <a:noFill/>
+            </p:spPr>
+            <p:txBody>
+              <a:bodyPr wrap="none" rtlCol="0">
+                <a:spAutoFit/>
+              </a:bodyPr>
+              <a:lstStyle/>
+              <a:p>
+                <a:r>
+                  <a:rPr lang="pt-BR" sz="1400" b="1" dirty="0">
+                    <a:solidFill>
+                      <a:schemeClr val="bg1"/>
+                    </a:solidFill>
+                  </a:rPr>
+                  <a:t>50%</a:t>
+                </a:r>
+                <a:endParaRPr lang="en-US" sz="1400" b="1" dirty="0">
+                  <a:solidFill>
+                    <a:schemeClr val="bg1"/>
+                  </a:solidFill>
+                </a:endParaRPr>
+              </a:p>
+            </p:txBody>
+          </p:sp>
+        </p:grpSp>
+        <p:grpSp>
+          <p:nvGrpSpPr>
+            <p:cNvPr id="9" name="Group 8">
+              <a:extLst>
+                <a:ext uri="{FF2B5EF4-FFF2-40B4-BE49-F238E27FC236}">
+                  <a16:creationId xmlns:a16="http://schemas.microsoft.com/office/drawing/2014/main" id="{EFE97929-220D-4588-9ED6-C66AEE5170E6}"/>
+                </a:ext>
+              </a:extLst>
+            </p:cNvPr>
+            <p:cNvGrpSpPr/>
+            <p:nvPr/>
+          </p:nvGrpSpPr>
+          <p:grpSpPr>
+            <a:xfrm>
+              <a:off x="3070860" y="2171698"/>
+              <a:ext cx="1375155" cy="307778"/>
+              <a:chOff x="579120" y="2171699"/>
+              <a:chExt cx="1375155" cy="307778"/>
+            </a:xfrm>
+          </p:grpSpPr>
+          <p:sp>
+            <p:nvSpPr>
+              <p:cNvPr id="10" name="TextBox 9">
+                <a:extLst>
+                  <a:ext uri="{FF2B5EF4-FFF2-40B4-BE49-F238E27FC236}">
+                    <a16:creationId xmlns:a16="http://schemas.microsoft.com/office/drawing/2014/main" id="{9B0E0DB4-210B-4FF5-B9B6-3CF321328F85}"/>
+                  </a:ext>
+                </a:extLst>
+              </p:cNvPr>
+              <p:cNvSpPr txBox="1"/>
+              <p:nvPr/>
+            </p:nvSpPr>
+            <p:spPr>
+              <a:xfrm>
+                <a:off x="579120" y="2171700"/>
+                <a:ext cx="498855" cy="307777"/>
+              </a:xfrm>
+              <a:prstGeom prst="rect">
+                <a:avLst/>
+              </a:prstGeom>
+              <a:noFill/>
+            </p:spPr>
+            <p:txBody>
+              <a:bodyPr wrap="none" rtlCol="0">
+                <a:spAutoFit/>
+              </a:bodyPr>
+              <a:lstStyle/>
+              <a:p>
+                <a:r>
+                  <a:rPr lang="pt-BR" sz="1400" b="1" dirty="0">
+                    <a:solidFill>
+                      <a:schemeClr val="bg1"/>
+                    </a:solidFill>
+                  </a:rPr>
+                  <a:t>49%</a:t>
+                </a:r>
+                <a:endParaRPr lang="en-US" sz="1400" b="1" dirty="0">
+                  <a:solidFill>
+                    <a:schemeClr val="bg1"/>
+                  </a:solidFill>
+                </a:endParaRPr>
+              </a:p>
+            </p:txBody>
+          </p:sp>
+          <p:sp>
+            <p:nvSpPr>
+              <p:cNvPr id="11" name="TextBox 10">
+                <a:extLst>
+                  <a:ext uri="{FF2B5EF4-FFF2-40B4-BE49-F238E27FC236}">
+                    <a16:creationId xmlns:a16="http://schemas.microsoft.com/office/drawing/2014/main" id="{85859C73-EFF2-40E0-940C-62C4246D582A}"/>
+                  </a:ext>
+                </a:extLst>
+              </p:cNvPr>
+              <p:cNvSpPr txBox="1"/>
+              <p:nvPr/>
+            </p:nvSpPr>
+            <p:spPr>
+              <a:xfrm>
+                <a:off x="1455420" y="2171699"/>
+                <a:ext cx="498855" cy="307777"/>
+              </a:xfrm>
+              <a:prstGeom prst="rect">
+                <a:avLst/>
+              </a:prstGeom>
+              <a:noFill/>
+            </p:spPr>
+            <p:txBody>
+              <a:bodyPr wrap="none" rtlCol="0">
+                <a:spAutoFit/>
+              </a:bodyPr>
+              <a:lstStyle/>
+              <a:p>
+                <a:r>
+                  <a:rPr lang="pt-BR" sz="1400" b="1" dirty="0">
+                    <a:solidFill>
+                      <a:schemeClr val="bg1"/>
+                    </a:solidFill>
+                  </a:rPr>
+                  <a:t>51%</a:t>
+                </a:r>
+                <a:endParaRPr lang="en-US" sz="1400" b="1" dirty="0">
+                  <a:solidFill>
+                    <a:schemeClr val="bg1"/>
+                  </a:solidFill>
+                </a:endParaRPr>
+              </a:p>
+            </p:txBody>
+          </p:sp>
+        </p:grpSp>
+        <p:grpSp>
+          <p:nvGrpSpPr>
+            <p:cNvPr id="12" name="Group 11">
+              <a:extLst>
+                <a:ext uri="{FF2B5EF4-FFF2-40B4-BE49-F238E27FC236}">
+                  <a16:creationId xmlns:a16="http://schemas.microsoft.com/office/drawing/2014/main" id="{8B36A9D6-C0B2-46BC-A6F7-E139B965A8F9}"/>
+                </a:ext>
+              </a:extLst>
+            </p:cNvPr>
+            <p:cNvGrpSpPr/>
+            <p:nvPr/>
+          </p:nvGrpSpPr>
+          <p:grpSpPr>
+            <a:xfrm>
+              <a:off x="5570220" y="2171697"/>
+              <a:ext cx="1375155" cy="307778"/>
+              <a:chOff x="579120" y="2171699"/>
+              <a:chExt cx="1375155" cy="307778"/>
+            </a:xfrm>
+          </p:grpSpPr>
+          <p:sp>
+            <p:nvSpPr>
+              <p:cNvPr id="13" name="TextBox 12">
+                <a:extLst>
+                  <a:ext uri="{FF2B5EF4-FFF2-40B4-BE49-F238E27FC236}">
+                    <a16:creationId xmlns:a16="http://schemas.microsoft.com/office/drawing/2014/main" id="{291A92FC-FAAE-4DF2-AE90-C7B33A596839}"/>
+                  </a:ext>
+                </a:extLst>
+              </p:cNvPr>
+              <p:cNvSpPr txBox="1"/>
+              <p:nvPr/>
+            </p:nvSpPr>
+            <p:spPr>
+              <a:xfrm>
+                <a:off x="579120" y="2171700"/>
+                <a:ext cx="498855" cy="307777"/>
+              </a:xfrm>
+              <a:prstGeom prst="rect">
+                <a:avLst/>
+              </a:prstGeom>
+              <a:noFill/>
+            </p:spPr>
+            <p:txBody>
+              <a:bodyPr wrap="none" rtlCol="0">
+                <a:spAutoFit/>
+              </a:bodyPr>
+              <a:lstStyle/>
+              <a:p>
+                <a:r>
+                  <a:rPr lang="pt-BR" sz="1400" b="1" dirty="0">
+                    <a:solidFill>
+                      <a:schemeClr val="bg1"/>
+                    </a:solidFill>
+                  </a:rPr>
+                  <a:t>49%</a:t>
+                </a:r>
+                <a:endParaRPr lang="en-US" sz="1400" b="1" dirty="0">
+                  <a:solidFill>
+                    <a:schemeClr val="bg1"/>
+                  </a:solidFill>
+                </a:endParaRPr>
+              </a:p>
+            </p:txBody>
+          </p:sp>
+          <p:sp>
+            <p:nvSpPr>
+              <p:cNvPr id="14" name="TextBox 13">
+                <a:extLst>
+                  <a:ext uri="{FF2B5EF4-FFF2-40B4-BE49-F238E27FC236}">
+                    <a16:creationId xmlns:a16="http://schemas.microsoft.com/office/drawing/2014/main" id="{6F8949E6-CC37-40B8-8B52-27B1FDB2C5C1}"/>
+                  </a:ext>
+                </a:extLst>
+              </p:cNvPr>
+              <p:cNvSpPr txBox="1"/>
+              <p:nvPr/>
+            </p:nvSpPr>
+            <p:spPr>
+              <a:xfrm>
+                <a:off x="1455420" y="2171699"/>
+                <a:ext cx="498855" cy="307777"/>
+              </a:xfrm>
+              <a:prstGeom prst="rect">
+                <a:avLst/>
+              </a:prstGeom>
+              <a:noFill/>
+            </p:spPr>
+            <p:txBody>
+              <a:bodyPr wrap="none" rtlCol="0">
+                <a:spAutoFit/>
+              </a:bodyPr>
+              <a:lstStyle/>
+              <a:p>
+                <a:r>
+                  <a:rPr lang="pt-BR" sz="1400" b="1" dirty="0">
+                    <a:solidFill>
+                      <a:schemeClr val="bg1"/>
+                    </a:solidFill>
+                  </a:rPr>
+                  <a:t>51%</a:t>
+                </a:r>
+                <a:endParaRPr lang="en-US" sz="1400" b="1" dirty="0">
+                  <a:solidFill>
+                    <a:schemeClr val="bg1"/>
+                  </a:solidFill>
+                </a:endParaRPr>
+              </a:p>
+            </p:txBody>
+          </p:sp>
+        </p:grpSp>
+        <p:grpSp>
+          <p:nvGrpSpPr>
+            <p:cNvPr id="15" name="Group 14">
+              <a:extLst>
+                <a:ext uri="{FF2B5EF4-FFF2-40B4-BE49-F238E27FC236}">
+                  <a16:creationId xmlns:a16="http://schemas.microsoft.com/office/drawing/2014/main" id="{A12DD572-CEEE-4BC1-BF8D-CCBFE214A29A}"/>
+                </a:ext>
+              </a:extLst>
+            </p:cNvPr>
+            <p:cNvGrpSpPr/>
+            <p:nvPr/>
+          </p:nvGrpSpPr>
+          <p:grpSpPr>
+            <a:xfrm>
+              <a:off x="8054340" y="2171696"/>
+              <a:ext cx="1375155" cy="307778"/>
+              <a:chOff x="579120" y="2171699"/>
+              <a:chExt cx="1375155" cy="307778"/>
+            </a:xfrm>
+          </p:grpSpPr>
+          <p:sp>
+            <p:nvSpPr>
+              <p:cNvPr id="16" name="TextBox 15">
+                <a:extLst>
+                  <a:ext uri="{FF2B5EF4-FFF2-40B4-BE49-F238E27FC236}">
+                    <a16:creationId xmlns:a16="http://schemas.microsoft.com/office/drawing/2014/main" id="{4BCDC8BB-AE43-4D7B-9A2A-AD517CDE0BE3}"/>
+                  </a:ext>
+                </a:extLst>
+              </p:cNvPr>
+              <p:cNvSpPr txBox="1"/>
+              <p:nvPr/>
+            </p:nvSpPr>
+            <p:spPr>
+              <a:xfrm>
+                <a:off x="579120" y="2171700"/>
+                <a:ext cx="498855" cy="307777"/>
+              </a:xfrm>
+              <a:prstGeom prst="rect">
+                <a:avLst/>
+              </a:prstGeom>
+              <a:noFill/>
+            </p:spPr>
+            <p:txBody>
+              <a:bodyPr wrap="none" rtlCol="0">
+                <a:spAutoFit/>
+              </a:bodyPr>
+              <a:lstStyle/>
+              <a:p>
+                <a:r>
+                  <a:rPr lang="pt-BR" sz="1400" b="1" dirty="0">
+                    <a:solidFill>
+                      <a:schemeClr val="bg1"/>
+                    </a:solidFill>
+                  </a:rPr>
+                  <a:t>50%</a:t>
+                </a:r>
+                <a:endParaRPr lang="en-US" sz="1400" b="1" dirty="0">
+                  <a:solidFill>
+                    <a:schemeClr val="bg1"/>
+                  </a:solidFill>
+                </a:endParaRPr>
+              </a:p>
+            </p:txBody>
+          </p:sp>
+          <p:sp>
+            <p:nvSpPr>
+              <p:cNvPr id="17" name="TextBox 16">
+                <a:extLst>
+                  <a:ext uri="{FF2B5EF4-FFF2-40B4-BE49-F238E27FC236}">
+                    <a16:creationId xmlns:a16="http://schemas.microsoft.com/office/drawing/2014/main" id="{39D018F1-FF6C-480B-8EFA-89D6E09A08E5}"/>
+                  </a:ext>
+                </a:extLst>
+              </p:cNvPr>
+              <p:cNvSpPr txBox="1"/>
+              <p:nvPr/>
+            </p:nvSpPr>
+            <p:spPr>
+              <a:xfrm>
+                <a:off x="1455420" y="2171699"/>
+                <a:ext cx="498855" cy="307777"/>
+              </a:xfrm>
+              <a:prstGeom prst="rect">
+                <a:avLst/>
+              </a:prstGeom>
+              <a:noFill/>
+            </p:spPr>
+            <p:txBody>
+              <a:bodyPr wrap="none" rtlCol="0">
+                <a:spAutoFit/>
+              </a:bodyPr>
+              <a:lstStyle/>
+              <a:p>
+                <a:r>
+                  <a:rPr lang="pt-BR" sz="1400" b="1" dirty="0">
+                    <a:solidFill>
+                      <a:schemeClr val="bg1"/>
+                    </a:solidFill>
+                  </a:rPr>
+                  <a:t>50%</a:t>
+                </a:r>
+                <a:endParaRPr lang="en-US" sz="1400" b="1" dirty="0">
+                  <a:solidFill>
+                    <a:schemeClr val="bg1"/>
+                  </a:solidFill>
+                </a:endParaRPr>
+              </a:p>
+            </p:txBody>
+          </p:sp>
+        </p:grpSp>
+        <p:grpSp>
+          <p:nvGrpSpPr>
+            <p:cNvPr id="18" name="Group 17">
+              <a:extLst>
+                <a:ext uri="{FF2B5EF4-FFF2-40B4-BE49-F238E27FC236}">
+                  <a16:creationId xmlns:a16="http://schemas.microsoft.com/office/drawing/2014/main" id="{5299A749-D298-4C8D-AC2E-3B0CACEFD554}"/>
+                </a:ext>
+              </a:extLst>
+            </p:cNvPr>
+            <p:cNvGrpSpPr/>
+            <p:nvPr/>
+          </p:nvGrpSpPr>
+          <p:grpSpPr>
+            <a:xfrm>
+              <a:off x="10546080" y="2171695"/>
+              <a:ext cx="1375155" cy="307778"/>
+              <a:chOff x="579120" y="2171699"/>
+              <a:chExt cx="1375155" cy="307778"/>
+            </a:xfrm>
+          </p:grpSpPr>
+          <p:sp>
+            <p:nvSpPr>
+              <p:cNvPr id="19" name="TextBox 18">
+                <a:extLst>
+                  <a:ext uri="{FF2B5EF4-FFF2-40B4-BE49-F238E27FC236}">
+                    <a16:creationId xmlns:a16="http://schemas.microsoft.com/office/drawing/2014/main" id="{5617C981-BB99-4DAA-8603-0DC4A47D7DE5}"/>
+                  </a:ext>
+                </a:extLst>
+              </p:cNvPr>
+              <p:cNvSpPr txBox="1"/>
+              <p:nvPr/>
+            </p:nvSpPr>
+            <p:spPr>
+              <a:xfrm>
+                <a:off x="579120" y="2171700"/>
+                <a:ext cx="498855" cy="307777"/>
+              </a:xfrm>
+              <a:prstGeom prst="rect">
+                <a:avLst/>
+              </a:prstGeom>
+              <a:noFill/>
+            </p:spPr>
+            <p:txBody>
+              <a:bodyPr wrap="none" rtlCol="0">
+                <a:spAutoFit/>
+              </a:bodyPr>
+              <a:lstStyle/>
+              <a:p>
+                <a:r>
+                  <a:rPr lang="pt-BR" sz="1400" b="1" dirty="0">
+                    <a:solidFill>
+                      <a:schemeClr val="bg1"/>
+                    </a:solidFill>
+                  </a:rPr>
+                  <a:t>49%</a:t>
+                </a:r>
+                <a:endParaRPr lang="en-US" sz="1400" b="1" dirty="0">
+                  <a:solidFill>
+                    <a:schemeClr val="bg1"/>
+                  </a:solidFill>
+                </a:endParaRPr>
+              </a:p>
+            </p:txBody>
+          </p:sp>
+          <p:sp>
+            <p:nvSpPr>
+              <p:cNvPr id="20" name="TextBox 19">
+                <a:extLst>
+                  <a:ext uri="{FF2B5EF4-FFF2-40B4-BE49-F238E27FC236}">
+                    <a16:creationId xmlns:a16="http://schemas.microsoft.com/office/drawing/2014/main" id="{6B7C8F71-5909-47F4-AB11-888E07F86727}"/>
+                  </a:ext>
+                </a:extLst>
+              </p:cNvPr>
+              <p:cNvSpPr txBox="1"/>
+              <p:nvPr/>
+            </p:nvSpPr>
+            <p:spPr>
+              <a:xfrm>
+                <a:off x="1455420" y="2171699"/>
+                <a:ext cx="498855" cy="307777"/>
+              </a:xfrm>
+              <a:prstGeom prst="rect">
+                <a:avLst/>
+              </a:prstGeom>
+              <a:noFill/>
+            </p:spPr>
+            <p:txBody>
+              <a:bodyPr wrap="none" rtlCol="0">
+                <a:spAutoFit/>
+              </a:bodyPr>
+              <a:lstStyle/>
+              <a:p>
+                <a:r>
+                  <a:rPr lang="pt-BR" sz="1400" b="1" dirty="0">
+                    <a:solidFill>
+                      <a:schemeClr val="bg1"/>
+                    </a:solidFill>
+                  </a:rPr>
+                  <a:t>51%</a:t>
+                </a:r>
+                <a:endParaRPr lang="en-US" sz="1400" b="1" dirty="0">
+                  <a:solidFill>
+                    <a:schemeClr val="bg1"/>
+                  </a:solidFill>
+                </a:endParaRPr>
+              </a:p>
+            </p:txBody>
+          </p:sp>
+        </p:grpSp>
+        <p:grpSp>
+          <p:nvGrpSpPr>
+            <p:cNvPr id="21" name="Group 20">
+              <a:extLst>
+                <a:ext uri="{FF2B5EF4-FFF2-40B4-BE49-F238E27FC236}">
+                  <a16:creationId xmlns:a16="http://schemas.microsoft.com/office/drawing/2014/main" id="{938BD4D0-B037-4B46-987B-B70689B93021}"/>
+                </a:ext>
+              </a:extLst>
+            </p:cNvPr>
+            <p:cNvGrpSpPr/>
+            <p:nvPr/>
+          </p:nvGrpSpPr>
+          <p:grpSpPr>
+            <a:xfrm>
+              <a:off x="592745" y="4465319"/>
+              <a:ext cx="1375155" cy="307778"/>
+              <a:chOff x="579120" y="2171699"/>
+              <a:chExt cx="1375155" cy="307778"/>
+            </a:xfrm>
+          </p:grpSpPr>
+          <p:sp>
+            <p:nvSpPr>
+              <p:cNvPr id="22" name="TextBox 21">
+                <a:extLst>
+                  <a:ext uri="{FF2B5EF4-FFF2-40B4-BE49-F238E27FC236}">
+                    <a16:creationId xmlns:a16="http://schemas.microsoft.com/office/drawing/2014/main" id="{DBCBF5E2-FE3B-4528-B5C0-61C3D27DD470}"/>
+                  </a:ext>
+                </a:extLst>
+              </p:cNvPr>
+              <p:cNvSpPr txBox="1"/>
+              <p:nvPr/>
+            </p:nvSpPr>
+            <p:spPr>
+              <a:xfrm>
+                <a:off x="579120" y="2171700"/>
+                <a:ext cx="498855" cy="307777"/>
+              </a:xfrm>
+              <a:prstGeom prst="rect">
+                <a:avLst/>
+              </a:prstGeom>
+              <a:noFill/>
+            </p:spPr>
+            <p:txBody>
+              <a:bodyPr wrap="none" rtlCol="0">
+                <a:spAutoFit/>
+              </a:bodyPr>
+              <a:lstStyle/>
+              <a:p>
+                <a:r>
+                  <a:rPr lang="pt-BR" sz="1400" b="1" dirty="0">
+                    <a:solidFill>
+                      <a:schemeClr val="bg1"/>
+                    </a:solidFill>
+                  </a:rPr>
+                  <a:t>45%</a:t>
+                </a:r>
+                <a:endParaRPr lang="en-US" sz="1400" b="1" dirty="0">
+                  <a:solidFill>
+                    <a:schemeClr val="bg1"/>
+                  </a:solidFill>
+                </a:endParaRPr>
+              </a:p>
+            </p:txBody>
+          </p:sp>
+          <p:sp>
+            <p:nvSpPr>
+              <p:cNvPr id="23" name="TextBox 22">
+                <a:extLst>
+                  <a:ext uri="{FF2B5EF4-FFF2-40B4-BE49-F238E27FC236}">
+                    <a16:creationId xmlns:a16="http://schemas.microsoft.com/office/drawing/2014/main" id="{261B23EF-2FD5-4291-AAFB-87C63D36B2AD}"/>
+                  </a:ext>
+                </a:extLst>
+              </p:cNvPr>
+              <p:cNvSpPr txBox="1"/>
+              <p:nvPr/>
+            </p:nvSpPr>
+            <p:spPr>
+              <a:xfrm>
+                <a:off x="1455420" y="2171699"/>
+                <a:ext cx="498855" cy="307777"/>
+              </a:xfrm>
+              <a:prstGeom prst="rect">
+                <a:avLst/>
+              </a:prstGeom>
+              <a:noFill/>
+            </p:spPr>
+            <p:txBody>
+              <a:bodyPr wrap="none" rtlCol="0">
+                <a:spAutoFit/>
+              </a:bodyPr>
+              <a:lstStyle/>
+              <a:p>
+                <a:r>
+                  <a:rPr lang="pt-BR" sz="1400" b="1" dirty="0">
+                    <a:solidFill>
+                      <a:schemeClr val="bg1"/>
+                    </a:solidFill>
+                  </a:rPr>
+                  <a:t>55%</a:t>
+                </a:r>
+                <a:endParaRPr lang="en-US" sz="1400" b="1" dirty="0">
+                  <a:solidFill>
+                    <a:schemeClr val="bg1"/>
+                  </a:solidFill>
+                </a:endParaRPr>
+              </a:p>
+            </p:txBody>
+          </p:sp>
+        </p:grpSp>
+        <p:grpSp>
+          <p:nvGrpSpPr>
+            <p:cNvPr id="24" name="Group 23">
+              <a:extLst>
+                <a:ext uri="{FF2B5EF4-FFF2-40B4-BE49-F238E27FC236}">
+                  <a16:creationId xmlns:a16="http://schemas.microsoft.com/office/drawing/2014/main" id="{18590F91-6242-4B78-8995-CFDA556DCC1B}"/>
+                </a:ext>
+              </a:extLst>
+            </p:cNvPr>
+            <p:cNvGrpSpPr/>
+            <p:nvPr/>
+          </p:nvGrpSpPr>
+          <p:grpSpPr>
+            <a:xfrm>
+              <a:off x="3084485" y="4465318"/>
+              <a:ext cx="1375155" cy="307778"/>
+              <a:chOff x="579120" y="2171699"/>
+              <a:chExt cx="1375155" cy="307778"/>
+            </a:xfrm>
+          </p:grpSpPr>
+          <p:sp>
+            <p:nvSpPr>
+              <p:cNvPr id="25" name="TextBox 24">
+                <a:extLst>
+                  <a:ext uri="{FF2B5EF4-FFF2-40B4-BE49-F238E27FC236}">
+                    <a16:creationId xmlns:a16="http://schemas.microsoft.com/office/drawing/2014/main" id="{5589C3A3-1061-44B1-B97B-3A599BDF7348}"/>
+                  </a:ext>
+                </a:extLst>
+              </p:cNvPr>
+              <p:cNvSpPr txBox="1"/>
+              <p:nvPr/>
+            </p:nvSpPr>
+            <p:spPr>
+              <a:xfrm>
+                <a:off x="579120" y="2171700"/>
+                <a:ext cx="498855" cy="307777"/>
+              </a:xfrm>
+              <a:prstGeom prst="rect">
+                <a:avLst/>
+              </a:prstGeom>
+              <a:noFill/>
+            </p:spPr>
+            <p:txBody>
+              <a:bodyPr wrap="none" rtlCol="0">
+                <a:spAutoFit/>
+              </a:bodyPr>
+              <a:lstStyle/>
+              <a:p>
+                <a:r>
+                  <a:rPr lang="pt-BR" sz="1400" b="1" dirty="0">
+                    <a:solidFill>
+                      <a:schemeClr val="bg1"/>
+                    </a:solidFill>
+                  </a:rPr>
+                  <a:t>47%</a:t>
+                </a:r>
+                <a:endParaRPr lang="en-US" sz="1400" b="1" dirty="0">
+                  <a:solidFill>
+                    <a:schemeClr val="bg1"/>
+                  </a:solidFill>
+                </a:endParaRPr>
+              </a:p>
+            </p:txBody>
+          </p:sp>
+          <p:sp>
+            <p:nvSpPr>
+              <p:cNvPr id="26" name="TextBox 25">
+                <a:extLst>
+                  <a:ext uri="{FF2B5EF4-FFF2-40B4-BE49-F238E27FC236}">
+                    <a16:creationId xmlns:a16="http://schemas.microsoft.com/office/drawing/2014/main" id="{A2ECAADB-3124-447C-804B-03537A388BA2}"/>
+                  </a:ext>
+                </a:extLst>
+              </p:cNvPr>
+              <p:cNvSpPr txBox="1"/>
+              <p:nvPr/>
+            </p:nvSpPr>
+            <p:spPr>
+              <a:xfrm>
+                <a:off x="1455420" y="2171699"/>
+                <a:ext cx="498855" cy="307777"/>
+              </a:xfrm>
+              <a:prstGeom prst="rect">
+                <a:avLst/>
+              </a:prstGeom>
+              <a:noFill/>
+            </p:spPr>
+            <p:txBody>
+              <a:bodyPr wrap="none" rtlCol="0">
+                <a:spAutoFit/>
+              </a:bodyPr>
+              <a:lstStyle/>
+              <a:p>
+                <a:r>
+                  <a:rPr lang="pt-BR" sz="1400" b="1" dirty="0">
+                    <a:solidFill>
+                      <a:schemeClr val="bg1"/>
+                    </a:solidFill>
+                  </a:rPr>
+                  <a:t>53%</a:t>
+                </a:r>
+                <a:endParaRPr lang="en-US" sz="1400" b="1" dirty="0">
+                  <a:solidFill>
+                    <a:schemeClr val="bg1"/>
+                  </a:solidFill>
+                </a:endParaRPr>
+              </a:p>
+            </p:txBody>
+          </p:sp>
+        </p:grpSp>
+        <p:grpSp>
+          <p:nvGrpSpPr>
+            <p:cNvPr id="27" name="Group 26">
+              <a:extLst>
+                <a:ext uri="{FF2B5EF4-FFF2-40B4-BE49-F238E27FC236}">
+                  <a16:creationId xmlns:a16="http://schemas.microsoft.com/office/drawing/2014/main" id="{D1E6CC4A-3E1D-44F0-9F38-B75A699CEAA5}"/>
+                </a:ext>
+              </a:extLst>
+            </p:cNvPr>
+            <p:cNvGrpSpPr/>
+            <p:nvPr/>
+          </p:nvGrpSpPr>
+          <p:grpSpPr>
+            <a:xfrm>
+              <a:off x="5583845" y="4465317"/>
+              <a:ext cx="1375155" cy="307778"/>
+              <a:chOff x="579120" y="2171699"/>
+              <a:chExt cx="1375155" cy="307778"/>
+            </a:xfrm>
+          </p:grpSpPr>
+          <p:sp>
+            <p:nvSpPr>
+              <p:cNvPr id="28" name="TextBox 27">
+                <a:extLst>
+                  <a:ext uri="{FF2B5EF4-FFF2-40B4-BE49-F238E27FC236}">
+                    <a16:creationId xmlns:a16="http://schemas.microsoft.com/office/drawing/2014/main" id="{6E5A4AFA-F3C7-4A66-A84C-7924B609A6F4}"/>
+                  </a:ext>
+                </a:extLst>
+              </p:cNvPr>
+              <p:cNvSpPr txBox="1"/>
+              <p:nvPr/>
+            </p:nvSpPr>
+            <p:spPr>
+              <a:xfrm>
+                <a:off x="579120" y="2171700"/>
+                <a:ext cx="498855" cy="307777"/>
+              </a:xfrm>
+              <a:prstGeom prst="rect">
+                <a:avLst/>
+              </a:prstGeom>
+              <a:noFill/>
+            </p:spPr>
+            <p:txBody>
+              <a:bodyPr wrap="none" rtlCol="0">
+                <a:spAutoFit/>
+              </a:bodyPr>
+              <a:lstStyle/>
+              <a:p>
+                <a:r>
+                  <a:rPr lang="pt-BR" sz="1400" b="1" dirty="0">
+                    <a:solidFill>
+                      <a:schemeClr val="bg1"/>
+                    </a:solidFill>
+                  </a:rPr>
+                  <a:t>51%</a:t>
+                </a:r>
+                <a:endParaRPr lang="en-US" sz="1400" b="1" dirty="0">
+                  <a:solidFill>
+                    <a:schemeClr val="bg1"/>
+                  </a:solidFill>
+                </a:endParaRPr>
+              </a:p>
+            </p:txBody>
+          </p:sp>
+          <p:sp>
+            <p:nvSpPr>
+              <p:cNvPr id="29" name="TextBox 28">
+                <a:extLst>
+                  <a:ext uri="{FF2B5EF4-FFF2-40B4-BE49-F238E27FC236}">
+                    <a16:creationId xmlns:a16="http://schemas.microsoft.com/office/drawing/2014/main" id="{DEC6FFF2-7740-4077-8B0F-541947D639F8}"/>
+                  </a:ext>
+                </a:extLst>
+              </p:cNvPr>
+              <p:cNvSpPr txBox="1"/>
+              <p:nvPr/>
+            </p:nvSpPr>
+            <p:spPr>
+              <a:xfrm>
+                <a:off x="1455420" y="2171699"/>
+                <a:ext cx="498855" cy="307777"/>
+              </a:xfrm>
+              <a:prstGeom prst="rect">
+                <a:avLst/>
+              </a:prstGeom>
+              <a:noFill/>
+            </p:spPr>
+            <p:txBody>
+              <a:bodyPr wrap="none" rtlCol="0">
+                <a:spAutoFit/>
+              </a:bodyPr>
+              <a:lstStyle/>
+              <a:p>
+                <a:r>
+                  <a:rPr lang="pt-BR" sz="1400" b="1" dirty="0">
+                    <a:solidFill>
+                      <a:schemeClr val="bg1"/>
+                    </a:solidFill>
+                  </a:rPr>
+                  <a:t>48%</a:t>
+                </a:r>
+                <a:endParaRPr lang="en-US" sz="1400" b="1" dirty="0">
+                  <a:solidFill>
+                    <a:schemeClr val="bg1"/>
+                  </a:solidFill>
+                </a:endParaRPr>
+              </a:p>
+            </p:txBody>
+          </p:sp>
+        </p:grpSp>
+        <p:grpSp>
+          <p:nvGrpSpPr>
+            <p:cNvPr id="30" name="Group 29">
+              <a:extLst>
+                <a:ext uri="{FF2B5EF4-FFF2-40B4-BE49-F238E27FC236}">
+                  <a16:creationId xmlns:a16="http://schemas.microsoft.com/office/drawing/2014/main" id="{C16F722E-EBC8-4FE1-AF06-E56FFCC7D1FA}"/>
+                </a:ext>
+              </a:extLst>
+            </p:cNvPr>
+            <p:cNvGrpSpPr/>
+            <p:nvPr/>
+          </p:nvGrpSpPr>
+          <p:grpSpPr>
+            <a:xfrm>
+              <a:off x="8067965" y="4465316"/>
+              <a:ext cx="1375155" cy="307778"/>
+              <a:chOff x="579120" y="2171699"/>
+              <a:chExt cx="1375155" cy="307778"/>
+            </a:xfrm>
+          </p:grpSpPr>
+          <p:sp>
+            <p:nvSpPr>
+              <p:cNvPr id="31" name="TextBox 30">
+                <a:extLst>
+                  <a:ext uri="{FF2B5EF4-FFF2-40B4-BE49-F238E27FC236}">
+                    <a16:creationId xmlns:a16="http://schemas.microsoft.com/office/drawing/2014/main" id="{B551AA17-151C-40D6-8C89-128BAAF347BA}"/>
+                  </a:ext>
+                </a:extLst>
+              </p:cNvPr>
+              <p:cNvSpPr txBox="1"/>
+              <p:nvPr/>
+            </p:nvSpPr>
+            <p:spPr>
+              <a:xfrm>
+                <a:off x="579120" y="2171700"/>
+                <a:ext cx="498855" cy="307777"/>
+              </a:xfrm>
+              <a:prstGeom prst="rect">
+                <a:avLst/>
+              </a:prstGeom>
+              <a:noFill/>
+            </p:spPr>
+            <p:txBody>
+              <a:bodyPr wrap="none" rtlCol="0">
+                <a:spAutoFit/>
+              </a:bodyPr>
+              <a:lstStyle/>
+              <a:p>
+                <a:r>
+                  <a:rPr lang="pt-BR" sz="1400" b="1" dirty="0">
+                    <a:solidFill>
+                      <a:schemeClr val="bg1"/>
+                    </a:solidFill>
+                  </a:rPr>
+                  <a:t>50%</a:t>
+                </a:r>
+                <a:endParaRPr lang="en-US" sz="1400" b="1" dirty="0">
+                  <a:solidFill>
+                    <a:schemeClr val="bg1"/>
+                  </a:solidFill>
+                </a:endParaRPr>
+              </a:p>
+            </p:txBody>
+          </p:sp>
+          <p:sp>
+            <p:nvSpPr>
+              <p:cNvPr id="32" name="TextBox 31">
+                <a:extLst>
+                  <a:ext uri="{FF2B5EF4-FFF2-40B4-BE49-F238E27FC236}">
+                    <a16:creationId xmlns:a16="http://schemas.microsoft.com/office/drawing/2014/main" id="{EFFBF39E-14F6-4F13-B51C-5E6B8DCB1BB7}"/>
+                  </a:ext>
+                </a:extLst>
+              </p:cNvPr>
+              <p:cNvSpPr txBox="1"/>
+              <p:nvPr/>
+            </p:nvSpPr>
+            <p:spPr>
+              <a:xfrm>
+                <a:off x="1455420" y="2171699"/>
+                <a:ext cx="498855" cy="307777"/>
+              </a:xfrm>
+              <a:prstGeom prst="rect">
+                <a:avLst/>
+              </a:prstGeom>
+              <a:noFill/>
+            </p:spPr>
+            <p:txBody>
+              <a:bodyPr wrap="none" rtlCol="0">
+                <a:spAutoFit/>
+              </a:bodyPr>
+              <a:lstStyle/>
+              <a:p>
+                <a:r>
+                  <a:rPr lang="pt-BR" sz="1400" b="1" dirty="0">
+                    <a:solidFill>
+                      <a:schemeClr val="bg1"/>
+                    </a:solidFill>
+                  </a:rPr>
+                  <a:t>50%</a:t>
+                </a:r>
+                <a:endParaRPr lang="en-US" sz="1400" b="1" dirty="0">
+                  <a:solidFill>
+                    <a:schemeClr val="bg1"/>
+                  </a:solidFill>
+                </a:endParaRPr>
+              </a:p>
+            </p:txBody>
+          </p:sp>
+        </p:grpSp>
+        <p:grpSp>
+          <p:nvGrpSpPr>
+            <p:cNvPr id="33" name="Group 32">
+              <a:extLst>
+                <a:ext uri="{FF2B5EF4-FFF2-40B4-BE49-F238E27FC236}">
+                  <a16:creationId xmlns:a16="http://schemas.microsoft.com/office/drawing/2014/main" id="{04220A23-A38D-4235-BE5B-E58CFB94CB9B}"/>
+                </a:ext>
+              </a:extLst>
+            </p:cNvPr>
+            <p:cNvGrpSpPr/>
+            <p:nvPr/>
+          </p:nvGrpSpPr>
+          <p:grpSpPr>
+            <a:xfrm>
+              <a:off x="10559705" y="4465315"/>
+              <a:ext cx="1375155" cy="307778"/>
+              <a:chOff x="579120" y="2171699"/>
+              <a:chExt cx="1375155" cy="307778"/>
+            </a:xfrm>
+          </p:grpSpPr>
+          <p:sp>
+            <p:nvSpPr>
+              <p:cNvPr id="34" name="TextBox 33">
+                <a:extLst>
+                  <a:ext uri="{FF2B5EF4-FFF2-40B4-BE49-F238E27FC236}">
+                    <a16:creationId xmlns:a16="http://schemas.microsoft.com/office/drawing/2014/main" id="{71178028-EC99-4DE5-93E1-79DD0A882206}"/>
+                  </a:ext>
+                </a:extLst>
+              </p:cNvPr>
+              <p:cNvSpPr txBox="1"/>
+              <p:nvPr/>
+            </p:nvSpPr>
+            <p:spPr>
+              <a:xfrm>
+                <a:off x="579120" y="2171700"/>
+                <a:ext cx="498855" cy="307777"/>
+              </a:xfrm>
+              <a:prstGeom prst="rect">
+                <a:avLst/>
+              </a:prstGeom>
+              <a:noFill/>
+            </p:spPr>
+            <p:txBody>
+              <a:bodyPr wrap="none" rtlCol="0">
+                <a:spAutoFit/>
+              </a:bodyPr>
+              <a:lstStyle/>
+              <a:p>
+                <a:r>
+                  <a:rPr lang="pt-BR" sz="1400" b="1" dirty="0">
+                    <a:solidFill>
+                      <a:schemeClr val="bg1"/>
+                    </a:solidFill>
+                  </a:rPr>
+                  <a:t>50%</a:t>
+                </a:r>
+                <a:endParaRPr lang="en-US" sz="1400" b="1" dirty="0">
+                  <a:solidFill>
+                    <a:schemeClr val="bg1"/>
+                  </a:solidFill>
+                </a:endParaRPr>
+              </a:p>
+            </p:txBody>
+          </p:sp>
+          <p:sp>
+            <p:nvSpPr>
+              <p:cNvPr id="35" name="TextBox 34">
+                <a:extLst>
+                  <a:ext uri="{FF2B5EF4-FFF2-40B4-BE49-F238E27FC236}">
+                    <a16:creationId xmlns:a16="http://schemas.microsoft.com/office/drawing/2014/main" id="{7B4C97F6-EC9F-4E9D-BE51-C6A94EB7A600}"/>
+                  </a:ext>
+                </a:extLst>
+              </p:cNvPr>
+              <p:cNvSpPr txBox="1"/>
+              <p:nvPr/>
+            </p:nvSpPr>
+            <p:spPr>
+              <a:xfrm>
+                <a:off x="1455420" y="2171699"/>
+                <a:ext cx="498855" cy="307777"/>
+              </a:xfrm>
+              <a:prstGeom prst="rect">
+                <a:avLst/>
+              </a:prstGeom>
+              <a:noFill/>
+            </p:spPr>
+            <p:txBody>
+              <a:bodyPr wrap="none" rtlCol="0">
+                <a:spAutoFit/>
+              </a:bodyPr>
+              <a:lstStyle/>
+              <a:p>
+                <a:r>
+                  <a:rPr lang="pt-BR" sz="1400" b="1" dirty="0">
+                    <a:solidFill>
+                      <a:schemeClr val="bg1"/>
+                    </a:solidFill>
+                  </a:rPr>
+                  <a:t>50%</a:t>
+                </a:r>
+                <a:endParaRPr lang="en-US" sz="1400" b="1" dirty="0">
+                  <a:solidFill>
+                    <a:schemeClr val="bg1"/>
+                  </a:solidFill>
+                </a:endParaRPr>
+              </a:p>
+            </p:txBody>
+          </p:sp>
+        </p:grpSp>
+      </p:grpSp>
+    </p:spTree>
+    <p:extLst>
+      <p:ext uri="{BB962C8B-B14F-4D97-AF65-F5344CB8AC3E}">
+        <p14:creationId xmlns:p14="http://schemas.microsoft.com/office/powerpoint/2010/main" val="27234699"/>
       </p:ext>
     </p:extLst>
   </p:cSld>
@@ -13537,4 +15345,299 @@
     </a:ext>
   </a:extLst>
 </a:theme>
+</file>
+
+<file path=ppt/theme/theme2.xml><?xml version="1.0" encoding="utf-8"?>
+<a:theme xmlns:a="http://schemas.openxmlformats.org/drawingml/2006/main" name="Office Theme">
+  <a:themeElements>
+    <a:clrScheme name="Office">
+      <a:dk1>
+        <a:sysClr val="windowText" lastClr="000000"/>
+      </a:dk1>
+      <a:lt1>
+        <a:sysClr val="window" lastClr="FFFFFF"/>
+      </a:lt1>
+      <a:dk2>
+        <a:srgbClr val="44546A"/>
+      </a:dk2>
+      <a:lt2>
+        <a:srgbClr val="E7E6E6"/>
+      </a:lt2>
+      <a:accent1>
+        <a:srgbClr val="4472C4"/>
+      </a:accent1>
+      <a:accent2>
+        <a:srgbClr val="ED7D31"/>
+      </a:accent2>
+      <a:accent3>
+        <a:srgbClr val="A5A5A5"/>
+      </a:accent3>
+      <a:accent4>
+        <a:srgbClr val="FFC000"/>
+      </a:accent4>
+      <a:accent5>
+        <a:srgbClr val="5B9BD5"/>
+      </a:accent5>
+      <a:accent6>
+        <a:srgbClr val="70AD47"/>
+      </a:accent6>
+      <a:hlink>
+        <a:srgbClr val="0563C1"/>
+      </a:hlink>
+      <a:folHlink>
+        <a:srgbClr val="954F72"/>
+      </a:folHlink>
+    </a:clrScheme>
+    <a:fontScheme name="Office">
+      <a:majorFont>
+        <a:latin typeface="Calibri Light" panose="020F0302020204030204"/>
+        <a:ea typeface=""/>
+        <a:cs typeface=""/>
+        <a:font script="Jpan" typeface="游ゴシック Light"/>
+        <a:font script="Hang" typeface="맑은 고딕"/>
+        <a:font script="Hans" typeface="等线 Light"/>
+        <a:font script="Hant" typeface="新細明體"/>
+        <a:font script="Arab" typeface="Times New Roman"/>
+        <a:font script="Hebr" typeface="Times New Roman"/>
+        <a:font script="Thai" typeface="Angsana New"/>
+        <a:font script="Ethi" typeface="Nyala"/>
+        <a:font script="Beng" typeface="Vrinda"/>
+        <a:font script="Gujr" typeface="Shruti"/>
+        <a:font script="Khmr" typeface="MoolBoran"/>
+        <a:font script="Knda" typeface="Tunga"/>
+        <a:font script="Guru" typeface="Raavi"/>
+        <a:font script="Cans" typeface="Euphemia"/>
+        <a:font script="Cher" typeface="Plantagenet Cherokee"/>
+        <a:font script="Yiii" typeface="Microsoft Yi Baiti"/>
+        <a:font script="Tibt" typeface="Microsoft Himalaya"/>
+        <a:font script="Thaa" typeface="MV Boli"/>
+        <a:font script="Deva" typeface="Mangal"/>
+        <a:font script="Telu" typeface="Gautami"/>
+        <a:font script="Taml" typeface="Latha"/>
+        <a:font script="Syrc" typeface="Estrangelo Edessa"/>
+        <a:font script="Orya" typeface="Kalinga"/>
+        <a:font script="Mlym" typeface="Kartika"/>
+        <a:font script="Laoo" typeface="DokChampa"/>
+        <a:font script="Sinh" typeface="Iskoola Pota"/>
+        <a:font script="Mong" typeface="Mongolian Baiti"/>
+        <a:font script="Viet" typeface="Times New Roman"/>
+        <a:font script="Uigh" typeface="Microsoft Uighur"/>
+        <a:font script="Geor" typeface="Sylfaen"/>
+        <a:font script="Armn" typeface="Arial"/>
+        <a:font script="Bugi" typeface="Leelawadee UI"/>
+        <a:font script="Bopo" typeface="Microsoft JhengHei"/>
+        <a:font script="Java" typeface="Javanese Text"/>
+        <a:font script="Lisu" typeface="Segoe UI"/>
+        <a:font script="Mymr" typeface="Myanmar Text"/>
+        <a:font script="Nkoo" typeface="Ebrima"/>
+        <a:font script="Olck" typeface="Nirmala UI"/>
+        <a:font script="Osma" typeface="Ebrima"/>
+        <a:font script="Phag" typeface="Phagspa"/>
+        <a:font script="Syrn" typeface="Estrangelo Edessa"/>
+        <a:font script="Syrj" typeface="Estrangelo Edessa"/>
+        <a:font script="Syre" typeface="Estrangelo Edessa"/>
+        <a:font script="Sora" typeface="Nirmala UI"/>
+        <a:font script="Tale" typeface="Microsoft Tai Le"/>
+        <a:font script="Talu" typeface="Microsoft New Tai Lue"/>
+        <a:font script="Tfng" typeface="Ebrima"/>
+      </a:majorFont>
+      <a:minorFont>
+        <a:latin typeface="Calibri" panose="020F0502020204030204"/>
+        <a:ea typeface=""/>
+        <a:cs typeface=""/>
+        <a:font script="Jpan" typeface="游ゴシック"/>
+        <a:font script="Hang" typeface="맑은 고딕"/>
+        <a:font script="Hans" typeface="等线"/>
+        <a:font script="Hant" typeface="新細明體"/>
+        <a:font script="Arab" typeface="Arial"/>
+        <a:font script="Hebr" typeface="Arial"/>
+        <a:font script="Thai" typeface="Cordia New"/>
+        <a:font script="Ethi" typeface="Nyala"/>
+        <a:font script="Beng" typeface="Vrinda"/>
+        <a:font script="Gujr" typeface="Shruti"/>
+        <a:font script="Khmr" typeface="DaunPenh"/>
+        <a:font script="Knda" typeface="Tunga"/>
+        <a:font script="Guru" typeface="Raavi"/>
+        <a:font script="Cans" typeface="Euphemia"/>
+        <a:font script="Cher" typeface="Plantagenet Cherokee"/>
+        <a:font script="Yiii" typeface="Microsoft Yi Baiti"/>
+        <a:font script="Tibt" typeface="Microsoft Himalaya"/>
+        <a:font script="Thaa" typeface="MV Boli"/>
+        <a:font script="Deva" typeface="Mangal"/>
+        <a:font script="Telu" typeface="Gautami"/>
+        <a:font script="Taml" typeface="Latha"/>
+        <a:font script="Syrc" typeface="Estrangelo Edessa"/>
+        <a:font script="Orya" typeface="Kalinga"/>
+        <a:font script="Mlym" typeface="Kartika"/>
+        <a:font script="Laoo" typeface="DokChampa"/>
+        <a:font script="Sinh" typeface="Iskoola Pota"/>
+        <a:font script="Mong" typeface="Mongolian Baiti"/>
+        <a:font script="Viet" typeface="Arial"/>
+        <a:font script="Uigh" typeface="Microsoft Uighur"/>
+        <a:font script="Geor" typeface="Sylfaen"/>
+        <a:font script="Armn" typeface="Arial"/>
+        <a:font script="Bugi" typeface="Leelawadee UI"/>
+        <a:font script="Bopo" typeface="Microsoft JhengHei"/>
+        <a:font script="Java" typeface="Javanese Text"/>
+        <a:font script="Lisu" typeface="Segoe UI"/>
+        <a:font script="Mymr" typeface="Myanmar Text"/>
+        <a:font script="Nkoo" typeface="Ebrima"/>
+        <a:font script="Olck" typeface="Nirmala UI"/>
+        <a:font script="Osma" typeface="Ebrima"/>
+        <a:font script="Phag" typeface="Phagspa"/>
+        <a:font script="Syrn" typeface="Estrangelo Edessa"/>
+        <a:font script="Syrj" typeface="Estrangelo Edessa"/>
+        <a:font script="Syre" typeface="Estrangelo Edessa"/>
+        <a:font script="Sora" typeface="Nirmala UI"/>
+        <a:font script="Tale" typeface="Microsoft Tai Le"/>
+        <a:font script="Talu" typeface="Microsoft New Tai Lue"/>
+        <a:font script="Tfng" typeface="Ebrima"/>
+      </a:minorFont>
+    </a:fontScheme>
+    <a:fmtScheme name="Office">
+      <a:fillStyleLst>
+        <a:solidFill>
+          <a:schemeClr val="phClr"/>
+        </a:solidFill>
+        <a:gradFill rotWithShape="1">
+          <a:gsLst>
+            <a:gs pos="0">
+              <a:schemeClr val="phClr">
+                <a:lumMod val="110000"/>
+                <a:satMod val="105000"/>
+                <a:tint val="67000"/>
+              </a:schemeClr>
+            </a:gs>
+            <a:gs pos="50000">
+              <a:schemeClr val="phClr">
+                <a:lumMod val="105000"/>
+                <a:satMod val="103000"/>
+                <a:tint val="73000"/>
+              </a:schemeClr>
+            </a:gs>
+            <a:gs pos="100000">
+              <a:schemeClr val="phClr">
+                <a:lumMod val="105000"/>
+                <a:satMod val="109000"/>
+                <a:tint val="81000"/>
+              </a:schemeClr>
+            </a:gs>
+          </a:gsLst>
+          <a:lin ang="5400000" scaled="0"/>
+        </a:gradFill>
+        <a:gradFill rotWithShape="1">
+          <a:gsLst>
+            <a:gs pos="0">
+              <a:schemeClr val="phClr">
+                <a:satMod val="103000"/>
+                <a:lumMod val="102000"/>
+                <a:tint val="94000"/>
+              </a:schemeClr>
+            </a:gs>
+            <a:gs pos="50000">
+              <a:schemeClr val="phClr">
+                <a:satMod val="110000"/>
+                <a:lumMod val="100000"/>
+                <a:shade val="100000"/>
+              </a:schemeClr>
+            </a:gs>
+            <a:gs pos="100000">
+              <a:schemeClr val="phClr">
+                <a:lumMod val="99000"/>
+                <a:satMod val="120000"/>
+                <a:shade val="78000"/>
+              </a:schemeClr>
+            </a:gs>
+          </a:gsLst>
+          <a:lin ang="5400000" scaled="0"/>
+        </a:gradFill>
+      </a:fillStyleLst>
+      <a:lnStyleLst>
+        <a:ln w="6350" cap="flat" cmpd="sng" algn="ctr">
+          <a:solidFill>
+            <a:schemeClr val="phClr"/>
+          </a:solidFill>
+          <a:prstDash val="solid"/>
+          <a:miter lim="800000"/>
+        </a:ln>
+        <a:ln w="12700" cap="flat" cmpd="sng" algn="ctr">
+          <a:solidFill>
+            <a:schemeClr val="phClr"/>
+          </a:solidFill>
+          <a:prstDash val="solid"/>
+          <a:miter lim="800000"/>
+        </a:ln>
+        <a:ln w="19050" cap="flat" cmpd="sng" algn="ctr">
+          <a:solidFill>
+            <a:schemeClr val="phClr"/>
+          </a:solidFill>
+          <a:prstDash val="solid"/>
+          <a:miter lim="800000"/>
+        </a:ln>
+      </a:lnStyleLst>
+      <a:effectStyleLst>
+        <a:effectStyle>
+          <a:effectLst/>
+        </a:effectStyle>
+        <a:effectStyle>
+          <a:effectLst/>
+        </a:effectStyle>
+        <a:effectStyle>
+          <a:effectLst>
+            <a:outerShdw blurRad="57150" dist="19050" dir="5400000" algn="ctr" rotWithShape="0">
+              <a:srgbClr val="000000">
+                <a:alpha val="63000"/>
+              </a:srgbClr>
+            </a:outerShdw>
+          </a:effectLst>
+        </a:effectStyle>
+      </a:effectStyleLst>
+      <a:bgFillStyleLst>
+        <a:solidFill>
+          <a:schemeClr val="phClr"/>
+        </a:solidFill>
+        <a:solidFill>
+          <a:schemeClr val="phClr">
+            <a:tint val="95000"/>
+            <a:satMod val="170000"/>
+          </a:schemeClr>
+        </a:solidFill>
+        <a:gradFill rotWithShape="1">
+          <a:gsLst>
+            <a:gs pos="0">
+              <a:schemeClr val="phClr">
+                <a:tint val="93000"/>
+                <a:satMod val="150000"/>
+                <a:shade val="98000"/>
+                <a:lumMod val="102000"/>
+              </a:schemeClr>
+            </a:gs>
+            <a:gs pos="50000">
+              <a:schemeClr val="phClr">
+                <a:tint val="98000"/>
+                <a:satMod val="130000"/>
+                <a:shade val="90000"/>
+                <a:lumMod val="103000"/>
+              </a:schemeClr>
+            </a:gs>
+            <a:gs pos="100000">
+              <a:schemeClr val="phClr">
+                <a:shade val="63000"/>
+                <a:satMod val="120000"/>
+              </a:schemeClr>
+            </a:gs>
+          </a:gsLst>
+          <a:lin ang="5400000" scaled="0"/>
+        </a:gradFill>
+      </a:bgFillStyleLst>
+    </a:fmtScheme>
+  </a:themeElements>
+  <a:objectDefaults/>
+  <a:extraClrSchemeLst/>
+  <a:extLst>
+    <a:ext uri="{05A4C25C-085E-4340-85A3-A5531E510DB2}">
+      <thm15:themeFamily xmlns:thm15="http://schemas.microsoft.com/office/thememl/2012/main" name="Office Theme" id="{62F939B6-93AF-4DB8-9C6B-D6C7DFDC589F}" vid="{4A3C46E8-61CC-4603-A589-7422A47A8E4A}"/>
+    </a:ext>
+  </a:extLst>
+</a:theme>
 </file>
</xml_diff>

<commit_message>
TCC - Revisão Final
</commit_message>
<xml_diff>
--- a/Documentation/AudioSegmentation.pptx
+++ b/Documentation/AudioSegmentation.pptx
@@ -5,7 +5,7 @@
     <p:sldMasterId id="2147483648" r:id="rId1"/>
   </p:sldMasterIdLst>
   <p:notesMasterIdLst>
-    <p:notesMasterId r:id="rId9"/>
+    <p:notesMasterId r:id="rId11"/>
   </p:notesMasterIdLst>
   <p:sldIdLst>
     <p:sldId id="256" r:id="rId2"/>
@@ -15,6 +15,8 @@
     <p:sldId id="260" r:id="rId6"/>
     <p:sldId id="261" r:id="rId7"/>
     <p:sldId id="262" r:id="rId8"/>
+    <p:sldId id="263" r:id="rId9"/>
+    <p:sldId id="264" r:id="rId10"/>
   </p:sldIdLst>
   <p:sldSz cx="12192000" cy="6858000"/>
   <p:notesSz cx="6858000" cy="9144000"/>
@@ -203,7 +205,7 @@
           <a:p>
             <a:fld id="{85BCF1DB-A6DC-410E-84CD-E4B7C0AA92AF}" type="datetimeFigureOut">
               <a:rPr lang="en-US" smtClean="0"/>
-              <a:t>12/29/2022</a:t>
+              <a:t>2/27/2023</a:t>
             </a:fld>
             <a:endParaRPr lang="en-US"/>
           </a:p>
@@ -617,7 +619,7 @@
           <a:p>
             <a:fld id="{3B90312C-5D04-492E-8CFD-2D0A49CD6FBA}" type="datetimeFigureOut">
               <a:rPr lang="en-US" smtClean="0"/>
-              <a:t>12/26/2022</a:t>
+              <a:t>2/27/2023</a:t>
             </a:fld>
             <a:endParaRPr lang="en-US"/>
           </a:p>
@@ -815,7 +817,7 @@
           <a:p>
             <a:fld id="{3B90312C-5D04-492E-8CFD-2D0A49CD6FBA}" type="datetimeFigureOut">
               <a:rPr lang="en-US" smtClean="0"/>
-              <a:t>12/26/2022</a:t>
+              <a:t>2/27/2023</a:t>
             </a:fld>
             <a:endParaRPr lang="en-US"/>
           </a:p>
@@ -1023,7 +1025,7 @@
           <a:p>
             <a:fld id="{3B90312C-5D04-492E-8CFD-2D0A49CD6FBA}" type="datetimeFigureOut">
               <a:rPr lang="en-US" smtClean="0"/>
-              <a:t>12/26/2022</a:t>
+              <a:t>2/27/2023</a:t>
             </a:fld>
             <a:endParaRPr lang="en-US"/>
           </a:p>
@@ -1221,7 +1223,7 @@
           <a:p>
             <a:fld id="{3B90312C-5D04-492E-8CFD-2D0A49CD6FBA}" type="datetimeFigureOut">
               <a:rPr lang="en-US" smtClean="0"/>
-              <a:t>12/26/2022</a:t>
+              <a:t>2/27/2023</a:t>
             </a:fld>
             <a:endParaRPr lang="en-US"/>
           </a:p>
@@ -1496,7 +1498,7 @@
           <a:p>
             <a:fld id="{3B90312C-5D04-492E-8CFD-2D0A49CD6FBA}" type="datetimeFigureOut">
               <a:rPr lang="en-US" smtClean="0"/>
-              <a:t>12/26/2022</a:t>
+              <a:t>2/27/2023</a:t>
             </a:fld>
             <a:endParaRPr lang="en-US"/>
           </a:p>
@@ -1761,7 +1763,7 @@
           <a:p>
             <a:fld id="{3B90312C-5D04-492E-8CFD-2D0A49CD6FBA}" type="datetimeFigureOut">
               <a:rPr lang="en-US" smtClean="0"/>
-              <a:t>12/26/2022</a:t>
+              <a:t>2/27/2023</a:t>
             </a:fld>
             <a:endParaRPr lang="en-US"/>
           </a:p>
@@ -2173,7 +2175,7 @@
           <a:p>
             <a:fld id="{3B90312C-5D04-492E-8CFD-2D0A49CD6FBA}" type="datetimeFigureOut">
               <a:rPr lang="en-US" smtClean="0"/>
-              <a:t>12/26/2022</a:t>
+              <a:t>2/27/2023</a:t>
             </a:fld>
             <a:endParaRPr lang="en-US"/>
           </a:p>
@@ -2314,7 +2316,7 @@
           <a:p>
             <a:fld id="{3B90312C-5D04-492E-8CFD-2D0A49CD6FBA}" type="datetimeFigureOut">
               <a:rPr lang="en-US" smtClean="0"/>
-              <a:t>12/26/2022</a:t>
+              <a:t>2/27/2023</a:t>
             </a:fld>
             <a:endParaRPr lang="en-US"/>
           </a:p>
@@ -2427,7 +2429,7 @@
           <a:p>
             <a:fld id="{3B90312C-5D04-492E-8CFD-2D0A49CD6FBA}" type="datetimeFigureOut">
               <a:rPr lang="en-US" smtClean="0"/>
-              <a:t>12/26/2022</a:t>
+              <a:t>2/27/2023</a:t>
             </a:fld>
             <a:endParaRPr lang="en-US"/>
           </a:p>
@@ -2738,7 +2740,7 @@
           <a:p>
             <a:fld id="{3B90312C-5D04-492E-8CFD-2D0A49CD6FBA}" type="datetimeFigureOut">
               <a:rPr lang="en-US" smtClean="0"/>
-              <a:t>12/26/2022</a:t>
+              <a:t>2/27/2023</a:t>
             </a:fld>
             <a:endParaRPr lang="en-US"/>
           </a:p>
@@ -3026,7 +3028,7 @@
           <a:p>
             <a:fld id="{3B90312C-5D04-492E-8CFD-2D0A49CD6FBA}" type="datetimeFigureOut">
               <a:rPr lang="en-US" smtClean="0"/>
-              <a:t>12/26/2022</a:t>
+              <a:t>2/27/2023</a:t>
             </a:fld>
             <a:endParaRPr lang="en-US"/>
           </a:p>
@@ -3267,7 +3269,7 @@
           <a:p>
             <a:fld id="{3B90312C-5D04-492E-8CFD-2D0A49CD6FBA}" type="datetimeFigureOut">
               <a:rPr lang="en-US" smtClean="0"/>
-              <a:t>12/26/2022</a:t>
+              <a:t>2/27/2023</a:t>
             </a:fld>
             <a:endParaRPr lang="en-US"/>
           </a:p>
@@ -15052,6 +15054,2564 @@
 </p:sld>
 </file>
 
+<file path=ppt/slides/slide8.xml><?xml version="1.0" encoding="utf-8"?>
+<p:sld xmlns:a="http://schemas.openxmlformats.org/drawingml/2006/main" xmlns:r="http://schemas.openxmlformats.org/officeDocument/2006/relationships" xmlns:p="http://schemas.openxmlformats.org/presentationml/2006/main">
+  <p:cSld>
+    <p:spTree>
+      <p:nvGrpSpPr>
+        <p:cNvPr id="1" name=""/>
+        <p:cNvGrpSpPr/>
+        <p:nvPr/>
+      </p:nvGrpSpPr>
+      <p:grpSpPr>
+        <a:xfrm>
+          <a:off x="0" y="0"/>
+          <a:ext cx="0" cy="0"/>
+          <a:chOff x="0" y="0"/>
+          <a:chExt cx="0" cy="0"/>
+        </a:xfrm>
+      </p:grpSpPr>
+      <p:grpSp>
+        <p:nvGrpSpPr>
+          <p:cNvPr id="36" name="Group 35">
+            <a:extLst>
+              <a:ext uri="{FF2B5EF4-FFF2-40B4-BE49-F238E27FC236}">
+                <a16:creationId xmlns:a16="http://schemas.microsoft.com/office/drawing/2014/main" id="{FF966489-5288-4652-BCEC-CD57098BEC6C}"/>
+              </a:ext>
+            </a:extLst>
+          </p:cNvPr>
+          <p:cNvGrpSpPr/>
+          <p:nvPr/>
+        </p:nvGrpSpPr>
+        <p:grpSpPr>
+          <a:xfrm>
+            <a:off x="550545" y="2152645"/>
+            <a:ext cx="11355740" cy="2601402"/>
+            <a:chOff x="579120" y="2171695"/>
+            <a:chExt cx="11355740" cy="2601402"/>
+          </a:xfrm>
+        </p:grpSpPr>
+        <p:grpSp>
+          <p:nvGrpSpPr>
+            <p:cNvPr id="8" name="Group 7">
+              <a:extLst>
+                <a:ext uri="{FF2B5EF4-FFF2-40B4-BE49-F238E27FC236}">
+                  <a16:creationId xmlns:a16="http://schemas.microsoft.com/office/drawing/2014/main" id="{2848A431-9E23-4BA2-BACE-1EBA158D0801}"/>
+                </a:ext>
+              </a:extLst>
+            </p:cNvPr>
+            <p:cNvGrpSpPr/>
+            <p:nvPr/>
+          </p:nvGrpSpPr>
+          <p:grpSpPr>
+            <a:xfrm>
+              <a:off x="579120" y="2171699"/>
+              <a:ext cx="1375155" cy="307778"/>
+              <a:chOff x="579120" y="2171699"/>
+              <a:chExt cx="1375155" cy="307778"/>
+            </a:xfrm>
+          </p:grpSpPr>
+          <p:sp>
+            <p:nvSpPr>
+              <p:cNvPr id="6" name="TextBox 5">
+                <a:extLst>
+                  <a:ext uri="{FF2B5EF4-FFF2-40B4-BE49-F238E27FC236}">
+                    <a16:creationId xmlns:a16="http://schemas.microsoft.com/office/drawing/2014/main" id="{8E238604-ECA4-4142-B300-56F6FE2BEFC6}"/>
+                  </a:ext>
+                </a:extLst>
+              </p:cNvPr>
+              <p:cNvSpPr txBox="1"/>
+              <p:nvPr/>
+            </p:nvSpPr>
+            <p:spPr>
+              <a:xfrm>
+                <a:off x="579120" y="2171700"/>
+                <a:ext cx="498855" cy="307777"/>
+              </a:xfrm>
+              <a:prstGeom prst="rect">
+                <a:avLst/>
+              </a:prstGeom>
+              <a:noFill/>
+            </p:spPr>
+            <p:txBody>
+              <a:bodyPr wrap="none" rtlCol="0">
+                <a:spAutoFit/>
+              </a:bodyPr>
+              <a:lstStyle/>
+              <a:p>
+                <a:r>
+                  <a:rPr lang="pt-BR" sz="1400" b="1" dirty="0">
+                    <a:solidFill>
+                      <a:schemeClr val="bg1"/>
+                    </a:solidFill>
+                  </a:rPr>
+                  <a:t>50%</a:t>
+                </a:r>
+                <a:endParaRPr lang="en-US" sz="1400" b="1" dirty="0">
+                  <a:solidFill>
+                    <a:schemeClr val="bg1"/>
+                  </a:solidFill>
+                </a:endParaRPr>
+              </a:p>
+            </p:txBody>
+          </p:sp>
+          <p:sp>
+            <p:nvSpPr>
+              <p:cNvPr id="7" name="TextBox 6">
+                <a:extLst>
+                  <a:ext uri="{FF2B5EF4-FFF2-40B4-BE49-F238E27FC236}">
+                    <a16:creationId xmlns:a16="http://schemas.microsoft.com/office/drawing/2014/main" id="{139F681A-1A75-49E8-9E59-6F8F8D74F180}"/>
+                  </a:ext>
+                </a:extLst>
+              </p:cNvPr>
+              <p:cNvSpPr txBox="1"/>
+              <p:nvPr/>
+            </p:nvSpPr>
+            <p:spPr>
+              <a:xfrm>
+                <a:off x="1455420" y="2171699"/>
+                <a:ext cx="498855" cy="307777"/>
+              </a:xfrm>
+              <a:prstGeom prst="rect">
+                <a:avLst/>
+              </a:prstGeom>
+              <a:noFill/>
+            </p:spPr>
+            <p:txBody>
+              <a:bodyPr wrap="none" rtlCol="0">
+                <a:spAutoFit/>
+              </a:bodyPr>
+              <a:lstStyle/>
+              <a:p>
+                <a:r>
+                  <a:rPr lang="pt-BR" sz="1400" b="1" dirty="0">
+                    <a:solidFill>
+                      <a:schemeClr val="bg1"/>
+                    </a:solidFill>
+                  </a:rPr>
+                  <a:t>50%</a:t>
+                </a:r>
+                <a:endParaRPr lang="en-US" sz="1400" b="1" dirty="0">
+                  <a:solidFill>
+                    <a:schemeClr val="bg1"/>
+                  </a:solidFill>
+                </a:endParaRPr>
+              </a:p>
+            </p:txBody>
+          </p:sp>
+        </p:grpSp>
+        <p:grpSp>
+          <p:nvGrpSpPr>
+            <p:cNvPr id="9" name="Group 8">
+              <a:extLst>
+                <a:ext uri="{FF2B5EF4-FFF2-40B4-BE49-F238E27FC236}">
+                  <a16:creationId xmlns:a16="http://schemas.microsoft.com/office/drawing/2014/main" id="{EFE97929-220D-4588-9ED6-C66AEE5170E6}"/>
+                </a:ext>
+              </a:extLst>
+            </p:cNvPr>
+            <p:cNvGrpSpPr/>
+            <p:nvPr/>
+          </p:nvGrpSpPr>
+          <p:grpSpPr>
+            <a:xfrm>
+              <a:off x="3070860" y="2171698"/>
+              <a:ext cx="1375155" cy="307778"/>
+              <a:chOff x="579120" y="2171699"/>
+              <a:chExt cx="1375155" cy="307778"/>
+            </a:xfrm>
+          </p:grpSpPr>
+          <p:sp>
+            <p:nvSpPr>
+              <p:cNvPr id="10" name="TextBox 9">
+                <a:extLst>
+                  <a:ext uri="{FF2B5EF4-FFF2-40B4-BE49-F238E27FC236}">
+                    <a16:creationId xmlns:a16="http://schemas.microsoft.com/office/drawing/2014/main" id="{9B0E0DB4-210B-4FF5-B9B6-3CF321328F85}"/>
+                  </a:ext>
+                </a:extLst>
+              </p:cNvPr>
+              <p:cNvSpPr txBox="1"/>
+              <p:nvPr/>
+            </p:nvSpPr>
+            <p:spPr>
+              <a:xfrm>
+                <a:off x="579120" y="2171700"/>
+                <a:ext cx="498855" cy="307777"/>
+              </a:xfrm>
+              <a:prstGeom prst="rect">
+                <a:avLst/>
+              </a:prstGeom>
+              <a:noFill/>
+            </p:spPr>
+            <p:txBody>
+              <a:bodyPr wrap="none" rtlCol="0">
+                <a:spAutoFit/>
+              </a:bodyPr>
+              <a:lstStyle/>
+              <a:p>
+                <a:r>
+                  <a:rPr lang="pt-BR" sz="1400" b="1" dirty="0">
+                    <a:solidFill>
+                      <a:schemeClr val="bg1"/>
+                    </a:solidFill>
+                  </a:rPr>
+                  <a:t>49%</a:t>
+                </a:r>
+                <a:endParaRPr lang="en-US" sz="1400" b="1" dirty="0">
+                  <a:solidFill>
+                    <a:schemeClr val="bg1"/>
+                  </a:solidFill>
+                </a:endParaRPr>
+              </a:p>
+            </p:txBody>
+          </p:sp>
+          <p:sp>
+            <p:nvSpPr>
+              <p:cNvPr id="11" name="TextBox 10">
+                <a:extLst>
+                  <a:ext uri="{FF2B5EF4-FFF2-40B4-BE49-F238E27FC236}">
+                    <a16:creationId xmlns:a16="http://schemas.microsoft.com/office/drawing/2014/main" id="{85859C73-EFF2-40E0-940C-62C4246D582A}"/>
+                  </a:ext>
+                </a:extLst>
+              </p:cNvPr>
+              <p:cNvSpPr txBox="1"/>
+              <p:nvPr/>
+            </p:nvSpPr>
+            <p:spPr>
+              <a:xfrm>
+                <a:off x="1455420" y="2171699"/>
+                <a:ext cx="498855" cy="307777"/>
+              </a:xfrm>
+              <a:prstGeom prst="rect">
+                <a:avLst/>
+              </a:prstGeom>
+              <a:noFill/>
+            </p:spPr>
+            <p:txBody>
+              <a:bodyPr wrap="none" rtlCol="0">
+                <a:spAutoFit/>
+              </a:bodyPr>
+              <a:lstStyle/>
+              <a:p>
+                <a:r>
+                  <a:rPr lang="pt-BR" sz="1400" b="1" dirty="0">
+                    <a:solidFill>
+                      <a:schemeClr val="bg1"/>
+                    </a:solidFill>
+                  </a:rPr>
+                  <a:t>51%</a:t>
+                </a:r>
+                <a:endParaRPr lang="en-US" sz="1400" b="1" dirty="0">
+                  <a:solidFill>
+                    <a:schemeClr val="bg1"/>
+                  </a:solidFill>
+                </a:endParaRPr>
+              </a:p>
+            </p:txBody>
+          </p:sp>
+        </p:grpSp>
+        <p:grpSp>
+          <p:nvGrpSpPr>
+            <p:cNvPr id="12" name="Group 11">
+              <a:extLst>
+                <a:ext uri="{FF2B5EF4-FFF2-40B4-BE49-F238E27FC236}">
+                  <a16:creationId xmlns:a16="http://schemas.microsoft.com/office/drawing/2014/main" id="{8B36A9D6-C0B2-46BC-A6F7-E139B965A8F9}"/>
+                </a:ext>
+              </a:extLst>
+            </p:cNvPr>
+            <p:cNvGrpSpPr/>
+            <p:nvPr/>
+          </p:nvGrpSpPr>
+          <p:grpSpPr>
+            <a:xfrm>
+              <a:off x="5570220" y="2171697"/>
+              <a:ext cx="1375155" cy="307778"/>
+              <a:chOff x="579120" y="2171699"/>
+              <a:chExt cx="1375155" cy="307778"/>
+            </a:xfrm>
+          </p:grpSpPr>
+          <p:sp>
+            <p:nvSpPr>
+              <p:cNvPr id="13" name="TextBox 12">
+                <a:extLst>
+                  <a:ext uri="{FF2B5EF4-FFF2-40B4-BE49-F238E27FC236}">
+                    <a16:creationId xmlns:a16="http://schemas.microsoft.com/office/drawing/2014/main" id="{291A92FC-FAAE-4DF2-AE90-C7B33A596839}"/>
+                  </a:ext>
+                </a:extLst>
+              </p:cNvPr>
+              <p:cNvSpPr txBox="1"/>
+              <p:nvPr/>
+            </p:nvSpPr>
+            <p:spPr>
+              <a:xfrm>
+                <a:off x="579120" y="2171700"/>
+                <a:ext cx="498855" cy="307777"/>
+              </a:xfrm>
+              <a:prstGeom prst="rect">
+                <a:avLst/>
+              </a:prstGeom>
+              <a:noFill/>
+            </p:spPr>
+            <p:txBody>
+              <a:bodyPr wrap="none" rtlCol="0">
+                <a:spAutoFit/>
+              </a:bodyPr>
+              <a:lstStyle/>
+              <a:p>
+                <a:r>
+                  <a:rPr lang="pt-BR" sz="1400" b="1" dirty="0">
+                    <a:solidFill>
+                      <a:schemeClr val="bg1"/>
+                    </a:solidFill>
+                  </a:rPr>
+                  <a:t>49%</a:t>
+                </a:r>
+                <a:endParaRPr lang="en-US" sz="1400" b="1" dirty="0">
+                  <a:solidFill>
+                    <a:schemeClr val="bg1"/>
+                  </a:solidFill>
+                </a:endParaRPr>
+              </a:p>
+            </p:txBody>
+          </p:sp>
+          <p:sp>
+            <p:nvSpPr>
+              <p:cNvPr id="14" name="TextBox 13">
+                <a:extLst>
+                  <a:ext uri="{FF2B5EF4-FFF2-40B4-BE49-F238E27FC236}">
+                    <a16:creationId xmlns:a16="http://schemas.microsoft.com/office/drawing/2014/main" id="{6F8949E6-CC37-40B8-8B52-27B1FDB2C5C1}"/>
+                  </a:ext>
+                </a:extLst>
+              </p:cNvPr>
+              <p:cNvSpPr txBox="1"/>
+              <p:nvPr/>
+            </p:nvSpPr>
+            <p:spPr>
+              <a:xfrm>
+                <a:off x="1455420" y="2171699"/>
+                <a:ext cx="498855" cy="307777"/>
+              </a:xfrm>
+              <a:prstGeom prst="rect">
+                <a:avLst/>
+              </a:prstGeom>
+              <a:noFill/>
+            </p:spPr>
+            <p:txBody>
+              <a:bodyPr wrap="none" rtlCol="0">
+                <a:spAutoFit/>
+              </a:bodyPr>
+              <a:lstStyle/>
+              <a:p>
+                <a:r>
+                  <a:rPr lang="pt-BR" sz="1400" b="1" dirty="0">
+                    <a:solidFill>
+                      <a:schemeClr val="bg1"/>
+                    </a:solidFill>
+                  </a:rPr>
+                  <a:t>51%</a:t>
+                </a:r>
+                <a:endParaRPr lang="en-US" sz="1400" b="1" dirty="0">
+                  <a:solidFill>
+                    <a:schemeClr val="bg1"/>
+                  </a:solidFill>
+                </a:endParaRPr>
+              </a:p>
+            </p:txBody>
+          </p:sp>
+        </p:grpSp>
+        <p:grpSp>
+          <p:nvGrpSpPr>
+            <p:cNvPr id="15" name="Group 14">
+              <a:extLst>
+                <a:ext uri="{FF2B5EF4-FFF2-40B4-BE49-F238E27FC236}">
+                  <a16:creationId xmlns:a16="http://schemas.microsoft.com/office/drawing/2014/main" id="{A12DD572-CEEE-4BC1-BF8D-CCBFE214A29A}"/>
+                </a:ext>
+              </a:extLst>
+            </p:cNvPr>
+            <p:cNvGrpSpPr/>
+            <p:nvPr/>
+          </p:nvGrpSpPr>
+          <p:grpSpPr>
+            <a:xfrm>
+              <a:off x="8054340" y="2171696"/>
+              <a:ext cx="1375155" cy="307778"/>
+              <a:chOff x="579120" y="2171699"/>
+              <a:chExt cx="1375155" cy="307778"/>
+            </a:xfrm>
+          </p:grpSpPr>
+          <p:sp>
+            <p:nvSpPr>
+              <p:cNvPr id="16" name="TextBox 15">
+                <a:extLst>
+                  <a:ext uri="{FF2B5EF4-FFF2-40B4-BE49-F238E27FC236}">
+                    <a16:creationId xmlns:a16="http://schemas.microsoft.com/office/drawing/2014/main" id="{4BCDC8BB-AE43-4D7B-9A2A-AD517CDE0BE3}"/>
+                  </a:ext>
+                </a:extLst>
+              </p:cNvPr>
+              <p:cNvSpPr txBox="1"/>
+              <p:nvPr/>
+            </p:nvSpPr>
+            <p:spPr>
+              <a:xfrm>
+                <a:off x="579120" y="2171700"/>
+                <a:ext cx="498855" cy="307777"/>
+              </a:xfrm>
+              <a:prstGeom prst="rect">
+                <a:avLst/>
+              </a:prstGeom>
+              <a:noFill/>
+            </p:spPr>
+            <p:txBody>
+              <a:bodyPr wrap="none" rtlCol="0">
+                <a:spAutoFit/>
+              </a:bodyPr>
+              <a:lstStyle/>
+              <a:p>
+                <a:r>
+                  <a:rPr lang="pt-BR" sz="1400" b="1" dirty="0">
+                    <a:solidFill>
+                      <a:schemeClr val="bg1"/>
+                    </a:solidFill>
+                  </a:rPr>
+                  <a:t>50%</a:t>
+                </a:r>
+                <a:endParaRPr lang="en-US" sz="1400" b="1" dirty="0">
+                  <a:solidFill>
+                    <a:schemeClr val="bg1"/>
+                  </a:solidFill>
+                </a:endParaRPr>
+              </a:p>
+            </p:txBody>
+          </p:sp>
+          <p:sp>
+            <p:nvSpPr>
+              <p:cNvPr id="17" name="TextBox 16">
+                <a:extLst>
+                  <a:ext uri="{FF2B5EF4-FFF2-40B4-BE49-F238E27FC236}">
+                    <a16:creationId xmlns:a16="http://schemas.microsoft.com/office/drawing/2014/main" id="{39D018F1-FF6C-480B-8EFA-89D6E09A08E5}"/>
+                  </a:ext>
+                </a:extLst>
+              </p:cNvPr>
+              <p:cNvSpPr txBox="1"/>
+              <p:nvPr/>
+            </p:nvSpPr>
+            <p:spPr>
+              <a:xfrm>
+                <a:off x="1455420" y="2171699"/>
+                <a:ext cx="498855" cy="307777"/>
+              </a:xfrm>
+              <a:prstGeom prst="rect">
+                <a:avLst/>
+              </a:prstGeom>
+              <a:noFill/>
+            </p:spPr>
+            <p:txBody>
+              <a:bodyPr wrap="none" rtlCol="0">
+                <a:spAutoFit/>
+              </a:bodyPr>
+              <a:lstStyle/>
+              <a:p>
+                <a:r>
+                  <a:rPr lang="pt-BR" sz="1400" b="1" dirty="0">
+                    <a:solidFill>
+                      <a:schemeClr val="bg1"/>
+                    </a:solidFill>
+                  </a:rPr>
+                  <a:t>50%</a:t>
+                </a:r>
+                <a:endParaRPr lang="en-US" sz="1400" b="1" dirty="0">
+                  <a:solidFill>
+                    <a:schemeClr val="bg1"/>
+                  </a:solidFill>
+                </a:endParaRPr>
+              </a:p>
+            </p:txBody>
+          </p:sp>
+        </p:grpSp>
+        <p:grpSp>
+          <p:nvGrpSpPr>
+            <p:cNvPr id="18" name="Group 17">
+              <a:extLst>
+                <a:ext uri="{FF2B5EF4-FFF2-40B4-BE49-F238E27FC236}">
+                  <a16:creationId xmlns:a16="http://schemas.microsoft.com/office/drawing/2014/main" id="{5299A749-D298-4C8D-AC2E-3B0CACEFD554}"/>
+                </a:ext>
+              </a:extLst>
+            </p:cNvPr>
+            <p:cNvGrpSpPr/>
+            <p:nvPr/>
+          </p:nvGrpSpPr>
+          <p:grpSpPr>
+            <a:xfrm>
+              <a:off x="10546080" y="2171695"/>
+              <a:ext cx="1375155" cy="307778"/>
+              <a:chOff x="579120" y="2171699"/>
+              <a:chExt cx="1375155" cy="307778"/>
+            </a:xfrm>
+          </p:grpSpPr>
+          <p:sp>
+            <p:nvSpPr>
+              <p:cNvPr id="19" name="TextBox 18">
+                <a:extLst>
+                  <a:ext uri="{FF2B5EF4-FFF2-40B4-BE49-F238E27FC236}">
+                    <a16:creationId xmlns:a16="http://schemas.microsoft.com/office/drawing/2014/main" id="{5617C981-BB99-4DAA-8603-0DC4A47D7DE5}"/>
+                  </a:ext>
+                </a:extLst>
+              </p:cNvPr>
+              <p:cNvSpPr txBox="1"/>
+              <p:nvPr/>
+            </p:nvSpPr>
+            <p:spPr>
+              <a:xfrm>
+                <a:off x="579120" y="2171700"/>
+                <a:ext cx="498855" cy="307777"/>
+              </a:xfrm>
+              <a:prstGeom prst="rect">
+                <a:avLst/>
+              </a:prstGeom>
+              <a:noFill/>
+            </p:spPr>
+            <p:txBody>
+              <a:bodyPr wrap="none" rtlCol="0">
+                <a:spAutoFit/>
+              </a:bodyPr>
+              <a:lstStyle/>
+              <a:p>
+                <a:r>
+                  <a:rPr lang="pt-BR" sz="1400" b="1" dirty="0">
+                    <a:solidFill>
+                      <a:schemeClr val="bg1"/>
+                    </a:solidFill>
+                  </a:rPr>
+                  <a:t>49%</a:t>
+                </a:r>
+                <a:endParaRPr lang="en-US" sz="1400" b="1" dirty="0">
+                  <a:solidFill>
+                    <a:schemeClr val="bg1"/>
+                  </a:solidFill>
+                </a:endParaRPr>
+              </a:p>
+            </p:txBody>
+          </p:sp>
+          <p:sp>
+            <p:nvSpPr>
+              <p:cNvPr id="20" name="TextBox 19">
+                <a:extLst>
+                  <a:ext uri="{FF2B5EF4-FFF2-40B4-BE49-F238E27FC236}">
+                    <a16:creationId xmlns:a16="http://schemas.microsoft.com/office/drawing/2014/main" id="{6B7C8F71-5909-47F4-AB11-888E07F86727}"/>
+                  </a:ext>
+                </a:extLst>
+              </p:cNvPr>
+              <p:cNvSpPr txBox="1"/>
+              <p:nvPr/>
+            </p:nvSpPr>
+            <p:spPr>
+              <a:xfrm>
+                <a:off x="1455420" y="2171699"/>
+                <a:ext cx="498855" cy="307777"/>
+              </a:xfrm>
+              <a:prstGeom prst="rect">
+                <a:avLst/>
+              </a:prstGeom>
+              <a:noFill/>
+            </p:spPr>
+            <p:txBody>
+              <a:bodyPr wrap="none" rtlCol="0">
+                <a:spAutoFit/>
+              </a:bodyPr>
+              <a:lstStyle/>
+              <a:p>
+                <a:r>
+                  <a:rPr lang="pt-BR" sz="1400" b="1" dirty="0">
+                    <a:solidFill>
+                      <a:schemeClr val="bg1"/>
+                    </a:solidFill>
+                  </a:rPr>
+                  <a:t>51%</a:t>
+                </a:r>
+                <a:endParaRPr lang="en-US" sz="1400" b="1" dirty="0">
+                  <a:solidFill>
+                    <a:schemeClr val="bg1"/>
+                  </a:solidFill>
+                </a:endParaRPr>
+              </a:p>
+            </p:txBody>
+          </p:sp>
+        </p:grpSp>
+        <p:grpSp>
+          <p:nvGrpSpPr>
+            <p:cNvPr id="21" name="Group 20">
+              <a:extLst>
+                <a:ext uri="{FF2B5EF4-FFF2-40B4-BE49-F238E27FC236}">
+                  <a16:creationId xmlns:a16="http://schemas.microsoft.com/office/drawing/2014/main" id="{938BD4D0-B037-4B46-987B-B70689B93021}"/>
+                </a:ext>
+              </a:extLst>
+            </p:cNvPr>
+            <p:cNvGrpSpPr/>
+            <p:nvPr/>
+          </p:nvGrpSpPr>
+          <p:grpSpPr>
+            <a:xfrm>
+              <a:off x="592745" y="4465319"/>
+              <a:ext cx="1375155" cy="307778"/>
+              <a:chOff x="579120" y="2171699"/>
+              <a:chExt cx="1375155" cy="307778"/>
+            </a:xfrm>
+          </p:grpSpPr>
+          <p:sp>
+            <p:nvSpPr>
+              <p:cNvPr id="22" name="TextBox 21">
+                <a:extLst>
+                  <a:ext uri="{FF2B5EF4-FFF2-40B4-BE49-F238E27FC236}">
+                    <a16:creationId xmlns:a16="http://schemas.microsoft.com/office/drawing/2014/main" id="{DBCBF5E2-FE3B-4528-B5C0-61C3D27DD470}"/>
+                  </a:ext>
+                </a:extLst>
+              </p:cNvPr>
+              <p:cNvSpPr txBox="1"/>
+              <p:nvPr/>
+            </p:nvSpPr>
+            <p:spPr>
+              <a:xfrm>
+                <a:off x="579120" y="2171700"/>
+                <a:ext cx="498855" cy="307777"/>
+              </a:xfrm>
+              <a:prstGeom prst="rect">
+                <a:avLst/>
+              </a:prstGeom>
+              <a:noFill/>
+            </p:spPr>
+            <p:txBody>
+              <a:bodyPr wrap="none" rtlCol="0">
+                <a:spAutoFit/>
+              </a:bodyPr>
+              <a:lstStyle/>
+              <a:p>
+                <a:r>
+                  <a:rPr lang="pt-BR" sz="1400" b="1" dirty="0">
+                    <a:solidFill>
+                      <a:schemeClr val="bg1"/>
+                    </a:solidFill>
+                  </a:rPr>
+                  <a:t>45%</a:t>
+                </a:r>
+                <a:endParaRPr lang="en-US" sz="1400" b="1" dirty="0">
+                  <a:solidFill>
+                    <a:schemeClr val="bg1"/>
+                  </a:solidFill>
+                </a:endParaRPr>
+              </a:p>
+            </p:txBody>
+          </p:sp>
+          <p:sp>
+            <p:nvSpPr>
+              <p:cNvPr id="23" name="TextBox 22">
+                <a:extLst>
+                  <a:ext uri="{FF2B5EF4-FFF2-40B4-BE49-F238E27FC236}">
+                    <a16:creationId xmlns:a16="http://schemas.microsoft.com/office/drawing/2014/main" id="{261B23EF-2FD5-4291-AAFB-87C63D36B2AD}"/>
+                  </a:ext>
+                </a:extLst>
+              </p:cNvPr>
+              <p:cNvSpPr txBox="1"/>
+              <p:nvPr/>
+            </p:nvSpPr>
+            <p:spPr>
+              <a:xfrm>
+                <a:off x="1455420" y="2171699"/>
+                <a:ext cx="498855" cy="307777"/>
+              </a:xfrm>
+              <a:prstGeom prst="rect">
+                <a:avLst/>
+              </a:prstGeom>
+              <a:noFill/>
+            </p:spPr>
+            <p:txBody>
+              <a:bodyPr wrap="none" rtlCol="0">
+                <a:spAutoFit/>
+              </a:bodyPr>
+              <a:lstStyle/>
+              <a:p>
+                <a:r>
+                  <a:rPr lang="pt-BR" sz="1400" b="1" dirty="0">
+                    <a:solidFill>
+                      <a:schemeClr val="bg1"/>
+                    </a:solidFill>
+                  </a:rPr>
+                  <a:t>55%</a:t>
+                </a:r>
+                <a:endParaRPr lang="en-US" sz="1400" b="1" dirty="0">
+                  <a:solidFill>
+                    <a:schemeClr val="bg1"/>
+                  </a:solidFill>
+                </a:endParaRPr>
+              </a:p>
+            </p:txBody>
+          </p:sp>
+        </p:grpSp>
+        <p:grpSp>
+          <p:nvGrpSpPr>
+            <p:cNvPr id="24" name="Group 23">
+              <a:extLst>
+                <a:ext uri="{FF2B5EF4-FFF2-40B4-BE49-F238E27FC236}">
+                  <a16:creationId xmlns:a16="http://schemas.microsoft.com/office/drawing/2014/main" id="{18590F91-6242-4B78-8995-CFDA556DCC1B}"/>
+                </a:ext>
+              </a:extLst>
+            </p:cNvPr>
+            <p:cNvGrpSpPr/>
+            <p:nvPr/>
+          </p:nvGrpSpPr>
+          <p:grpSpPr>
+            <a:xfrm>
+              <a:off x="3084485" y="4465318"/>
+              <a:ext cx="1375155" cy="307778"/>
+              <a:chOff x="579120" y="2171699"/>
+              <a:chExt cx="1375155" cy="307778"/>
+            </a:xfrm>
+          </p:grpSpPr>
+          <p:sp>
+            <p:nvSpPr>
+              <p:cNvPr id="25" name="TextBox 24">
+                <a:extLst>
+                  <a:ext uri="{FF2B5EF4-FFF2-40B4-BE49-F238E27FC236}">
+                    <a16:creationId xmlns:a16="http://schemas.microsoft.com/office/drawing/2014/main" id="{5589C3A3-1061-44B1-B97B-3A599BDF7348}"/>
+                  </a:ext>
+                </a:extLst>
+              </p:cNvPr>
+              <p:cNvSpPr txBox="1"/>
+              <p:nvPr/>
+            </p:nvSpPr>
+            <p:spPr>
+              <a:xfrm>
+                <a:off x="579120" y="2171700"/>
+                <a:ext cx="498855" cy="307777"/>
+              </a:xfrm>
+              <a:prstGeom prst="rect">
+                <a:avLst/>
+              </a:prstGeom>
+              <a:noFill/>
+            </p:spPr>
+            <p:txBody>
+              <a:bodyPr wrap="none" rtlCol="0">
+                <a:spAutoFit/>
+              </a:bodyPr>
+              <a:lstStyle/>
+              <a:p>
+                <a:r>
+                  <a:rPr lang="pt-BR" sz="1400" b="1" dirty="0">
+                    <a:solidFill>
+                      <a:schemeClr val="bg1"/>
+                    </a:solidFill>
+                  </a:rPr>
+                  <a:t>47%</a:t>
+                </a:r>
+                <a:endParaRPr lang="en-US" sz="1400" b="1" dirty="0">
+                  <a:solidFill>
+                    <a:schemeClr val="bg1"/>
+                  </a:solidFill>
+                </a:endParaRPr>
+              </a:p>
+            </p:txBody>
+          </p:sp>
+          <p:sp>
+            <p:nvSpPr>
+              <p:cNvPr id="26" name="TextBox 25">
+                <a:extLst>
+                  <a:ext uri="{FF2B5EF4-FFF2-40B4-BE49-F238E27FC236}">
+                    <a16:creationId xmlns:a16="http://schemas.microsoft.com/office/drawing/2014/main" id="{A2ECAADB-3124-447C-804B-03537A388BA2}"/>
+                  </a:ext>
+                </a:extLst>
+              </p:cNvPr>
+              <p:cNvSpPr txBox="1"/>
+              <p:nvPr/>
+            </p:nvSpPr>
+            <p:spPr>
+              <a:xfrm>
+                <a:off x="1455420" y="2171699"/>
+                <a:ext cx="498855" cy="307777"/>
+              </a:xfrm>
+              <a:prstGeom prst="rect">
+                <a:avLst/>
+              </a:prstGeom>
+              <a:noFill/>
+            </p:spPr>
+            <p:txBody>
+              <a:bodyPr wrap="none" rtlCol="0">
+                <a:spAutoFit/>
+              </a:bodyPr>
+              <a:lstStyle/>
+              <a:p>
+                <a:r>
+                  <a:rPr lang="pt-BR" sz="1400" b="1" dirty="0">
+                    <a:solidFill>
+                      <a:schemeClr val="bg1"/>
+                    </a:solidFill>
+                  </a:rPr>
+                  <a:t>53%</a:t>
+                </a:r>
+                <a:endParaRPr lang="en-US" sz="1400" b="1" dirty="0">
+                  <a:solidFill>
+                    <a:schemeClr val="bg1"/>
+                  </a:solidFill>
+                </a:endParaRPr>
+              </a:p>
+            </p:txBody>
+          </p:sp>
+        </p:grpSp>
+        <p:grpSp>
+          <p:nvGrpSpPr>
+            <p:cNvPr id="27" name="Group 26">
+              <a:extLst>
+                <a:ext uri="{FF2B5EF4-FFF2-40B4-BE49-F238E27FC236}">
+                  <a16:creationId xmlns:a16="http://schemas.microsoft.com/office/drawing/2014/main" id="{D1E6CC4A-3E1D-44F0-9F38-B75A699CEAA5}"/>
+                </a:ext>
+              </a:extLst>
+            </p:cNvPr>
+            <p:cNvGrpSpPr/>
+            <p:nvPr/>
+          </p:nvGrpSpPr>
+          <p:grpSpPr>
+            <a:xfrm>
+              <a:off x="5583845" y="4465317"/>
+              <a:ext cx="1375155" cy="307778"/>
+              <a:chOff x="579120" y="2171699"/>
+              <a:chExt cx="1375155" cy="307778"/>
+            </a:xfrm>
+          </p:grpSpPr>
+          <p:sp>
+            <p:nvSpPr>
+              <p:cNvPr id="28" name="TextBox 27">
+                <a:extLst>
+                  <a:ext uri="{FF2B5EF4-FFF2-40B4-BE49-F238E27FC236}">
+                    <a16:creationId xmlns:a16="http://schemas.microsoft.com/office/drawing/2014/main" id="{6E5A4AFA-F3C7-4A66-A84C-7924B609A6F4}"/>
+                  </a:ext>
+                </a:extLst>
+              </p:cNvPr>
+              <p:cNvSpPr txBox="1"/>
+              <p:nvPr/>
+            </p:nvSpPr>
+            <p:spPr>
+              <a:xfrm>
+                <a:off x="579120" y="2171700"/>
+                <a:ext cx="498855" cy="307777"/>
+              </a:xfrm>
+              <a:prstGeom prst="rect">
+                <a:avLst/>
+              </a:prstGeom>
+              <a:noFill/>
+            </p:spPr>
+            <p:txBody>
+              <a:bodyPr wrap="none" rtlCol="0">
+                <a:spAutoFit/>
+              </a:bodyPr>
+              <a:lstStyle/>
+              <a:p>
+                <a:r>
+                  <a:rPr lang="pt-BR" sz="1400" b="1" dirty="0">
+                    <a:solidFill>
+                      <a:schemeClr val="bg1"/>
+                    </a:solidFill>
+                  </a:rPr>
+                  <a:t>51%</a:t>
+                </a:r>
+                <a:endParaRPr lang="en-US" sz="1400" b="1" dirty="0">
+                  <a:solidFill>
+                    <a:schemeClr val="bg1"/>
+                  </a:solidFill>
+                </a:endParaRPr>
+              </a:p>
+            </p:txBody>
+          </p:sp>
+          <p:sp>
+            <p:nvSpPr>
+              <p:cNvPr id="29" name="TextBox 28">
+                <a:extLst>
+                  <a:ext uri="{FF2B5EF4-FFF2-40B4-BE49-F238E27FC236}">
+                    <a16:creationId xmlns:a16="http://schemas.microsoft.com/office/drawing/2014/main" id="{DEC6FFF2-7740-4077-8B0F-541947D639F8}"/>
+                  </a:ext>
+                </a:extLst>
+              </p:cNvPr>
+              <p:cNvSpPr txBox="1"/>
+              <p:nvPr/>
+            </p:nvSpPr>
+            <p:spPr>
+              <a:xfrm>
+                <a:off x="1455420" y="2171699"/>
+                <a:ext cx="498855" cy="307777"/>
+              </a:xfrm>
+              <a:prstGeom prst="rect">
+                <a:avLst/>
+              </a:prstGeom>
+              <a:noFill/>
+            </p:spPr>
+            <p:txBody>
+              <a:bodyPr wrap="none" rtlCol="0">
+                <a:spAutoFit/>
+              </a:bodyPr>
+              <a:lstStyle/>
+              <a:p>
+                <a:r>
+                  <a:rPr lang="pt-BR" sz="1400" b="1" dirty="0">
+                    <a:solidFill>
+                      <a:schemeClr val="bg1"/>
+                    </a:solidFill>
+                  </a:rPr>
+                  <a:t>48%</a:t>
+                </a:r>
+                <a:endParaRPr lang="en-US" sz="1400" b="1" dirty="0">
+                  <a:solidFill>
+                    <a:schemeClr val="bg1"/>
+                  </a:solidFill>
+                </a:endParaRPr>
+              </a:p>
+            </p:txBody>
+          </p:sp>
+        </p:grpSp>
+        <p:grpSp>
+          <p:nvGrpSpPr>
+            <p:cNvPr id="30" name="Group 29">
+              <a:extLst>
+                <a:ext uri="{FF2B5EF4-FFF2-40B4-BE49-F238E27FC236}">
+                  <a16:creationId xmlns:a16="http://schemas.microsoft.com/office/drawing/2014/main" id="{C16F722E-EBC8-4FE1-AF06-E56FFCC7D1FA}"/>
+                </a:ext>
+              </a:extLst>
+            </p:cNvPr>
+            <p:cNvGrpSpPr/>
+            <p:nvPr/>
+          </p:nvGrpSpPr>
+          <p:grpSpPr>
+            <a:xfrm>
+              <a:off x="8067965" y="4465316"/>
+              <a:ext cx="1375155" cy="307778"/>
+              <a:chOff x="579120" y="2171699"/>
+              <a:chExt cx="1375155" cy="307778"/>
+            </a:xfrm>
+          </p:grpSpPr>
+          <p:sp>
+            <p:nvSpPr>
+              <p:cNvPr id="31" name="TextBox 30">
+                <a:extLst>
+                  <a:ext uri="{FF2B5EF4-FFF2-40B4-BE49-F238E27FC236}">
+                    <a16:creationId xmlns:a16="http://schemas.microsoft.com/office/drawing/2014/main" id="{B551AA17-151C-40D6-8C89-128BAAF347BA}"/>
+                  </a:ext>
+                </a:extLst>
+              </p:cNvPr>
+              <p:cNvSpPr txBox="1"/>
+              <p:nvPr/>
+            </p:nvSpPr>
+            <p:spPr>
+              <a:xfrm>
+                <a:off x="579120" y="2171700"/>
+                <a:ext cx="498855" cy="307777"/>
+              </a:xfrm>
+              <a:prstGeom prst="rect">
+                <a:avLst/>
+              </a:prstGeom>
+              <a:noFill/>
+            </p:spPr>
+            <p:txBody>
+              <a:bodyPr wrap="none" rtlCol="0">
+                <a:spAutoFit/>
+              </a:bodyPr>
+              <a:lstStyle/>
+              <a:p>
+                <a:r>
+                  <a:rPr lang="pt-BR" sz="1400" b="1" dirty="0">
+                    <a:solidFill>
+                      <a:schemeClr val="bg1"/>
+                    </a:solidFill>
+                  </a:rPr>
+                  <a:t>50%</a:t>
+                </a:r>
+                <a:endParaRPr lang="en-US" sz="1400" b="1" dirty="0">
+                  <a:solidFill>
+                    <a:schemeClr val="bg1"/>
+                  </a:solidFill>
+                </a:endParaRPr>
+              </a:p>
+            </p:txBody>
+          </p:sp>
+          <p:sp>
+            <p:nvSpPr>
+              <p:cNvPr id="32" name="TextBox 31">
+                <a:extLst>
+                  <a:ext uri="{FF2B5EF4-FFF2-40B4-BE49-F238E27FC236}">
+                    <a16:creationId xmlns:a16="http://schemas.microsoft.com/office/drawing/2014/main" id="{EFFBF39E-14F6-4F13-B51C-5E6B8DCB1BB7}"/>
+                  </a:ext>
+                </a:extLst>
+              </p:cNvPr>
+              <p:cNvSpPr txBox="1"/>
+              <p:nvPr/>
+            </p:nvSpPr>
+            <p:spPr>
+              <a:xfrm>
+                <a:off x="1455420" y="2171699"/>
+                <a:ext cx="498855" cy="307777"/>
+              </a:xfrm>
+              <a:prstGeom prst="rect">
+                <a:avLst/>
+              </a:prstGeom>
+              <a:noFill/>
+            </p:spPr>
+            <p:txBody>
+              <a:bodyPr wrap="none" rtlCol="0">
+                <a:spAutoFit/>
+              </a:bodyPr>
+              <a:lstStyle/>
+              <a:p>
+                <a:r>
+                  <a:rPr lang="pt-BR" sz="1400" b="1" dirty="0">
+                    <a:solidFill>
+                      <a:schemeClr val="bg1"/>
+                    </a:solidFill>
+                  </a:rPr>
+                  <a:t>50%</a:t>
+                </a:r>
+                <a:endParaRPr lang="en-US" sz="1400" b="1" dirty="0">
+                  <a:solidFill>
+                    <a:schemeClr val="bg1"/>
+                  </a:solidFill>
+                </a:endParaRPr>
+              </a:p>
+            </p:txBody>
+          </p:sp>
+        </p:grpSp>
+        <p:grpSp>
+          <p:nvGrpSpPr>
+            <p:cNvPr id="33" name="Group 32">
+              <a:extLst>
+                <a:ext uri="{FF2B5EF4-FFF2-40B4-BE49-F238E27FC236}">
+                  <a16:creationId xmlns:a16="http://schemas.microsoft.com/office/drawing/2014/main" id="{04220A23-A38D-4235-BE5B-E58CFB94CB9B}"/>
+                </a:ext>
+              </a:extLst>
+            </p:cNvPr>
+            <p:cNvGrpSpPr/>
+            <p:nvPr/>
+          </p:nvGrpSpPr>
+          <p:grpSpPr>
+            <a:xfrm>
+              <a:off x="10559705" y="4465315"/>
+              <a:ext cx="1375155" cy="307778"/>
+              <a:chOff x="579120" y="2171699"/>
+              <a:chExt cx="1375155" cy="307778"/>
+            </a:xfrm>
+          </p:grpSpPr>
+          <p:sp>
+            <p:nvSpPr>
+              <p:cNvPr id="34" name="TextBox 33">
+                <a:extLst>
+                  <a:ext uri="{FF2B5EF4-FFF2-40B4-BE49-F238E27FC236}">
+                    <a16:creationId xmlns:a16="http://schemas.microsoft.com/office/drawing/2014/main" id="{71178028-EC99-4DE5-93E1-79DD0A882206}"/>
+                  </a:ext>
+                </a:extLst>
+              </p:cNvPr>
+              <p:cNvSpPr txBox="1"/>
+              <p:nvPr/>
+            </p:nvSpPr>
+            <p:spPr>
+              <a:xfrm>
+                <a:off x="579120" y="2171700"/>
+                <a:ext cx="498855" cy="307777"/>
+              </a:xfrm>
+              <a:prstGeom prst="rect">
+                <a:avLst/>
+              </a:prstGeom>
+              <a:noFill/>
+            </p:spPr>
+            <p:txBody>
+              <a:bodyPr wrap="none" rtlCol="0">
+                <a:spAutoFit/>
+              </a:bodyPr>
+              <a:lstStyle/>
+              <a:p>
+                <a:r>
+                  <a:rPr lang="pt-BR" sz="1400" b="1" dirty="0">
+                    <a:solidFill>
+                      <a:schemeClr val="bg1"/>
+                    </a:solidFill>
+                  </a:rPr>
+                  <a:t>50%</a:t>
+                </a:r>
+                <a:endParaRPr lang="en-US" sz="1400" b="1" dirty="0">
+                  <a:solidFill>
+                    <a:schemeClr val="bg1"/>
+                  </a:solidFill>
+                </a:endParaRPr>
+              </a:p>
+            </p:txBody>
+          </p:sp>
+          <p:sp>
+            <p:nvSpPr>
+              <p:cNvPr id="35" name="TextBox 34">
+                <a:extLst>
+                  <a:ext uri="{FF2B5EF4-FFF2-40B4-BE49-F238E27FC236}">
+                    <a16:creationId xmlns:a16="http://schemas.microsoft.com/office/drawing/2014/main" id="{7B4C97F6-EC9F-4E9D-BE51-C6A94EB7A600}"/>
+                  </a:ext>
+                </a:extLst>
+              </p:cNvPr>
+              <p:cNvSpPr txBox="1"/>
+              <p:nvPr/>
+            </p:nvSpPr>
+            <p:spPr>
+              <a:xfrm>
+                <a:off x="1455420" y="2171699"/>
+                <a:ext cx="498855" cy="307777"/>
+              </a:xfrm>
+              <a:prstGeom prst="rect">
+                <a:avLst/>
+              </a:prstGeom>
+              <a:noFill/>
+            </p:spPr>
+            <p:txBody>
+              <a:bodyPr wrap="none" rtlCol="0">
+                <a:spAutoFit/>
+              </a:bodyPr>
+              <a:lstStyle/>
+              <a:p>
+                <a:r>
+                  <a:rPr lang="pt-BR" sz="1400" b="1" dirty="0">
+                    <a:solidFill>
+                      <a:schemeClr val="bg1"/>
+                    </a:solidFill>
+                  </a:rPr>
+                  <a:t>50%</a:t>
+                </a:r>
+                <a:endParaRPr lang="en-US" sz="1400" b="1" dirty="0">
+                  <a:solidFill>
+                    <a:schemeClr val="bg1"/>
+                  </a:solidFill>
+                </a:endParaRPr>
+              </a:p>
+            </p:txBody>
+          </p:sp>
+        </p:grpSp>
+      </p:grpSp>
+      <p:sp>
+        <p:nvSpPr>
+          <p:cNvPr id="38" name="TextBox 37">
+            <a:extLst>
+              <a:ext uri="{FF2B5EF4-FFF2-40B4-BE49-F238E27FC236}">
+                <a16:creationId xmlns:a16="http://schemas.microsoft.com/office/drawing/2014/main" id="{4E2381EB-BB96-4431-9006-ABC3D4E73A4E}"/>
+              </a:ext>
+            </a:extLst>
+          </p:cNvPr>
+          <p:cNvSpPr txBox="1"/>
+          <p:nvPr/>
+        </p:nvSpPr>
+        <p:spPr>
+          <a:xfrm>
+            <a:off x="4933062" y="2013131"/>
+            <a:ext cx="317716" cy="369332"/>
+          </a:xfrm>
+          <a:prstGeom prst="rect">
+            <a:avLst/>
+          </a:prstGeom>
+          <a:noFill/>
+        </p:spPr>
+        <p:txBody>
+          <a:bodyPr wrap="none" rtlCol="0">
+            <a:spAutoFit/>
+          </a:bodyPr>
+          <a:lstStyle/>
+          <a:p>
+            <a:r>
+              <a:rPr lang="pt-BR" dirty="0"/>
+              <a:t>A</a:t>
+            </a:r>
+            <a:endParaRPr lang="en-US" dirty="0"/>
+          </a:p>
+        </p:txBody>
+      </p:sp>
+      <p:pic>
+        <p:nvPicPr>
+          <p:cNvPr id="40" name="Picture 39">
+            <a:extLst>
+              <a:ext uri="{FF2B5EF4-FFF2-40B4-BE49-F238E27FC236}">
+                <a16:creationId xmlns:a16="http://schemas.microsoft.com/office/drawing/2014/main" id="{E176F95A-2E8A-49BA-8166-095DBAC29696}"/>
+              </a:ext>
+            </a:extLst>
+          </p:cNvPr>
+          <p:cNvPicPr>
+            <a:picLocks noChangeAspect="1"/>
+          </p:cNvPicPr>
+          <p:nvPr/>
+        </p:nvPicPr>
+        <p:blipFill>
+          <a:blip r:embed="rId2"/>
+          <a:stretch>
+            <a:fillRect/>
+          </a:stretch>
+        </p:blipFill>
+        <p:spPr>
+          <a:xfrm>
+            <a:off x="4600575" y="2176462"/>
+            <a:ext cx="2990850" cy="2505075"/>
+          </a:xfrm>
+          <a:prstGeom prst="rect">
+            <a:avLst/>
+          </a:prstGeom>
+        </p:spPr>
+      </p:pic>
+      <p:pic>
+        <p:nvPicPr>
+          <p:cNvPr id="42" name="Picture 41">
+            <a:extLst>
+              <a:ext uri="{FF2B5EF4-FFF2-40B4-BE49-F238E27FC236}">
+                <a16:creationId xmlns:a16="http://schemas.microsoft.com/office/drawing/2014/main" id="{0507A9D7-325F-4E8C-9D77-9264223781BF}"/>
+              </a:ext>
+            </a:extLst>
+          </p:cNvPr>
+          <p:cNvPicPr>
+            <a:picLocks noChangeAspect="1"/>
+          </p:cNvPicPr>
+          <p:nvPr/>
+        </p:nvPicPr>
+        <p:blipFill>
+          <a:blip r:embed="rId3"/>
+          <a:stretch>
+            <a:fillRect/>
+          </a:stretch>
+        </p:blipFill>
+        <p:spPr>
+          <a:xfrm>
+            <a:off x="7654290" y="2169008"/>
+            <a:ext cx="2990850" cy="2505075"/>
+          </a:xfrm>
+          <a:prstGeom prst="rect">
+            <a:avLst/>
+          </a:prstGeom>
+        </p:spPr>
+      </p:pic>
+      <p:sp>
+        <p:nvSpPr>
+          <p:cNvPr id="45" name="TextBox 44">
+            <a:extLst>
+              <a:ext uri="{FF2B5EF4-FFF2-40B4-BE49-F238E27FC236}">
+                <a16:creationId xmlns:a16="http://schemas.microsoft.com/office/drawing/2014/main" id="{C694B4DD-3FC9-47E5-8C5A-209DE3226741}"/>
+              </a:ext>
+            </a:extLst>
+          </p:cNvPr>
+          <p:cNvSpPr txBox="1"/>
+          <p:nvPr/>
+        </p:nvSpPr>
+        <p:spPr>
+          <a:xfrm>
+            <a:off x="7952197" y="2004930"/>
+            <a:ext cx="309700" cy="369332"/>
+          </a:xfrm>
+          <a:prstGeom prst="rect">
+            <a:avLst/>
+          </a:prstGeom>
+          <a:noFill/>
+        </p:spPr>
+        <p:txBody>
+          <a:bodyPr wrap="none" rtlCol="0">
+            <a:spAutoFit/>
+          </a:bodyPr>
+          <a:lstStyle/>
+          <a:p>
+            <a:r>
+              <a:rPr lang="pt-BR" dirty="0"/>
+              <a:t>B</a:t>
+            </a:r>
+            <a:endParaRPr lang="en-US" dirty="0"/>
+          </a:p>
+        </p:txBody>
+      </p:sp>
+      <p:sp>
+        <p:nvSpPr>
+          <p:cNvPr id="46" name="TextBox 45">
+            <a:extLst>
+              <a:ext uri="{FF2B5EF4-FFF2-40B4-BE49-F238E27FC236}">
+                <a16:creationId xmlns:a16="http://schemas.microsoft.com/office/drawing/2014/main" id="{BE88B8C7-D05E-4981-AC53-516C37856F52}"/>
+              </a:ext>
+            </a:extLst>
+          </p:cNvPr>
+          <p:cNvSpPr txBox="1"/>
+          <p:nvPr/>
+        </p:nvSpPr>
+        <p:spPr>
+          <a:xfrm>
+            <a:off x="5680938" y="4585223"/>
+            <a:ext cx="917239" cy="261610"/>
+          </a:xfrm>
+          <a:prstGeom prst="rect">
+            <a:avLst/>
+          </a:prstGeom>
+          <a:noFill/>
+        </p:spPr>
+        <p:txBody>
+          <a:bodyPr wrap="none" rtlCol="0">
+            <a:spAutoFit/>
+          </a:bodyPr>
+          <a:lstStyle/>
+          <a:p>
+            <a:r>
+              <a:rPr lang="pt-BR" sz="1100" dirty="0"/>
+              <a:t>Experimento</a:t>
+            </a:r>
+            <a:endParaRPr lang="en-US" sz="1100" dirty="0"/>
+          </a:p>
+        </p:txBody>
+      </p:sp>
+      <p:sp>
+        <p:nvSpPr>
+          <p:cNvPr id="47" name="TextBox 46">
+            <a:extLst>
+              <a:ext uri="{FF2B5EF4-FFF2-40B4-BE49-F238E27FC236}">
+                <a16:creationId xmlns:a16="http://schemas.microsoft.com/office/drawing/2014/main" id="{9FF40A9B-8C12-4E85-BF1C-088FE8E1C10E}"/>
+              </a:ext>
+            </a:extLst>
+          </p:cNvPr>
+          <p:cNvSpPr txBox="1"/>
+          <p:nvPr/>
+        </p:nvSpPr>
+        <p:spPr>
+          <a:xfrm>
+            <a:off x="8761420" y="4576834"/>
+            <a:ext cx="917239" cy="261610"/>
+          </a:xfrm>
+          <a:prstGeom prst="rect">
+            <a:avLst/>
+          </a:prstGeom>
+          <a:noFill/>
+        </p:spPr>
+        <p:txBody>
+          <a:bodyPr wrap="none" rtlCol="0">
+            <a:spAutoFit/>
+          </a:bodyPr>
+          <a:lstStyle/>
+          <a:p>
+            <a:r>
+              <a:rPr lang="pt-BR" sz="1100" dirty="0"/>
+              <a:t>Experimento</a:t>
+            </a:r>
+            <a:endParaRPr lang="en-US" sz="1100" dirty="0"/>
+          </a:p>
+        </p:txBody>
+      </p:sp>
+      <p:sp>
+        <p:nvSpPr>
+          <p:cNvPr id="48" name="TextBox 47">
+            <a:extLst>
+              <a:ext uri="{FF2B5EF4-FFF2-40B4-BE49-F238E27FC236}">
+                <a16:creationId xmlns:a16="http://schemas.microsoft.com/office/drawing/2014/main" id="{FFA3E66E-5712-499B-952E-75261D37166D}"/>
+              </a:ext>
+            </a:extLst>
+          </p:cNvPr>
+          <p:cNvSpPr txBox="1"/>
+          <p:nvPr/>
+        </p:nvSpPr>
+        <p:spPr>
+          <a:xfrm rot="16200000">
+            <a:off x="4252136" y="3273959"/>
+            <a:ext cx="713657" cy="261610"/>
+          </a:xfrm>
+          <a:prstGeom prst="rect">
+            <a:avLst/>
+          </a:prstGeom>
+          <a:noFill/>
+        </p:spPr>
+        <p:txBody>
+          <a:bodyPr wrap="none" rtlCol="0">
+            <a:spAutoFit/>
+          </a:bodyPr>
+          <a:lstStyle/>
+          <a:p>
+            <a:r>
+              <a:rPr lang="pt-BR" sz="1100" dirty="0"/>
+              <a:t>F1- Score</a:t>
+            </a:r>
+            <a:endParaRPr lang="en-US" sz="1100" dirty="0"/>
+          </a:p>
+        </p:txBody>
+      </p:sp>
+      <p:sp>
+        <p:nvSpPr>
+          <p:cNvPr id="49" name="TextBox 48">
+            <a:extLst>
+              <a:ext uri="{FF2B5EF4-FFF2-40B4-BE49-F238E27FC236}">
+                <a16:creationId xmlns:a16="http://schemas.microsoft.com/office/drawing/2014/main" id="{32C5171E-1D05-4B25-8815-C55721EB40D5}"/>
+              </a:ext>
+            </a:extLst>
+          </p:cNvPr>
+          <p:cNvSpPr txBox="1"/>
+          <p:nvPr/>
+        </p:nvSpPr>
+        <p:spPr>
+          <a:xfrm rot="16200000">
+            <a:off x="7186680" y="3290738"/>
+            <a:ext cx="872355" cy="261610"/>
+          </a:xfrm>
+          <a:prstGeom prst="rect">
+            <a:avLst/>
+          </a:prstGeom>
+          <a:noFill/>
+        </p:spPr>
+        <p:txBody>
+          <a:bodyPr wrap="none" rtlCol="0">
+            <a:spAutoFit/>
+          </a:bodyPr>
+          <a:lstStyle/>
+          <a:p>
+            <a:r>
+              <a:rPr lang="pt-BR" sz="1100" dirty="0"/>
+              <a:t>J de Youden</a:t>
+            </a:r>
+            <a:endParaRPr lang="en-US" sz="1100" dirty="0"/>
+          </a:p>
+        </p:txBody>
+      </p:sp>
+    </p:spTree>
+    <p:extLst>
+      <p:ext uri="{BB962C8B-B14F-4D97-AF65-F5344CB8AC3E}">
+        <p14:creationId xmlns:p14="http://schemas.microsoft.com/office/powerpoint/2010/main" val="3299965243"/>
+      </p:ext>
+    </p:extLst>
+  </p:cSld>
+  <p:clrMapOvr>
+    <a:masterClrMapping/>
+  </p:clrMapOvr>
+</p:sld>
+</file>
+
+<file path=ppt/slides/slide9.xml><?xml version="1.0" encoding="utf-8"?>
+<p:sld xmlns:a="http://schemas.openxmlformats.org/drawingml/2006/main" xmlns:r="http://schemas.openxmlformats.org/officeDocument/2006/relationships" xmlns:p="http://schemas.openxmlformats.org/presentationml/2006/main">
+  <p:cSld>
+    <p:spTree>
+      <p:nvGrpSpPr>
+        <p:cNvPr id="1" name=""/>
+        <p:cNvGrpSpPr/>
+        <p:nvPr/>
+      </p:nvGrpSpPr>
+      <p:grpSpPr>
+        <a:xfrm>
+          <a:off x="0" y="0"/>
+          <a:ext cx="0" cy="0"/>
+          <a:chOff x="0" y="0"/>
+          <a:chExt cx="0" cy="0"/>
+        </a:xfrm>
+      </p:grpSpPr>
+      <p:grpSp>
+        <p:nvGrpSpPr>
+          <p:cNvPr id="36" name="Group 35">
+            <a:extLst>
+              <a:ext uri="{FF2B5EF4-FFF2-40B4-BE49-F238E27FC236}">
+                <a16:creationId xmlns:a16="http://schemas.microsoft.com/office/drawing/2014/main" id="{FF966489-5288-4652-BCEC-CD57098BEC6C}"/>
+              </a:ext>
+            </a:extLst>
+          </p:cNvPr>
+          <p:cNvGrpSpPr/>
+          <p:nvPr/>
+        </p:nvGrpSpPr>
+        <p:grpSpPr>
+          <a:xfrm>
+            <a:off x="550545" y="2152645"/>
+            <a:ext cx="11355740" cy="2601402"/>
+            <a:chOff x="579120" y="2171695"/>
+            <a:chExt cx="11355740" cy="2601402"/>
+          </a:xfrm>
+        </p:grpSpPr>
+        <p:grpSp>
+          <p:nvGrpSpPr>
+            <p:cNvPr id="8" name="Group 7">
+              <a:extLst>
+                <a:ext uri="{FF2B5EF4-FFF2-40B4-BE49-F238E27FC236}">
+                  <a16:creationId xmlns:a16="http://schemas.microsoft.com/office/drawing/2014/main" id="{2848A431-9E23-4BA2-BACE-1EBA158D0801}"/>
+                </a:ext>
+              </a:extLst>
+            </p:cNvPr>
+            <p:cNvGrpSpPr/>
+            <p:nvPr/>
+          </p:nvGrpSpPr>
+          <p:grpSpPr>
+            <a:xfrm>
+              <a:off x="579120" y="2171699"/>
+              <a:ext cx="1375155" cy="307778"/>
+              <a:chOff x="579120" y="2171699"/>
+              <a:chExt cx="1375155" cy="307778"/>
+            </a:xfrm>
+          </p:grpSpPr>
+          <p:sp>
+            <p:nvSpPr>
+              <p:cNvPr id="6" name="TextBox 5">
+                <a:extLst>
+                  <a:ext uri="{FF2B5EF4-FFF2-40B4-BE49-F238E27FC236}">
+                    <a16:creationId xmlns:a16="http://schemas.microsoft.com/office/drawing/2014/main" id="{8E238604-ECA4-4142-B300-56F6FE2BEFC6}"/>
+                  </a:ext>
+                </a:extLst>
+              </p:cNvPr>
+              <p:cNvSpPr txBox="1"/>
+              <p:nvPr/>
+            </p:nvSpPr>
+            <p:spPr>
+              <a:xfrm>
+                <a:off x="579120" y="2171700"/>
+                <a:ext cx="498855" cy="307777"/>
+              </a:xfrm>
+              <a:prstGeom prst="rect">
+                <a:avLst/>
+              </a:prstGeom>
+              <a:noFill/>
+            </p:spPr>
+            <p:txBody>
+              <a:bodyPr wrap="none" rtlCol="0">
+                <a:spAutoFit/>
+              </a:bodyPr>
+              <a:lstStyle/>
+              <a:p>
+                <a:r>
+                  <a:rPr lang="pt-BR" sz="1400" b="1" dirty="0">
+                    <a:solidFill>
+                      <a:schemeClr val="bg1"/>
+                    </a:solidFill>
+                  </a:rPr>
+                  <a:t>50%</a:t>
+                </a:r>
+                <a:endParaRPr lang="en-US" sz="1400" b="1" dirty="0">
+                  <a:solidFill>
+                    <a:schemeClr val="bg1"/>
+                  </a:solidFill>
+                </a:endParaRPr>
+              </a:p>
+            </p:txBody>
+          </p:sp>
+          <p:sp>
+            <p:nvSpPr>
+              <p:cNvPr id="7" name="TextBox 6">
+                <a:extLst>
+                  <a:ext uri="{FF2B5EF4-FFF2-40B4-BE49-F238E27FC236}">
+                    <a16:creationId xmlns:a16="http://schemas.microsoft.com/office/drawing/2014/main" id="{139F681A-1A75-49E8-9E59-6F8F8D74F180}"/>
+                  </a:ext>
+                </a:extLst>
+              </p:cNvPr>
+              <p:cNvSpPr txBox="1"/>
+              <p:nvPr/>
+            </p:nvSpPr>
+            <p:spPr>
+              <a:xfrm>
+                <a:off x="1455420" y="2171699"/>
+                <a:ext cx="498855" cy="307777"/>
+              </a:xfrm>
+              <a:prstGeom prst="rect">
+                <a:avLst/>
+              </a:prstGeom>
+              <a:noFill/>
+            </p:spPr>
+            <p:txBody>
+              <a:bodyPr wrap="none" rtlCol="0">
+                <a:spAutoFit/>
+              </a:bodyPr>
+              <a:lstStyle/>
+              <a:p>
+                <a:r>
+                  <a:rPr lang="pt-BR" sz="1400" b="1" dirty="0">
+                    <a:solidFill>
+                      <a:schemeClr val="bg1"/>
+                    </a:solidFill>
+                  </a:rPr>
+                  <a:t>50%</a:t>
+                </a:r>
+                <a:endParaRPr lang="en-US" sz="1400" b="1" dirty="0">
+                  <a:solidFill>
+                    <a:schemeClr val="bg1"/>
+                  </a:solidFill>
+                </a:endParaRPr>
+              </a:p>
+            </p:txBody>
+          </p:sp>
+        </p:grpSp>
+        <p:grpSp>
+          <p:nvGrpSpPr>
+            <p:cNvPr id="9" name="Group 8">
+              <a:extLst>
+                <a:ext uri="{FF2B5EF4-FFF2-40B4-BE49-F238E27FC236}">
+                  <a16:creationId xmlns:a16="http://schemas.microsoft.com/office/drawing/2014/main" id="{EFE97929-220D-4588-9ED6-C66AEE5170E6}"/>
+                </a:ext>
+              </a:extLst>
+            </p:cNvPr>
+            <p:cNvGrpSpPr/>
+            <p:nvPr/>
+          </p:nvGrpSpPr>
+          <p:grpSpPr>
+            <a:xfrm>
+              <a:off x="3070860" y="2171698"/>
+              <a:ext cx="1375155" cy="307778"/>
+              <a:chOff x="579120" y="2171699"/>
+              <a:chExt cx="1375155" cy="307778"/>
+            </a:xfrm>
+          </p:grpSpPr>
+          <p:sp>
+            <p:nvSpPr>
+              <p:cNvPr id="10" name="TextBox 9">
+                <a:extLst>
+                  <a:ext uri="{FF2B5EF4-FFF2-40B4-BE49-F238E27FC236}">
+                    <a16:creationId xmlns:a16="http://schemas.microsoft.com/office/drawing/2014/main" id="{9B0E0DB4-210B-4FF5-B9B6-3CF321328F85}"/>
+                  </a:ext>
+                </a:extLst>
+              </p:cNvPr>
+              <p:cNvSpPr txBox="1"/>
+              <p:nvPr/>
+            </p:nvSpPr>
+            <p:spPr>
+              <a:xfrm>
+                <a:off x="579120" y="2171700"/>
+                <a:ext cx="498855" cy="307777"/>
+              </a:xfrm>
+              <a:prstGeom prst="rect">
+                <a:avLst/>
+              </a:prstGeom>
+              <a:noFill/>
+            </p:spPr>
+            <p:txBody>
+              <a:bodyPr wrap="none" rtlCol="0">
+                <a:spAutoFit/>
+              </a:bodyPr>
+              <a:lstStyle/>
+              <a:p>
+                <a:r>
+                  <a:rPr lang="pt-BR" sz="1400" b="1" dirty="0">
+                    <a:solidFill>
+                      <a:schemeClr val="bg1"/>
+                    </a:solidFill>
+                  </a:rPr>
+                  <a:t>49%</a:t>
+                </a:r>
+                <a:endParaRPr lang="en-US" sz="1400" b="1" dirty="0">
+                  <a:solidFill>
+                    <a:schemeClr val="bg1"/>
+                  </a:solidFill>
+                </a:endParaRPr>
+              </a:p>
+            </p:txBody>
+          </p:sp>
+          <p:sp>
+            <p:nvSpPr>
+              <p:cNvPr id="11" name="TextBox 10">
+                <a:extLst>
+                  <a:ext uri="{FF2B5EF4-FFF2-40B4-BE49-F238E27FC236}">
+                    <a16:creationId xmlns:a16="http://schemas.microsoft.com/office/drawing/2014/main" id="{85859C73-EFF2-40E0-940C-62C4246D582A}"/>
+                  </a:ext>
+                </a:extLst>
+              </p:cNvPr>
+              <p:cNvSpPr txBox="1"/>
+              <p:nvPr/>
+            </p:nvSpPr>
+            <p:spPr>
+              <a:xfrm>
+                <a:off x="1455420" y="2171699"/>
+                <a:ext cx="498855" cy="307777"/>
+              </a:xfrm>
+              <a:prstGeom prst="rect">
+                <a:avLst/>
+              </a:prstGeom>
+              <a:noFill/>
+            </p:spPr>
+            <p:txBody>
+              <a:bodyPr wrap="none" rtlCol="0">
+                <a:spAutoFit/>
+              </a:bodyPr>
+              <a:lstStyle/>
+              <a:p>
+                <a:r>
+                  <a:rPr lang="pt-BR" sz="1400" b="1" dirty="0">
+                    <a:solidFill>
+                      <a:schemeClr val="bg1"/>
+                    </a:solidFill>
+                  </a:rPr>
+                  <a:t>51%</a:t>
+                </a:r>
+                <a:endParaRPr lang="en-US" sz="1400" b="1" dirty="0">
+                  <a:solidFill>
+                    <a:schemeClr val="bg1"/>
+                  </a:solidFill>
+                </a:endParaRPr>
+              </a:p>
+            </p:txBody>
+          </p:sp>
+        </p:grpSp>
+        <p:grpSp>
+          <p:nvGrpSpPr>
+            <p:cNvPr id="12" name="Group 11">
+              <a:extLst>
+                <a:ext uri="{FF2B5EF4-FFF2-40B4-BE49-F238E27FC236}">
+                  <a16:creationId xmlns:a16="http://schemas.microsoft.com/office/drawing/2014/main" id="{8B36A9D6-C0B2-46BC-A6F7-E139B965A8F9}"/>
+                </a:ext>
+              </a:extLst>
+            </p:cNvPr>
+            <p:cNvGrpSpPr/>
+            <p:nvPr/>
+          </p:nvGrpSpPr>
+          <p:grpSpPr>
+            <a:xfrm>
+              <a:off x="5570220" y="2171697"/>
+              <a:ext cx="1375155" cy="307778"/>
+              <a:chOff x="579120" y="2171699"/>
+              <a:chExt cx="1375155" cy="307778"/>
+            </a:xfrm>
+          </p:grpSpPr>
+          <p:sp>
+            <p:nvSpPr>
+              <p:cNvPr id="13" name="TextBox 12">
+                <a:extLst>
+                  <a:ext uri="{FF2B5EF4-FFF2-40B4-BE49-F238E27FC236}">
+                    <a16:creationId xmlns:a16="http://schemas.microsoft.com/office/drawing/2014/main" id="{291A92FC-FAAE-4DF2-AE90-C7B33A596839}"/>
+                  </a:ext>
+                </a:extLst>
+              </p:cNvPr>
+              <p:cNvSpPr txBox="1"/>
+              <p:nvPr/>
+            </p:nvSpPr>
+            <p:spPr>
+              <a:xfrm>
+                <a:off x="579120" y="2171700"/>
+                <a:ext cx="498855" cy="307777"/>
+              </a:xfrm>
+              <a:prstGeom prst="rect">
+                <a:avLst/>
+              </a:prstGeom>
+              <a:noFill/>
+            </p:spPr>
+            <p:txBody>
+              <a:bodyPr wrap="none" rtlCol="0">
+                <a:spAutoFit/>
+              </a:bodyPr>
+              <a:lstStyle/>
+              <a:p>
+                <a:r>
+                  <a:rPr lang="pt-BR" sz="1400" b="1" dirty="0">
+                    <a:solidFill>
+                      <a:schemeClr val="bg1"/>
+                    </a:solidFill>
+                  </a:rPr>
+                  <a:t>49%</a:t>
+                </a:r>
+                <a:endParaRPr lang="en-US" sz="1400" b="1" dirty="0">
+                  <a:solidFill>
+                    <a:schemeClr val="bg1"/>
+                  </a:solidFill>
+                </a:endParaRPr>
+              </a:p>
+            </p:txBody>
+          </p:sp>
+          <p:sp>
+            <p:nvSpPr>
+              <p:cNvPr id="14" name="TextBox 13">
+                <a:extLst>
+                  <a:ext uri="{FF2B5EF4-FFF2-40B4-BE49-F238E27FC236}">
+                    <a16:creationId xmlns:a16="http://schemas.microsoft.com/office/drawing/2014/main" id="{6F8949E6-CC37-40B8-8B52-27B1FDB2C5C1}"/>
+                  </a:ext>
+                </a:extLst>
+              </p:cNvPr>
+              <p:cNvSpPr txBox="1"/>
+              <p:nvPr/>
+            </p:nvSpPr>
+            <p:spPr>
+              <a:xfrm>
+                <a:off x="1455420" y="2171699"/>
+                <a:ext cx="498855" cy="307777"/>
+              </a:xfrm>
+              <a:prstGeom prst="rect">
+                <a:avLst/>
+              </a:prstGeom>
+              <a:noFill/>
+            </p:spPr>
+            <p:txBody>
+              <a:bodyPr wrap="none" rtlCol="0">
+                <a:spAutoFit/>
+              </a:bodyPr>
+              <a:lstStyle/>
+              <a:p>
+                <a:r>
+                  <a:rPr lang="pt-BR" sz="1400" b="1" dirty="0">
+                    <a:solidFill>
+                      <a:schemeClr val="bg1"/>
+                    </a:solidFill>
+                  </a:rPr>
+                  <a:t>51%</a:t>
+                </a:r>
+                <a:endParaRPr lang="en-US" sz="1400" b="1" dirty="0">
+                  <a:solidFill>
+                    <a:schemeClr val="bg1"/>
+                  </a:solidFill>
+                </a:endParaRPr>
+              </a:p>
+            </p:txBody>
+          </p:sp>
+        </p:grpSp>
+        <p:grpSp>
+          <p:nvGrpSpPr>
+            <p:cNvPr id="15" name="Group 14">
+              <a:extLst>
+                <a:ext uri="{FF2B5EF4-FFF2-40B4-BE49-F238E27FC236}">
+                  <a16:creationId xmlns:a16="http://schemas.microsoft.com/office/drawing/2014/main" id="{A12DD572-CEEE-4BC1-BF8D-CCBFE214A29A}"/>
+                </a:ext>
+              </a:extLst>
+            </p:cNvPr>
+            <p:cNvGrpSpPr/>
+            <p:nvPr/>
+          </p:nvGrpSpPr>
+          <p:grpSpPr>
+            <a:xfrm>
+              <a:off x="8054340" y="2171696"/>
+              <a:ext cx="1375155" cy="307778"/>
+              <a:chOff x="579120" y="2171699"/>
+              <a:chExt cx="1375155" cy="307778"/>
+            </a:xfrm>
+          </p:grpSpPr>
+          <p:sp>
+            <p:nvSpPr>
+              <p:cNvPr id="16" name="TextBox 15">
+                <a:extLst>
+                  <a:ext uri="{FF2B5EF4-FFF2-40B4-BE49-F238E27FC236}">
+                    <a16:creationId xmlns:a16="http://schemas.microsoft.com/office/drawing/2014/main" id="{4BCDC8BB-AE43-4D7B-9A2A-AD517CDE0BE3}"/>
+                  </a:ext>
+                </a:extLst>
+              </p:cNvPr>
+              <p:cNvSpPr txBox="1"/>
+              <p:nvPr/>
+            </p:nvSpPr>
+            <p:spPr>
+              <a:xfrm>
+                <a:off x="579120" y="2171700"/>
+                <a:ext cx="498855" cy="307777"/>
+              </a:xfrm>
+              <a:prstGeom prst="rect">
+                <a:avLst/>
+              </a:prstGeom>
+              <a:noFill/>
+            </p:spPr>
+            <p:txBody>
+              <a:bodyPr wrap="none" rtlCol="0">
+                <a:spAutoFit/>
+              </a:bodyPr>
+              <a:lstStyle/>
+              <a:p>
+                <a:r>
+                  <a:rPr lang="pt-BR" sz="1400" b="1" dirty="0">
+                    <a:solidFill>
+                      <a:schemeClr val="bg1"/>
+                    </a:solidFill>
+                  </a:rPr>
+                  <a:t>50%</a:t>
+                </a:r>
+                <a:endParaRPr lang="en-US" sz="1400" b="1" dirty="0">
+                  <a:solidFill>
+                    <a:schemeClr val="bg1"/>
+                  </a:solidFill>
+                </a:endParaRPr>
+              </a:p>
+            </p:txBody>
+          </p:sp>
+          <p:sp>
+            <p:nvSpPr>
+              <p:cNvPr id="17" name="TextBox 16">
+                <a:extLst>
+                  <a:ext uri="{FF2B5EF4-FFF2-40B4-BE49-F238E27FC236}">
+                    <a16:creationId xmlns:a16="http://schemas.microsoft.com/office/drawing/2014/main" id="{39D018F1-FF6C-480B-8EFA-89D6E09A08E5}"/>
+                  </a:ext>
+                </a:extLst>
+              </p:cNvPr>
+              <p:cNvSpPr txBox="1"/>
+              <p:nvPr/>
+            </p:nvSpPr>
+            <p:spPr>
+              <a:xfrm>
+                <a:off x="1455420" y="2171699"/>
+                <a:ext cx="498855" cy="307777"/>
+              </a:xfrm>
+              <a:prstGeom prst="rect">
+                <a:avLst/>
+              </a:prstGeom>
+              <a:noFill/>
+            </p:spPr>
+            <p:txBody>
+              <a:bodyPr wrap="none" rtlCol="0">
+                <a:spAutoFit/>
+              </a:bodyPr>
+              <a:lstStyle/>
+              <a:p>
+                <a:r>
+                  <a:rPr lang="pt-BR" sz="1400" b="1" dirty="0">
+                    <a:solidFill>
+                      <a:schemeClr val="bg1"/>
+                    </a:solidFill>
+                  </a:rPr>
+                  <a:t>50%</a:t>
+                </a:r>
+                <a:endParaRPr lang="en-US" sz="1400" b="1" dirty="0">
+                  <a:solidFill>
+                    <a:schemeClr val="bg1"/>
+                  </a:solidFill>
+                </a:endParaRPr>
+              </a:p>
+            </p:txBody>
+          </p:sp>
+        </p:grpSp>
+        <p:grpSp>
+          <p:nvGrpSpPr>
+            <p:cNvPr id="18" name="Group 17">
+              <a:extLst>
+                <a:ext uri="{FF2B5EF4-FFF2-40B4-BE49-F238E27FC236}">
+                  <a16:creationId xmlns:a16="http://schemas.microsoft.com/office/drawing/2014/main" id="{5299A749-D298-4C8D-AC2E-3B0CACEFD554}"/>
+                </a:ext>
+              </a:extLst>
+            </p:cNvPr>
+            <p:cNvGrpSpPr/>
+            <p:nvPr/>
+          </p:nvGrpSpPr>
+          <p:grpSpPr>
+            <a:xfrm>
+              <a:off x="10546080" y="2171695"/>
+              <a:ext cx="1375155" cy="307778"/>
+              <a:chOff x="579120" y="2171699"/>
+              <a:chExt cx="1375155" cy="307778"/>
+            </a:xfrm>
+          </p:grpSpPr>
+          <p:sp>
+            <p:nvSpPr>
+              <p:cNvPr id="19" name="TextBox 18">
+                <a:extLst>
+                  <a:ext uri="{FF2B5EF4-FFF2-40B4-BE49-F238E27FC236}">
+                    <a16:creationId xmlns:a16="http://schemas.microsoft.com/office/drawing/2014/main" id="{5617C981-BB99-4DAA-8603-0DC4A47D7DE5}"/>
+                  </a:ext>
+                </a:extLst>
+              </p:cNvPr>
+              <p:cNvSpPr txBox="1"/>
+              <p:nvPr/>
+            </p:nvSpPr>
+            <p:spPr>
+              <a:xfrm>
+                <a:off x="579120" y="2171700"/>
+                <a:ext cx="498855" cy="307777"/>
+              </a:xfrm>
+              <a:prstGeom prst="rect">
+                <a:avLst/>
+              </a:prstGeom>
+              <a:noFill/>
+            </p:spPr>
+            <p:txBody>
+              <a:bodyPr wrap="none" rtlCol="0">
+                <a:spAutoFit/>
+              </a:bodyPr>
+              <a:lstStyle/>
+              <a:p>
+                <a:r>
+                  <a:rPr lang="pt-BR" sz="1400" b="1" dirty="0">
+                    <a:solidFill>
+                      <a:schemeClr val="bg1"/>
+                    </a:solidFill>
+                  </a:rPr>
+                  <a:t>49%</a:t>
+                </a:r>
+                <a:endParaRPr lang="en-US" sz="1400" b="1" dirty="0">
+                  <a:solidFill>
+                    <a:schemeClr val="bg1"/>
+                  </a:solidFill>
+                </a:endParaRPr>
+              </a:p>
+            </p:txBody>
+          </p:sp>
+          <p:sp>
+            <p:nvSpPr>
+              <p:cNvPr id="20" name="TextBox 19">
+                <a:extLst>
+                  <a:ext uri="{FF2B5EF4-FFF2-40B4-BE49-F238E27FC236}">
+                    <a16:creationId xmlns:a16="http://schemas.microsoft.com/office/drawing/2014/main" id="{6B7C8F71-5909-47F4-AB11-888E07F86727}"/>
+                  </a:ext>
+                </a:extLst>
+              </p:cNvPr>
+              <p:cNvSpPr txBox="1"/>
+              <p:nvPr/>
+            </p:nvSpPr>
+            <p:spPr>
+              <a:xfrm>
+                <a:off x="1455420" y="2171699"/>
+                <a:ext cx="498855" cy="307777"/>
+              </a:xfrm>
+              <a:prstGeom prst="rect">
+                <a:avLst/>
+              </a:prstGeom>
+              <a:noFill/>
+            </p:spPr>
+            <p:txBody>
+              <a:bodyPr wrap="none" rtlCol="0">
+                <a:spAutoFit/>
+              </a:bodyPr>
+              <a:lstStyle/>
+              <a:p>
+                <a:r>
+                  <a:rPr lang="pt-BR" sz="1400" b="1" dirty="0">
+                    <a:solidFill>
+                      <a:schemeClr val="bg1"/>
+                    </a:solidFill>
+                  </a:rPr>
+                  <a:t>51%</a:t>
+                </a:r>
+                <a:endParaRPr lang="en-US" sz="1400" b="1" dirty="0">
+                  <a:solidFill>
+                    <a:schemeClr val="bg1"/>
+                  </a:solidFill>
+                </a:endParaRPr>
+              </a:p>
+            </p:txBody>
+          </p:sp>
+        </p:grpSp>
+        <p:grpSp>
+          <p:nvGrpSpPr>
+            <p:cNvPr id="21" name="Group 20">
+              <a:extLst>
+                <a:ext uri="{FF2B5EF4-FFF2-40B4-BE49-F238E27FC236}">
+                  <a16:creationId xmlns:a16="http://schemas.microsoft.com/office/drawing/2014/main" id="{938BD4D0-B037-4B46-987B-B70689B93021}"/>
+                </a:ext>
+              </a:extLst>
+            </p:cNvPr>
+            <p:cNvGrpSpPr/>
+            <p:nvPr/>
+          </p:nvGrpSpPr>
+          <p:grpSpPr>
+            <a:xfrm>
+              <a:off x="592745" y="4465319"/>
+              <a:ext cx="1375155" cy="307778"/>
+              <a:chOff x="579120" y="2171699"/>
+              <a:chExt cx="1375155" cy="307778"/>
+            </a:xfrm>
+          </p:grpSpPr>
+          <p:sp>
+            <p:nvSpPr>
+              <p:cNvPr id="22" name="TextBox 21">
+                <a:extLst>
+                  <a:ext uri="{FF2B5EF4-FFF2-40B4-BE49-F238E27FC236}">
+                    <a16:creationId xmlns:a16="http://schemas.microsoft.com/office/drawing/2014/main" id="{DBCBF5E2-FE3B-4528-B5C0-61C3D27DD470}"/>
+                  </a:ext>
+                </a:extLst>
+              </p:cNvPr>
+              <p:cNvSpPr txBox="1"/>
+              <p:nvPr/>
+            </p:nvSpPr>
+            <p:spPr>
+              <a:xfrm>
+                <a:off x="579120" y="2171700"/>
+                <a:ext cx="498855" cy="307777"/>
+              </a:xfrm>
+              <a:prstGeom prst="rect">
+                <a:avLst/>
+              </a:prstGeom>
+              <a:noFill/>
+            </p:spPr>
+            <p:txBody>
+              <a:bodyPr wrap="none" rtlCol="0">
+                <a:spAutoFit/>
+              </a:bodyPr>
+              <a:lstStyle/>
+              <a:p>
+                <a:r>
+                  <a:rPr lang="pt-BR" sz="1400" b="1" dirty="0">
+                    <a:solidFill>
+                      <a:schemeClr val="bg1"/>
+                    </a:solidFill>
+                  </a:rPr>
+                  <a:t>45%</a:t>
+                </a:r>
+                <a:endParaRPr lang="en-US" sz="1400" b="1" dirty="0">
+                  <a:solidFill>
+                    <a:schemeClr val="bg1"/>
+                  </a:solidFill>
+                </a:endParaRPr>
+              </a:p>
+            </p:txBody>
+          </p:sp>
+          <p:sp>
+            <p:nvSpPr>
+              <p:cNvPr id="23" name="TextBox 22">
+                <a:extLst>
+                  <a:ext uri="{FF2B5EF4-FFF2-40B4-BE49-F238E27FC236}">
+                    <a16:creationId xmlns:a16="http://schemas.microsoft.com/office/drawing/2014/main" id="{261B23EF-2FD5-4291-AAFB-87C63D36B2AD}"/>
+                  </a:ext>
+                </a:extLst>
+              </p:cNvPr>
+              <p:cNvSpPr txBox="1"/>
+              <p:nvPr/>
+            </p:nvSpPr>
+            <p:spPr>
+              <a:xfrm>
+                <a:off x="1455420" y="2171699"/>
+                <a:ext cx="498855" cy="307777"/>
+              </a:xfrm>
+              <a:prstGeom prst="rect">
+                <a:avLst/>
+              </a:prstGeom>
+              <a:noFill/>
+            </p:spPr>
+            <p:txBody>
+              <a:bodyPr wrap="none" rtlCol="0">
+                <a:spAutoFit/>
+              </a:bodyPr>
+              <a:lstStyle/>
+              <a:p>
+                <a:r>
+                  <a:rPr lang="pt-BR" sz="1400" b="1" dirty="0">
+                    <a:solidFill>
+                      <a:schemeClr val="bg1"/>
+                    </a:solidFill>
+                  </a:rPr>
+                  <a:t>55%</a:t>
+                </a:r>
+                <a:endParaRPr lang="en-US" sz="1400" b="1" dirty="0">
+                  <a:solidFill>
+                    <a:schemeClr val="bg1"/>
+                  </a:solidFill>
+                </a:endParaRPr>
+              </a:p>
+            </p:txBody>
+          </p:sp>
+        </p:grpSp>
+        <p:grpSp>
+          <p:nvGrpSpPr>
+            <p:cNvPr id="24" name="Group 23">
+              <a:extLst>
+                <a:ext uri="{FF2B5EF4-FFF2-40B4-BE49-F238E27FC236}">
+                  <a16:creationId xmlns:a16="http://schemas.microsoft.com/office/drawing/2014/main" id="{18590F91-6242-4B78-8995-CFDA556DCC1B}"/>
+                </a:ext>
+              </a:extLst>
+            </p:cNvPr>
+            <p:cNvGrpSpPr/>
+            <p:nvPr/>
+          </p:nvGrpSpPr>
+          <p:grpSpPr>
+            <a:xfrm>
+              <a:off x="3084485" y="4465318"/>
+              <a:ext cx="1375155" cy="307778"/>
+              <a:chOff x="579120" y="2171699"/>
+              <a:chExt cx="1375155" cy="307778"/>
+            </a:xfrm>
+          </p:grpSpPr>
+          <p:sp>
+            <p:nvSpPr>
+              <p:cNvPr id="25" name="TextBox 24">
+                <a:extLst>
+                  <a:ext uri="{FF2B5EF4-FFF2-40B4-BE49-F238E27FC236}">
+                    <a16:creationId xmlns:a16="http://schemas.microsoft.com/office/drawing/2014/main" id="{5589C3A3-1061-44B1-B97B-3A599BDF7348}"/>
+                  </a:ext>
+                </a:extLst>
+              </p:cNvPr>
+              <p:cNvSpPr txBox="1"/>
+              <p:nvPr/>
+            </p:nvSpPr>
+            <p:spPr>
+              <a:xfrm>
+                <a:off x="579120" y="2171700"/>
+                <a:ext cx="498855" cy="307777"/>
+              </a:xfrm>
+              <a:prstGeom prst="rect">
+                <a:avLst/>
+              </a:prstGeom>
+              <a:noFill/>
+            </p:spPr>
+            <p:txBody>
+              <a:bodyPr wrap="none" rtlCol="0">
+                <a:spAutoFit/>
+              </a:bodyPr>
+              <a:lstStyle/>
+              <a:p>
+                <a:r>
+                  <a:rPr lang="pt-BR" sz="1400" b="1" dirty="0">
+                    <a:solidFill>
+                      <a:schemeClr val="bg1"/>
+                    </a:solidFill>
+                  </a:rPr>
+                  <a:t>47%</a:t>
+                </a:r>
+                <a:endParaRPr lang="en-US" sz="1400" b="1" dirty="0">
+                  <a:solidFill>
+                    <a:schemeClr val="bg1"/>
+                  </a:solidFill>
+                </a:endParaRPr>
+              </a:p>
+            </p:txBody>
+          </p:sp>
+          <p:sp>
+            <p:nvSpPr>
+              <p:cNvPr id="26" name="TextBox 25">
+                <a:extLst>
+                  <a:ext uri="{FF2B5EF4-FFF2-40B4-BE49-F238E27FC236}">
+                    <a16:creationId xmlns:a16="http://schemas.microsoft.com/office/drawing/2014/main" id="{A2ECAADB-3124-447C-804B-03537A388BA2}"/>
+                  </a:ext>
+                </a:extLst>
+              </p:cNvPr>
+              <p:cNvSpPr txBox="1"/>
+              <p:nvPr/>
+            </p:nvSpPr>
+            <p:spPr>
+              <a:xfrm>
+                <a:off x="1455420" y="2171699"/>
+                <a:ext cx="498855" cy="307777"/>
+              </a:xfrm>
+              <a:prstGeom prst="rect">
+                <a:avLst/>
+              </a:prstGeom>
+              <a:noFill/>
+            </p:spPr>
+            <p:txBody>
+              <a:bodyPr wrap="none" rtlCol="0">
+                <a:spAutoFit/>
+              </a:bodyPr>
+              <a:lstStyle/>
+              <a:p>
+                <a:r>
+                  <a:rPr lang="pt-BR" sz="1400" b="1" dirty="0">
+                    <a:solidFill>
+                      <a:schemeClr val="bg1"/>
+                    </a:solidFill>
+                  </a:rPr>
+                  <a:t>53%</a:t>
+                </a:r>
+                <a:endParaRPr lang="en-US" sz="1400" b="1" dirty="0">
+                  <a:solidFill>
+                    <a:schemeClr val="bg1"/>
+                  </a:solidFill>
+                </a:endParaRPr>
+              </a:p>
+            </p:txBody>
+          </p:sp>
+        </p:grpSp>
+        <p:grpSp>
+          <p:nvGrpSpPr>
+            <p:cNvPr id="27" name="Group 26">
+              <a:extLst>
+                <a:ext uri="{FF2B5EF4-FFF2-40B4-BE49-F238E27FC236}">
+                  <a16:creationId xmlns:a16="http://schemas.microsoft.com/office/drawing/2014/main" id="{D1E6CC4A-3E1D-44F0-9F38-B75A699CEAA5}"/>
+                </a:ext>
+              </a:extLst>
+            </p:cNvPr>
+            <p:cNvGrpSpPr/>
+            <p:nvPr/>
+          </p:nvGrpSpPr>
+          <p:grpSpPr>
+            <a:xfrm>
+              <a:off x="5583845" y="4465317"/>
+              <a:ext cx="1375155" cy="307778"/>
+              <a:chOff x="579120" y="2171699"/>
+              <a:chExt cx="1375155" cy="307778"/>
+            </a:xfrm>
+          </p:grpSpPr>
+          <p:sp>
+            <p:nvSpPr>
+              <p:cNvPr id="28" name="TextBox 27">
+                <a:extLst>
+                  <a:ext uri="{FF2B5EF4-FFF2-40B4-BE49-F238E27FC236}">
+                    <a16:creationId xmlns:a16="http://schemas.microsoft.com/office/drawing/2014/main" id="{6E5A4AFA-F3C7-4A66-A84C-7924B609A6F4}"/>
+                  </a:ext>
+                </a:extLst>
+              </p:cNvPr>
+              <p:cNvSpPr txBox="1"/>
+              <p:nvPr/>
+            </p:nvSpPr>
+            <p:spPr>
+              <a:xfrm>
+                <a:off x="579120" y="2171700"/>
+                <a:ext cx="498855" cy="307777"/>
+              </a:xfrm>
+              <a:prstGeom prst="rect">
+                <a:avLst/>
+              </a:prstGeom>
+              <a:noFill/>
+            </p:spPr>
+            <p:txBody>
+              <a:bodyPr wrap="none" rtlCol="0">
+                <a:spAutoFit/>
+              </a:bodyPr>
+              <a:lstStyle/>
+              <a:p>
+                <a:r>
+                  <a:rPr lang="pt-BR" sz="1400" b="1" dirty="0">
+                    <a:solidFill>
+                      <a:schemeClr val="bg1"/>
+                    </a:solidFill>
+                  </a:rPr>
+                  <a:t>51%</a:t>
+                </a:r>
+                <a:endParaRPr lang="en-US" sz="1400" b="1" dirty="0">
+                  <a:solidFill>
+                    <a:schemeClr val="bg1"/>
+                  </a:solidFill>
+                </a:endParaRPr>
+              </a:p>
+            </p:txBody>
+          </p:sp>
+          <p:sp>
+            <p:nvSpPr>
+              <p:cNvPr id="29" name="TextBox 28">
+                <a:extLst>
+                  <a:ext uri="{FF2B5EF4-FFF2-40B4-BE49-F238E27FC236}">
+                    <a16:creationId xmlns:a16="http://schemas.microsoft.com/office/drawing/2014/main" id="{DEC6FFF2-7740-4077-8B0F-541947D639F8}"/>
+                  </a:ext>
+                </a:extLst>
+              </p:cNvPr>
+              <p:cNvSpPr txBox="1"/>
+              <p:nvPr/>
+            </p:nvSpPr>
+            <p:spPr>
+              <a:xfrm>
+                <a:off x="1455420" y="2171699"/>
+                <a:ext cx="498855" cy="307777"/>
+              </a:xfrm>
+              <a:prstGeom prst="rect">
+                <a:avLst/>
+              </a:prstGeom>
+              <a:noFill/>
+            </p:spPr>
+            <p:txBody>
+              <a:bodyPr wrap="none" rtlCol="0">
+                <a:spAutoFit/>
+              </a:bodyPr>
+              <a:lstStyle/>
+              <a:p>
+                <a:r>
+                  <a:rPr lang="pt-BR" sz="1400" b="1" dirty="0">
+                    <a:solidFill>
+                      <a:schemeClr val="bg1"/>
+                    </a:solidFill>
+                  </a:rPr>
+                  <a:t>48%</a:t>
+                </a:r>
+                <a:endParaRPr lang="en-US" sz="1400" b="1" dirty="0">
+                  <a:solidFill>
+                    <a:schemeClr val="bg1"/>
+                  </a:solidFill>
+                </a:endParaRPr>
+              </a:p>
+            </p:txBody>
+          </p:sp>
+        </p:grpSp>
+        <p:grpSp>
+          <p:nvGrpSpPr>
+            <p:cNvPr id="30" name="Group 29">
+              <a:extLst>
+                <a:ext uri="{FF2B5EF4-FFF2-40B4-BE49-F238E27FC236}">
+                  <a16:creationId xmlns:a16="http://schemas.microsoft.com/office/drawing/2014/main" id="{C16F722E-EBC8-4FE1-AF06-E56FFCC7D1FA}"/>
+                </a:ext>
+              </a:extLst>
+            </p:cNvPr>
+            <p:cNvGrpSpPr/>
+            <p:nvPr/>
+          </p:nvGrpSpPr>
+          <p:grpSpPr>
+            <a:xfrm>
+              <a:off x="8067965" y="4465316"/>
+              <a:ext cx="1375155" cy="307778"/>
+              <a:chOff x="579120" y="2171699"/>
+              <a:chExt cx="1375155" cy="307778"/>
+            </a:xfrm>
+          </p:grpSpPr>
+          <p:sp>
+            <p:nvSpPr>
+              <p:cNvPr id="31" name="TextBox 30">
+                <a:extLst>
+                  <a:ext uri="{FF2B5EF4-FFF2-40B4-BE49-F238E27FC236}">
+                    <a16:creationId xmlns:a16="http://schemas.microsoft.com/office/drawing/2014/main" id="{B551AA17-151C-40D6-8C89-128BAAF347BA}"/>
+                  </a:ext>
+                </a:extLst>
+              </p:cNvPr>
+              <p:cNvSpPr txBox="1"/>
+              <p:nvPr/>
+            </p:nvSpPr>
+            <p:spPr>
+              <a:xfrm>
+                <a:off x="579120" y="2171700"/>
+                <a:ext cx="498855" cy="307777"/>
+              </a:xfrm>
+              <a:prstGeom prst="rect">
+                <a:avLst/>
+              </a:prstGeom>
+              <a:noFill/>
+            </p:spPr>
+            <p:txBody>
+              <a:bodyPr wrap="none" rtlCol="0">
+                <a:spAutoFit/>
+              </a:bodyPr>
+              <a:lstStyle/>
+              <a:p>
+                <a:r>
+                  <a:rPr lang="pt-BR" sz="1400" b="1" dirty="0">
+                    <a:solidFill>
+                      <a:schemeClr val="bg1"/>
+                    </a:solidFill>
+                  </a:rPr>
+                  <a:t>50%</a:t>
+                </a:r>
+                <a:endParaRPr lang="en-US" sz="1400" b="1" dirty="0">
+                  <a:solidFill>
+                    <a:schemeClr val="bg1"/>
+                  </a:solidFill>
+                </a:endParaRPr>
+              </a:p>
+            </p:txBody>
+          </p:sp>
+          <p:sp>
+            <p:nvSpPr>
+              <p:cNvPr id="32" name="TextBox 31">
+                <a:extLst>
+                  <a:ext uri="{FF2B5EF4-FFF2-40B4-BE49-F238E27FC236}">
+                    <a16:creationId xmlns:a16="http://schemas.microsoft.com/office/drawing/2014/main" id="{EFFBF39E-14F6-4F13-B51C-5E6B8DCB1BB7}"/>
+                  </a:ext>
+                </a:extLst>
+              </p:cNvPr>
+              <p:cNvSpPr txBox="1"/>
+              <p:nvPr/>
+            </p:nvSpPr>
+            <p:spPr>
+              <a:xfrm>
+                <a:off x="1455420" y="2171699"/>
+                <a:ext cx="498855" cy="307777"/>
+              </a:xfrm>
+              <a:prstGeom prst="rect">
+                <a:avLst/>
+              </a:prstGeom>
+              <a:noFill/>
+            </p:spPr>
+            <p:txBody>
+              <a:bodyPr wrap="none" rtlCol="0">
+                <a:spAutoFit/>
+              </a:bodyPr>
+              <a:lstStyle/>
+              <a:p>
+                <a:r>
+                  <a:rPr lang="pt-BR" sz="1400" b="1" dirty="0">
+                    <a:solidFill>
+                      <a:schemeClr val="bg1"/>
+                    </a:solidFill>
+                  </a:rPr>
+                  <a:t>50%</a:t>
+                </a:r>
+                <a:endParaRPr lang="en-US" sz="1400" b="1" dirty="0">
+                  <a:solidFill>
+                    <a:schemeClr val="bg1"/>
+                  </a:solidFill>
+                </a:endParaRPr>
+              </a:p>
+            </p:txBody>
+          </p:sp>
+        </p:grpSp>
+        <p:grpSp>
+          <p:nvGrpSpPr>
+            <p:cNvPr id="33" name="Group 32">
+              <a:extLst>
+                <a:ext uri="{FF2B5EF4-FFF2-40B4-BE49-F238E27FC236}">
+                  <a16:creationId xmlns:a16="http://schemas.microsoft.com/office/drawing/2014/main" id="{04220A23-A38D-4235-BE5B-E58CFB94CB9B}"/>
+                </a:ext>
+              </a:extLst>
+            </p:cNvPr>
+            <p:cNvGrpSpPr/>
+            <p:nvPr/>
+          </p:nvGrpSpPr>
+          <p:grpSpPr>
+            <a:xfrm>
+              <a:off x="10559705" y="4465315"/>
+              <a:ext cx="1375155" cy="307778"/>
+              <a:chOff x="579120" y="2171699"/>
+              <a:chExt cx="1375155" cy="307778"/>
+            </a:xfrm>
+          </p:grpSpPr>
+          <p:sp>
+            <p:nvSpPr>
+              <p:cNvPr id="34" name="TextBox 33">
+                <a:extLst>
+                  <a:ext uri="{FF2B5EF4-FFF2-40B4-BE49-F238E27FC236}">
+                    <a16:creationId xmlns:a16="http://schemas.microsoft.com/office/drawing/2014/main" id="{71178028-EC99-4DE5-93E1-79DD0A882206}"/>
+                  </a:ext>
+                </a:extLst>
+              </p:cNvPr>
+              <p:cNvSpPr txBox="1"/>
+              <p:nvPr/>
+            </p:nvSpPr>
+            <p:spPr>
+              <a:xfrm>
+                <a:off x="579120" y="2171700"/>
+                <a:ext cx="498855" cy="307777"/>
+              </a:xfrm>
+              <a:prstGeom prst="rect">
+                <a:avLst/>
+              </a:prstGeom>
+              <a:noFill/>
+            </p:spPr>
+            <p:txBody>
+              <a:bodyPr wrap="none" rtlCol="0">
+                <a:spAutoFit/>
+              </a:bodyPr>
+              <a:lstStyle/>
+              <a:p>
+                <a:r>
+                  <a:rPr lang="pt-BR" sz="1400" b="1" dirty="0">
+                    <a:solidFill>
+                      <a:schemeClr val="bg1"/>
+                    </a:solidFill>
+                  </a:rPr>
+                  <a:t>50%</a:t>
+                </a:r>
+                <a:endParaRPr lang="en-US" sz="1400" b="1" dirty="0">
+                  <a:solidFill>
+                    <a:schemeClr val="bg1"/>
+                  </a:solidFill>
+                </a:endParaRPr>
+              </a:p>
+            </p:txBody>
+          </p:sp>
+          <p:sp>
+            <p:nvSpPr>
+              <p:cNvPr id="35" name="TextBox 34">
+                <a:extLst>
+                  <a:ext uri="{FF2B5EF4-FFF2-40B4-BE49-F238E27FC236}">
+                    <a16:creationId xmlns:a16="http://schemas.microsoft.com/office/drawing/2014/main" id="{7B4C97F6-EC9F-4E9D-BE51-C6A94EB7A600}"/>
+                  </a:ext>
+                </a:extLst>
+              </p:cNvPr>
+              <p:cNvSpPr txBox="1"/>
+              <p:nvPr/>
+            </p:nvSpPr>
+            <p:spPr>
+              <a:xfrm>
+                <a:off x="1455420" y="2171699"/>
+                <a:ext cx="498855" cy="307777"/>
+              </a:xfrm>
+              <a:prstGeom prst="rect">
+                <a:avLst/>
+              </a:prstGeom>
+              <a:noFill/>
+            </p:spPr>
+            <p:txBody>
+              <a:bodyPr wrap="none" rtlCol="0">
+                <a:spAutoFit/>
+              </a:bodyPr>
+              <a:lstStyle/>
+              <a:p>
+                <a:r>
+                  <a:rPr lang="pt-BR" sz="1400" b="1" dirty="0">
+                    <a:solidFill>
+                      <a:schemeClr val="bg1"/>
+                    </a:solidFill>
+                  </a:rPr>
+                  <a:t>50%</a:t>
+                </a:r>
+                <a:endParaRPr lang="en-US" sz="1400" b="1" dirty="0">
+                  <a:solidFill>
+                    <a:schemeClr val="bg1"/>
+                  </a:solidFill>
+                </a:endParaRPr>
+              </a:p>
+            </p:txBody>
+          </p:sp>
+        </p:grpSp>
+      </p:grpSp>
+    </p:spTree>
+    <p:extLst>
+      <p:ext uri="{BB962C8B-B14F-4D97-AF65-F5344CB8AC3E}">
+        <p14:creationId xmlns:p14="http://schemas.microsoft.com/office/powerpoint/2010/main" val="1429633486"/>
+      </p:ext>
+    </p:extLst>
+  </p:cSld>
+  <p:clrMapOvr>
+    <a:masterClrMapping/>
+  </p:clrMapOvr>
+</p:sld>
+</file>
+
 <file path=ppt/theme/theme1.xml><?xml version="1.0" encoding="utf-8"?>
 <a:theme xmlns:a="http://schemas.openxmlformats.org/drawingml/2006/main" name="Office Theme">
   <a:themeElements>

</xml_diff>